<commit_message>
Präsentation v2 + diagrammansicht html und JS (mit Testdaten)
</commit_message>
<xml_diff>
--- a/Doku/Präsentation.pptx
+++ b/Doku/Präsentation.pptx
@@ -1,15 +1,21 @@
 
 <file path=ppt/presentation.xml><?xml version="1.0" encoding="utf-8"?>
-<p:presentation xmlns:a="http://schemas.openxmlformats.org/drawingml/2006/main" xmlns:r="http://schemas.openxmlformats.org/officeDocument/2006/relationships" xmlns:p="http://schemas.openxmlformats.org/presentationml/2006/main" saveSubsetFonts="1">
+<p:presentation xmlns:a="http://schemas.openxmlformats.org/drawingml/2006/main" xmlns:r="http://schemas.openxmlformats.org/officeDocument/2006/relationships" xmlns:p="http://schemas.openxmlformats.org/presentationml/2006/main" showSpecialPlsOnTitleSld="0" saveSubsetFonts="1">
   <p:sldMasterIdLst>
     <p:sldMasterId id="2147483648" r:id="rId1"/>
   </p:sldMasterIdLst>
+  <p:notesMasterIdLst>
+    <p:notesMasterId r:id="rId10"/>
+  </p:notesMasterIdLst>
   <p:sldIdLst>
     <p:sldId id="256" r:id="rId2"/>
     <p:sldId id="257" r:id="rId3"/>
     <p:sldId id="261" r:id="rId4"/>
     <p:sldId id="259" r:id="rId5"/>
-    <p:sldId id="260" r:id="rId6"/>
+    <p:sldId id="263" r:id="rId6"/>
+    <p:sldId id="264" r:id="rId7"/>
+    <p:sldId id="260" r:id="rId8"/>
+    <p:sldId id="262" r:id="rId9"/>
   </p:sldIdLst>
   <p:sldSz cx="9144000" cy="6858000" type="screen4x3"/>
   <p:notesSz cx="6858000" cy="9144000"/>
@@ -111,6 +117,353 @@
 </p:presentation>
 </file>
 
+<file path=ppt/notesMasters/notesMaster1.xml><?xml version="1.0" encoding="utf-8"?>
+<p:notesMaster xmlns:a="http://schemas.openxmlformats.org/drawingml/2006/main" xmlns:r="http://schemas.openxmlformats.org/officeDocument/2006/relationships" xmlns:p="http://schemas.openxmlformats.org/presentationml/2006/main">
+  <p:cSld>
+    <p:bg>
+      <p:bgRef idx="1001">
+        <a:schemeClr val="bg1"/>
+      </p:bgRef>
+    </p:bg>
+    <p:spTree>
+      <p:nvGrpSpPr>
+        <p:cNvPr id="1" name=""/>
+        <p:cNvGrpSpPr/>
+        <p:nvPr/>
+      </p:nvGrpSpPr>
+      <p:grpSpPr>
+        <a:xfrm>
+          <a:off x="0" y="0"/>
+          <a:ext cx="0" cy="0"/>
+          <a:chOff x="0" y="0"/>
+          <a:chExt cx="0" cy="0"/>
+        </a:xfrm>
+      </p:grpSpPr>
+      <p:sp>
+        <p:nvSpPr>
+          <p:cNvPr id="2" name="Header Placeholder 1"/>
+          <p:cNvSpPr>
+            <a:spLocks noGrp="1"/>
+          </p:cNvSpPr>
+          <p:nvPr>
+            <p:ph type="hdr" sz="quarter"/>
+          </p:nvPr>
+        </p:nvSpPr>
+        <p:spPr>
+          <a:xfrm>
+            <a:off x="0" y="0"/>
+            <a:ext cx="2971800" cy="457200"/>
+          </a:xfrm>
+          <a:prstGeom prst="rect">
+            <a:avLst/>
+          </a:prstGeom>
+        </p:spPr>
+        <p:txBody>
+          <a:bodyPr vert="horz" lIns="91440" tIns="45720" rIns="91440" bIns="45720" rtlCol="0"/>
+          <a:lstStyle>
+            <a:lvl1pPr algn="l">
+              <a:defRPr sz="1200"/>
+            </a:lvl1pPr>
+          </a:lstStyle>
+          <a:p>
+            <a:endParaRPr lang="de-DE"/>
+          </a:p>
+        </p:txBody>
+      </p:sp>
+      <p:sp>
+        <p:nvSpPr>
+          <p:cNvPr id="3" name="Date Placeholder 2"/>
+          <p:cNvSpPr>
+            <a:spLocks noGrp="1"/>
+          </p:cNvSpPr>
+          <p:nvPr>
+            <p:ph type="dt" idx="1"/>
+          </p:nvPr>
+        </p:nvSpPr>
+        <p:spPr>
+          <a:xfrm>
+            <a:off x="3884613" y="0"/>
+            <a:ext cx="2971800" cy="457200"/>
+          </a:xfrm>
+          <a:prstGeom prst="rect">
+            <a:avLst/>
+          </a:prstGeom>
+        </p:spPr>
+        <p:txBody>
+          <a:bodyPr vert="horz" lIns="91440" tIns="45720" rIns="91440" bIns="45720" rtlCol="0"/>
+          <a:lstStyle>
+            <a:lvl1pPr algn="r">
+              <a:defRPr sz="1200"/>
+            </a:lvl1pPr>
+          </a:lstStyle>
+          <a:p>
+            <a:fld id="{12B0C5B9-C15F-4DE1-B449-93DC1CF3D41D}" type="datetimeFigureOut">
+              <a:rPr lang="de-DE" smtClean="0"/>
+              <a:t>06.06.2019</a:t>
+            </a:fld>
+            <a:endParaRPr lang="de-DE"/>
+          </a:p>
+        </p:txBody>
+      </p:sp>
+      <p:sp>
+        <p:nvSpPr>
+          <p:cNvPr id="4" name="Slide Image Placeholder 3"/>
+          <p:cNvSpPr>
+            <a:spLocks noGrp="1" noRot="1" noChangeAspect="1"/>
+          </p:cNvSpPr>
+          <p:nvPr>
+            <p:ph type="sldImg" idx="2"/>
+          </p:nvPr>
+        </p:nvSpPr>
+        <p:spPr>
+          <a:xfrm>
+            <a:off x="1143000" y="685800"/>
+            <a:ext cx="4572000" cy="3429000"/>
+          </a:xfrm>
+          <a:prstGeom prst="rect">
+            <a:avLst/>
+          </a:prstGeom>
+          <a:noFill/>
+          <a:ln w="12700">
+            <a:solidFill>
+              <a:prstClr val="black"/>
+            </a:solidFill>
+          </a:ln>
+        </p:spPr>
+        <p:txBody>
+          <a:bodyPr vert="horz" lIns="91440" tIns="45720" rIns="91440" bIns="45720" rtlCol="0" anchor="ctr"/>
+          <a:lstStyle/>
+          <a:p>
+            <a:endParaRPr lang="de-DE"/>
+          </a:p>
+        </p:txBody>
+      </p:sp>
+      <p:sp>
+        <p:nvSpPr>
+          <p:cNvPr id="5" name="Notes Placeholder 4"/>
+          <p:cNvSpPr>
+            <a:spLocks noGrp="1"/>
+          </p:cNvSpPr>
+          <p:nvPr>
+            <p:ph type="body" sz="quarter" idx="3"/>
+          </p:nvPr>
+        </p:nvSpPr>
+        <p:spPr>
+          <a:xfrm>
+            <a:off x="685800" y="4343400"/>
+            <a:ext cx="5486400" cy="4114800"/>
+          </a:xfrm>
+          <a:prstGeom prst="rect">
+            <a:avLst/>
+          </a:prstGeom>
+        </p:spPr>
+        <p:txBody>
+          <a:bodyPr vert="horz" lIns="91440" tIns="45720" rIns="91440" bIns="45720" rtlCol="0">
+            <a:normAutofit/>
+          </a:bodyPr>
+          <a:lstStyle/>
+          <a:p>
+            <a:pPr lvl="0"/>
+            <a:r>
+              <a:rPr lang="en-US" smtClean="0"/>
+              <a:t>Click to edit Master text styles</a:t>
+            </a:r>
+          </a:p>
+          <a:p>
+            <a:pPr lvl="1"/>
+            <a:r>
+              <a:rPr lang="en-US" smtClean="0"/>
+              <a:t>Second level</a:t>
+            </a:r>
+          </a:p>
+          <a:p>
+            <a:pPr lvl="2"/>
+            <a:r>
+              <a:rPr lang="en-US" smtClean="0"/>
+              <a:t>Third level</a:t>
+            </a:r>
+          </a:p>
+          <a:p>
+            <a:pPr lvl="3"/>
+            <a:r>
+              <a:rPr lang="en-US" smtClean="0"/>
+              <a:t>Fourth level</a:t>
+            </a:r>
+          </a:p>
+          <a:p>
+            <a:pPr lvl="4"/>
+            <a:r>
+              <a:rPr lang="en-US" smtClean="0"/>
+              <a:t>Fifth level</a:t>
+            </a:r>
+            <a:endParaRPr lang="de-DE"/>
+          </a:p>
+        </p:txBody>
+      </p:sp>
+      <p:sp>
+        <p:nvSpPr>
+          <p:cNvPr id="6" name="Footer Placeholder 5"/>
+          <p:cNvSpPr>
+            <a:spLocks noGrp="1"/>
+          </p:cNvSpPr>
+          <p:nvPr>
+            <p:ph type="ftr" sz="quarter" idx="4"/>
+          </p:nvPr>
+        </p:nvSpPr>
+        <p:spPr>
+          <a:xfrm>
+            <a:off x="0" y="8685213"/>
+            <a:ext cx="2971800" cy="457200"/>
+          </a:xfrm>
+          <a:prstGeom prst="rect">
+            <a:avLst/>
+          </a:prstGeom>
+        </p:spPr>
+        <p:txBody>
+          <a:bodyPr vert="horz" lIns="91440" tIns="45720" rIns="91440" bIns="45720" rtlCol="0" anchor="b"/>
+          <a:lstStyle>
+            <a:lvl1pPr algn="l">
+              <a:defRPr sz="1200"/>
+            </a:lvl1pPr>
+          </a:lstStyle>
+          <a:p>
+            <a:endParaRPr lang="de-DE"/>
+          </a:p>
+        </p:txBody>
+      </p:sp>
+      <p:sp>
+        <p:nvSpPr>
+          <p:cNvPr id="7" name="Slide Number Placeholder 6"/>
+          <p:cNvSpPr>
+            <a:spLocks noGrp="1"/>
+          </p:cNvSpPr>
+          <p:nvPr>
+            <p:ph type="sldNum" sz="quarter" idx="5"/>
+          </p:nvPr>
+        </p:nvSpPr>
+        <p:spPr>
+          <a:xfrm>
+            <a:off x="3884613" y="8685213"/>
+            <a:ext cx="2971800" cy="457200"/>
+          </a:xfrm>
+          <a:prstGeom prst="rect">
+            <a:avLst/>
+          </a:prstGeom>
+        </p:spPr>
+        <p:txBody>
+          <a:bodyPr vert="horz" lIns="91440" tIns="45720" rIns="91440" bIns="45720" rtlCol="0" anchor="b"/>
+          <a:lstStyle>
+            <a:lvl1pPr algn="r">
+              <a:defRPr sz="1200"/>
+            </a:lvl1pPr>
+          </a:lstStyle>
+          <a:p>
+            <a:fld id="{3B16891C-C2E0-47D2-A56C-EEE7025CCCA9}" type="slidenum">
+              <a:rPr lang="de-DE" smtClean="0"/>
+              <a:t>‹#›</a:t>
+            </a:fld>
+            <a:endParaRPr lang="de-DE"/>
+          </a:p>
+        </p:txBody>
+      </p:sp>
+    </p:spTree>
+  </p:cSld>
+  <p:clrMap bg1="lt1" tx1="dk1" bg2="lt2" tx2="dk2" accent1="accent1" accent2="accent2" accent3="accent3" accent4="accent4" accent5="accent5" accent6="accent6" hlink="hlink" folHlink="folHlink"/>
+  <p:notesStyle>
+    <a:lvl1pPr marL="0" algn="l" defTabSz="914400" rtl="0" eaLnBrk="1" latinLnBrk="0" hangingPunct="1">
+      <a:defRPr sz="1200" kern="1200">
+        <a:solidFill>
+          <a:schemeClr val="tx1"/>
+        </a:solidFill>
+        <a:latin typeface="+mn-lt"/>
+        <a:ea typeface="+mn-ea"/>
+        <a:cs typeface="+mn-cs"/>
+      </a:defRPr>
+    </a:lvl1pPr>
+    <a:lvl2pPr marL="457200" algn="l" defTabSz="914400" rtl="0" eaLnBrk="1" latinLnBrk="0" hangingPunct="1">
+      <a:defRPr sz="1200" kern="1200">
+        <a:solidFill>
+          <a:schemeClr val="tx1"/>
+        </a:solidFill>
+        <a:latin typeface="+mn-lt"/>
+        <a:ea typeface="+mn-ea"/>
+        <a:cs typeface="+mn-cs"/>
+      </a:defRPr>
+    </a:lvl2pPr>
+    <a:lvl3pPr marL="914400" algn="l" defTabSz="914400" rtl="0" eaLnBrk="1" latinLnBrk="0" hangingPunct="1">
+      <a:defRPr sz="1200" kern="1200">
+        <a:solidFill>
+          <a:schemeClr val="tx1"/>
+        </a:solidFill>
+        <a:latin typeface="+mn-lt"/>
+        <a:ea typeface="+mn-ea"/>
+        <a:cs typeface="+mn-cs"/>
+      </a:defRPr>
+    </a:lvl3pPr>
+    <a:lvl4pPr marL="1371600" algn="l" defTabSz="914400" rtl="0" eaLnBrk="1" latinLnBrk="0" hangingPunct="1">
+      <a:defRPr sz="1200" kern="1200">
+        <a:solidFill>
+          <a:schemeClr val="tx1"/>
+        </a:solidFill>
+        <a:latin typeface="+mn-lt"/>
+        <a:ea typeface="+mn-ea"/>
+        <a:cs typeface="+mn-cs"/>
+      </a:defRPr>
+    </a:lvl4pPr>
+    <a:lvl5pPr marL="1828800" algn="l" defTabSz="914400" rtl="0" eaLnBrk="1" latinLnBrk="0" hangingPunct="1">
+      <a:defRPr sz="1200" kern="1200">
+        <a:solidFill>
+          <a:schemeClr val="tx1"/>
+        </a:solidFill>
+        <a:latin typeface="+mn-lt"/>
+        <a:ea typeface="+mn-ea"/>
+        <a:cs typeface="+mn-cs"/>
+      </a:defRPr>
+    </a:lvl5pPr>
+    <a:lvl6pPr marL="2286000" algn="l" defTabSz="914400" rtl="0" eaLnBrk="1" latinLnBrk="0" hangingPunct="1">
+      <a:defRPr sz="1200" kern="1200">
+        <a:solidFill>
+          <a:schemeClr val="tx1"/>
+        </a:solidFill>
+        <a:latin typeface="+mn-lt"/>
+        <a:ea typeface="+mn-ea"/>
+        <a:cs typeface="+mn-cs"/>
+      </a:defRPr>
+    </a:lvl6pPr>
+    <a:lvl7pPr marL="2743200" algn="l" defTabSz="914400" rtl="0" eaLnBrk="1" latinLnBrk="0" hangingPunct="1">
+      <a:defRPr sz="1200" kern="1200">
+        <a:solidFill>
+          <a:schemeClr val="tx1"/>
+        </a:solidFill>
+        <a:latin typeface="+mn-lt"/>
+        <a:ea typeface="+mn-ea"/>
+        <a:cs typeface="+mn-cs"/>
+      </a:defRPr>
+    </a:lvl7pPr>
+    <a:lvl8pPr marL="3200400" algn="l" defTabSz="914400" rtl="0" eaLnBrk="1" latinLnBrk="0" hangingPunct="1">
+      <a:defRPr sz="1200" kern="1200">
+        <a:solidFill>
+          <a:schemeClr val="tx1"/>
+        </a:solidFill>
+        <a:latin typeface="+mn-lt"/>
+        <a:ea typeface="+mn-ea"/>
+        <a:cs typeface="+mn-cs"/>
+      </a:defRPr>
+    </a:lvl8pPr>
+    <a:lvl9pPr marL="3657600" algn="l" defTabSz="914400" rtl="0" eaLnBrk="1" latinLnBrk="0" hangingPunct="1">
+      <a:defRPr sz="1200" kern="1200">
+        <a:solidFill>
+          <a:schemeClr val="tx1"/>
+        </a:solidFill>
+        <a:latin typeface="+mn-lt"/>
+        <a:ea typeface="+mn-ea"/>
+        <a:cs typeface="+mn-cs"/>
+      </a:defRPr>
+    </a:lvl9pPr>
+  </p:notesStyle>
+</p:notesMaster>
+</file>
+
 <file path=ppt/slideLayouts/slideLayout1.xml><?xml version="1.0" encoding="utf-8"?>
 <p:sldLayout xmlns:a="http://schemas.openxmlformats.org/drawingml/2006/main" xmlns:r="http://schemas.openxmlformats.org/officeDocument/2006/relationships" xmlns:p="http://schemas.openxmlformats.org/presentationml/2006/main" type="title" preserve="1">
   <p:cSld name="Title Slide">
@@ -290,10 +643,9 @@
           <a:bodyPr/>
           <a:lstStyle/>
           <a:p>
-            <a:fld id="{7AD26AB0-436A-432E-A22D-50BED4A97257}" type="datetimeFigureOut">
+            <a:fld id="{58ED4F52-E910-4F36-85EC-F96E48ADDECF}" type="datetime1">
               <a:rPr lang="de-DE" smtClean="0"/>
-              <a:pPr/>
-              <a:t>04.06.2019</a:t>
+              <a:t>06.06.2019</a:t>
             </a:fld>
             <a:endParaRPr lang="de-DE"/>
           </a:p>
@@ -457,10 +809,9 @@
           <a:bodyPr/>
           <a:lstStyle/>
           <a:p>
-            <a:fld id="{7AD26AB0-436A-432E-A22D-50BED4A97257}" type="datetimeFigureOut">
+            <a:fld id="{2074550A-FB1E-4A78-85EE-DFC1898EFA02}" type="datetime1">
               <a:rPr lang="de-DE" smtClean="0"/>
-              <a:pPr/>
-              <a:t>04.06.2019</a:t>
+              <a:t>06.06.2019</a:t>
             </a:fld>
             <a:endParaRPr lang="de-DE"/>
           </a:p>
@@ -634,10 +985,9 @@
           <a:bodyPr/>
           <a:lstStyle/>
           <a:p>
-            <a:fld id="{7AD26AB0-436A-432E-A22D-50BED4A97257}" type="datetimeFigureOut">
+            <a:fld id="{A2BBBD5A-B6AA-41C0-9FCB-71E06A2239EB}" type="datetime1">
               <a:rPr lang="de-DE" smtClean="0"/>
-              <a:pPr/>
-              <a:t>04.06.2019</a:t>
+              <a:t>06.06.2019</a:t>
             </a:fld>
             <a:endParaRPr lang="de-DE"/>
           </a:p>
@@ -801,10 +1151,9 @@
           <a:bodyPr/>
           <a:lstStyle/>
           <a:p>
-            <a:fld id="{7AD26AB0-436A-432E-A22D-50BED4A97257}" type="datetimeFigureOut">
+            <a:fld id="{FE9BF1D3-DC78-468E-8C95-E45E56A831FB}" type="datetime1">
               <a:rPr lang="de-DE" smtClean="0"/>
-              <a:pPr/>
-              <a:t>04.06.2019</a:t>
+              <a:t>06.06.2019</a:t>
             </a:fld>
             <a:endParaRPr lang="de-DE"/>
           </a:p>
@@ -1044,10 +1393,9 @@
           <a:bodyPr/>
           <a:lstStyle/>
           <a:p>
-            <a:fld id="{7AD26AB0-436A-432E-A22D-50BED4A97257}" type="datetimeFigureOut">
+            <a:fld id="{F2F20F45-7679-4634-9921-18B4694E7FDF}" type="datetime1">
               <a:rPr lang="de-DE" smtClean="0"/>
-              <a:pPr/>
-              <a:t>04.06.2019</a:t>
+              <a:t>06.06.2019</a:t>
             </a:fld>
             <a:endParaRPr lang="de-DE"/>
           </a:p>
@@ -1329,10 +1677,9 @@
           <a:bodyPr/>
           <a:lstStyle/>
           <a:p>
-            <a:fld id="{7AD26AB0-436A-432E-A22D-50BED4A97257}" type="datetimeFigureOut">
+            <a:fld id="{59CBBB9D-0444-42E0-89C3-F887AA2ABDBE}" type="datetime1">
               <a:rPr lang="de-DE" smtClean="0"/>
-              <a:pPr/>
-              <a:t>04.06.2019</a:t>
+              <a:t>06.06.2019</a:t>
             </a:fld>
             <a:endParaRPr lang="de-DE"/>
           </a:p>
@@ -1748,10 +2095,9 @@
           <a:bodyPr/>
           <a:lstStyle/>
           <a:p>
-            <a:fld id="{7AD26AB0-436A-432E-A22D-50BED4A97257}" type="datetimeFigureOut">
+            <a:fld id="{3EE3FD4A-66A0-40E8-8325-5BF7D4303E3F}" type="datetime1">
               <a:rPr lang="de-DE" smtClean="0"/>
-              <a:pPr/>
-              <a:t>04.06.2019</a:t>
+              <a:t>06.06.2019</a:t>
             </a:fld>
             <a:endParaRPr lang="de-DE"/>
           </a:p>
@@ -1863,10 +2209,9 @@
           <a:bodyPr/>
           <a:lstStyle/>
           <a:p>
-            <a:fld id="{7AD26AB0-436A-432E-A22D-50BED4A97257}" type="datetimeFigureOut">
+            <a:fld id="{69FAEC51-3E8D-4E97-B1F2-0DAE17A49039}" type="datetime1">
               <a:rPr lang="de-DE" smtClean="0"/>
-              <a:pPr/>
-              <a:t>04.06.2019</a:t>
+              <a:t>06.06.2019</a:t>
             </a:fld>
             <a:endParaRPr lang="de-DE"/>
           </a:p>
@@ -1955,10 +2300,9 @@
           <a:bodyPr/>
           <a:lstStyle/>
           <a:p>
-            <a:fld id="{7AD26AB0-436A-432E-A22D-50BED4A97257}" type="datetimeFigureOut">
+            <a:fld id="{38076506-CD57-419E-B555-115BA109C04E}" type="datetime1">
               <a:rPr lang="de-DE" smtClean="0"/>
-              <a:pPr/>
-              <a:t>04.06.2019</a:t>
+              <a:t>06.06.2019</a:t>
             </a:fld>
             <a:endParaRPr lang="de-DE"/>
           </a:p>
@@ -2229,10 +2573,9 @@
           <a:bodyPr/>
           <a:lstStyle/>
           <a:p>
-            <a:fld id="{7AD26AB0-436A-432E-A22D-50BED4A97257}" type="datetimeFigureOut">
+            <a:fld id="{52A57ACB-7773-48CB-9025-929C47465A39}" type="datetime1">
               <a:rPr lang="de-DE" smtClean="0"/>
-              <a:pPr/>
-              <a:t>04.06.2019</a:t>
+              <a:t>06.06.2019</a:t>
             </a:fld>
             <a:endParaRPr lang="de-DE"/>
           </a:p>
@@ -2479,10 +2822,9 @@
           <a:bodyPr/>
           <a:lstStyle/>
           <a:p>
-            <a:fld id="{7AD26AB0-436A-432E-A22D-50BED4A97257}" type="datetimeFigureOut">
+            <a:fld id="{33480F50-A871-49BE-BF33-D69C7F2A0FF0}" type="datetime1">
               <a:rPr lang="de-DE" smtClean="0"/>
-              <a:pPr/>
-              <a:t>04.06.2019</a:t>
+              <a:t>06.06.2019</a:t>
             </a:fld>
             <a:endParaRPr lang="de-DE"/>
           </a:p>
@@ -2543,9 +2885,15 @@
 <p:sldMaster xmlns:a="http://schemas.openxmlformats.org/drawingml/2006/main" xmlns:r="http://schemas.openxmlformats.org/officeDocument/2006/relationships" xmlns:p="http://schemas.openxmlformats.org/presentationml/2006/main">
   <p:cSld>
     <p:bg>
-      <p:bgRef idx="1001">
-        <a:schemeClr val="bg1"/>
-      </p:bgRef>
+      <p:bgPr>
+        <a:solidFill>
+          <a:schemeClr val="bg1">
+            <a:lumMod val="75000"/>
+            <a:alpha val="19000"/>
+          </a:schemeClr>
+        </a:solidFill>
+        <a:effectLst/>
+      </p:bgPr>
     </p:bg>
     <p:spTree>
       <p:nvGrpSpPr>
@@ -2689,10 +3037,9 @@
             </a:lvl1pPr>
           </a:lstStyle>
           <a:p>
-            <a:fld id="{7AD26AB0-436A-432E-A22D-50BED4A97257}" type="datetimeFigureOut">
+            <a:fld id="{C69031F7-D773-433F-9920-4BC4D22E0948}" type="datetime1">
               <a:rPr lang="de-DE" smtClean="0"/>
-              <a:pPr/>
-              <a:t>04.06.2019</a:t>
+              <a:t>06.06.2019</a:t>
             </a:fld>
             <a:endParaRPr lang="de-DE"/>
           </a:p>
@@ -2793,6 +3140,7 @@
     <p:sldLayoutId id="2147483658" r:id="rId10"/>
     <p:sldLayoutId id="2147483659" r:id="rId11"/>
   </p:sldLayoutIdLst>
+  <p:hf hdr="0" ftr="0" dt="0"/>
   <p:txStyles>
     <p:titleStyle>
       <a:lvl1pPr algn="ctr" defTabSz="914400" rtl="0" eaLnBrk="1" latinLnBrk="0" hangingPunct="1">
@@ -3063,6 +3411,32 @@
           <a:chExt cx="0" cy="0"/>
         </a:xfrm>
       </p:grpSpPr>
+      <p:pic>
+        <p:nvPicPr>
+          <p:cNvPr id="1026" name="Picture 2" descr="D:\Documents\Dropbox\E-Health SS19\Bilder\hintergrund.jpg"/>
+          <p:cNvPicPr>
+            <a:picLocks noChangeAspect="1" noChangeArrowheads="1"/>
+          </p:cNvPicPr>
+          <p:nvPr/>
+        </p:nvPicPr>
+        <p:blipFill>
+          <a:blip r:embed="rId2" cstate="print"/>
+          <a:srcRect/>
+          <a:stretch>
+            <a:fillRect/>
+          </a:stretch>
+        </p:blipFill>
+        <p:spPr bwMode="auto">
+          <a:xfrm>
+            <a:off x="0" y="0"/>
+            <a:ext cx="9144032" cy="6858024"/>
+          </a:xfrm>
+          <a:prstGeom prst="rect">
+            <a:avLst/>
+          </a:prstGeom>
+          <a:noFill/>
+        </p:spPr>
+      </p:pic>
       <p:sp>
         <p:nvSpPr>
           <p:cNvPr id="2" name="Title 1"/>
@@ -3073,23 +3447,35 @@
             <p:ph type="ctrTitle"/>
           </p:nvPr>
         </p:nvSpPr>
-        <p:spPr/>
-        <p:txBody>
-          <a:bodyPr/>
-          <a:lstStyle/>
-          <a:p>
-            <a:r>
-              <a:rPr lang="de-DE" dirty="0" smtClean="0"/>
-              <a:t>E-Mood-Tracker</a:t>
-            </a:r>
-            <a:br>
-              <a:rPr lang="de-DE" dirty="0" smtClean="0"/>
-            </a:br>
-            <a:r>
-              <a:rPr lang="de-DE" dirty="0" smtClean="0"/>
+        <p:spPr>
+          <a:xfrm>
+            <a:off x="1514508" y="3614740"/>
+            <a:ext cx="7772400" cy="1314458"/>
+          </a:xfrm>
+        </p:spPr>
+        <p:txBody>
+          <a:bodyPr>
+            <a:normAutofit/>
+          </a:bodyPr>
+          <a:lstStyle/>
+          <a:p>
+            <a:r>
+              <a:rPr lang="de-DE" sz="4800" b="1" dirty="0" smtClean="0">
+                <a:solidFill>
+                  <a:schemeClr val="bg1"/>
+                </a:solidFill>
+                <a:latin typeface="Kozuka Gothic Pro L" pitchFamily="34" charset="-128"/>
+                <a:ea typeface="Kozuka Gothic Pro L" pitchFamily="34" charset="-128"/>
+              </a:rPr>
               <a:t>Statusbericht</a:t>
             </a:r>
-            <a:endParaRPr lang="de-DE" dirty="0"/>
+            <a:endParaRPr lang="de-DE" sz="4800" b="1" dirty="0">
+              <a:solidFill>
+                <a:schemeClr val="bg1"/>
+              </a:solidFill>
+              <a:latin typeface="Kozuka Gothic Pro L" pitchFamily="34" charset="-128"/>
+              <a:ea typeface="Kozuka Gothic Pro L" pitchFamily="34" charset="-128"/>
+            </a:endParaRPr>
           </a:p>
         </p:txBody>
       </p:sp>
@@ -3103,16 +3489,38 @@
             <p:ph type="subTitle" idx="1"/>
           </p:nvPr>
         </p:nvSpPr>
-        <p:spPr/>
-        <p:txBody>
-          <a:bodyPr/>
-          <a:lstStyle/>
-          <a:p>
-            <a:r>
-              <a:rPr lang="de-DE" dirty="0" smtClean="0"/>
+        <p:spPr>
+          <a:xfrm>
+            <a:off x="0" y="5857892"/>
+            <a:ext cx="5357818" cy="1000108"/>
+          </a:xfrm>
+        </p:spPr>
+        <p:txBody>
+          <a:bodyPr>
+            <a:normAutofit/>
+          </a:bodyPr>
+          <a:lstStyle/>
+          <a:p>
+            <a:pPr algn="l"/>
+            <a:r>
+              <a:rPr lang="de-DE" sz="2800" dirty="0" smtClean="0">
+                <a:solidFill>
+                  <a:schemeClr val="tx1">
+                    <a:lumMod val="85000"/>
+                    <a:lumOff val="15000"/>
+                  </a:schemeClr>
+                </a:solidFill>
+              </a:rPr>
               <a:t>Jan Gutnik, Shabithan Uthayakumaran, Valeria Pagliaro</a:t>
             </a:r>
-            <a:endParaRPr lang="de-DE" dirty="0"/>
+            <a:endParaRPr lang="de-DE" sz="2800" dirty="0">
+              <a:solidFill>
+                <a:schemeClr val="tx1">
+                  <a:lumMod val="85000"/>
+                  <a:lumOff val="15000"/>
+                </a:schemeClr>
+              </a:solidFill>
+            </a:endParaRPr>
           </a:p>
         </p:txBody>
       </p:sp>
@@ -3121,6 +3529,13 @@
   <p:clrMapOvr>
     <a:masterClrMapping/>
   </p:clrMapOvr>
+  <p:timing>
+    <p:tnLst>
+      <p:par>
+        <p:cTn id="1" dur="indefinite" restart="never" nodeType="tmRoot"/>
+      </p:par>
+    </p:tnLst>
+  </p:timing>
 </p:sld>
 </file>
 
@@ -3157,10 +3572,30 @@
           <a:lstStyle/>
           <a:p>
             <a:r>
-              <a:rPr lang="de-DE" dirty="0" smtClean="0"/>
-              <a:t>Was wurde realisiert?</a:t>
-            </a:r>
-            <a:endParaRPr lang="de-DE" dirty="0"/>
+              <a:rPr lang="de-DE" b="1" dirty="0" smtClean="0">
+                <a:latin typeface="Kozuka Gothic Pro L" pitchFamily="34" charset="-128"/>
+                <a:ea typeface="Kozuka Gothic Pro L" pitchFamily="34" charset="-128"/>
+              </a:rPr>
+              <a:t>„Was </a:t>
+            </a:r>
+            <a:r>
+              <a:rPr lang="de-DE" b="1" dirty="0" smtClean="0">
+                <a:latin typeface="Kozuka Gothic Pro L" pitchFamily="34" charset="-128"/>
+                <a:ea typeface="Kozuka Gothic Pro L" pitchFamily="34" charset="-128"/>
+              </a:rPr>
+              <a:t>wurde realisiert</a:t>
+            </a:r>
+            <a:r>
+              <a:rPr lang="de-DE" b="1" dirty="0" smtClean="0">
+                <a:latin typeface="Kozuka Gothic Pro L" pitchFamily="34" charset="-128"/>
+                <a:ea typeface="Kozuka Gothic Pro L" pitchFamily="34" charset="-128"/>
+              </a:rPr>
+              <a:t>?“</a:t>
+            </a:r>
+            <a:endParaRPr lang="de-DE" b="1" dirty="0">
+              <a:latin typeface="Kozuka Gothic Pro L" pitchFamily="34" charset="-128"/>
+              <a:ea typeface="Kozuka Gothic Pro L" pitchFamily="34" charset="-128"/>
+            </a:endParaRPr>
           </a:p>
         </p:txBody>
       </p:sp>
@@ -3184,7 +3619,10 @@
               <a:buAutoNum type="arabicPeriod"/>
             </a:pPr>
             <a:r>
-              <a:rPr lang="de-DE" dirty="0" smtClean="0"/>
+              <a:rPr lang="de-DE" dirty="0" smtClean="0">
+                <a:latin typeface="Kozuka Gothic Pro L" pitchFamily="34" charset="-128"/>
+                <a:ea typeface="Kozuka Gothic Pro L" pitchFamily="34" charset="-128"/>
+              </a:rPr>
               <a:t>HTML/CSS</a:t>
             </a:r>
             <a:r>
@@ -3192,111 +3630,221 @@
                 <a:solidFill>
                   <a:srgbClr val="00B050"/>
                 </a:solidFill>
+                <a:latin typeface="Kozuka Gothic Pro L" pitchFamily="34" charset="-128"/>
+                <a:ea typeface="Kozuka Gothic Pro L" pitchFamily="34" charset="-128"/>
               </a:rPr>
               <a:t> </a:t>
+            </a:r>
+            <a:r>
+              <a:rPr lang="de-DE" b="1" dirty="0" smtClean="0">
+                <a:solidFill>
+                  <a:srgbClr val="075E45"/>
+                </a:solidFill>
+                <a:latin typeface="Kozuka Gothic Pro L" pitchFamily="34" charset="-128"/>
+                <a:ea typeface="Kozuka Gothic Pro L" pitchFamily="34" charset="-128"/>
+              </a:rPr>
+              <a:t>vollständig</a:t>
+            </a:r>
+            <a:endParaRPr lang="de-DE" b="1" dirty="0" smtClean="0">
+              <a:solidFill>
+                <a:srgbClr val="075E45"/>
+              </a:solidFill>
+              <a:latin typeface="Kozuka Gothic Pro L" pitchFamily="34" charset="-128"/>
+              <a:ea typeface="Kozuka Gothic Pro L" pitchFamily="34" charset="-128"/>
+            </a:endParaRPr>
+          </a:p>
+          <a:p>
+            <a:pPr marL="514350" indent="-514350">
+              <a:buFont typeface="+mj-lt"/>
+              <a:buAutoNum type="arabicPeriod"/>
+            </a:pPr>
+            <a:r>
+              <a:rPr lang="de-DE" dirty="0" smtClean="0">
+                <a:latin typeface="Kozuka Gothic Pro L" pitchFamily="34" charset="-128"/>
+                <a:ea typeface="Kozuka Gothic Pro L" pitchFamily="34" charset="-128"/>
+              </a:rPr>
+              <a:t>Client JS </a:t>
+            </a:r>
+            <a:r>
+              <a:rPr lang="de-DE" dirty="0" smtClean="0">
+                <a:solidFill>
+                  <a:srgbClr val="075E45"/>
+                </a:solidFill>
+                <a:latin typeface="Kozuka Gothic Pro L" pitchFamily="34" charset="-128"/>
+                <a:ea typeface="Kozuka Gothic Pro L" pitchFamily="34" charset="-128"/>
+              </a:rPr>
+              <a:t>– </a:t>
+            </a:r>
+            <a:r>
+              <a:rPr lang="de-DE" b="1" dirty="0" smtClean="0">
+                <a:solidFill>
+                  <a:srgbClr val="075E45"/>
+                </a:solidFill>
+                <a:latin typeface="Kozuka Gothic Pro L" pitchFamily="34" charset="-128"/>
+                <a:ea typeface="Kozuka Gothic Pro L" pitchFamily="34" charset="-128"/>
+              </a:rPr>
+              <a:t>Login 100</a:t>
+            </a:r>
+            <a:r>
+              <a:rPr lang="de-DE" b="1" dirty="0" smtClean="0">
+                <a:solidFill>
+                  <a:srgbClr val="075E45"/>
+                </a:solidFill>
+                <a:latin typeface="Kozuka Gothic Pro L" pitchFamily="34" charset="-128"/>
+                <a:ea typeface="Kozuka Gothic Pro L" pitchFamily="34" charset="-128"/>
+              </a:rPr>
+              <a:t>%</a:t>
+            </a:r>
+          </a:p>
+          <a:p>
+            <a:pPr marL="514350" indent="-514350">
+              <a:buFont typeface="+mj-lt"/>
+              <a:buAutoNum type="arabicPeriod"/>
+            </a:pPr>
+            <a:r>
+              <a:rPr lang="de-DE" dirty="0" smtClean="0">
+                <a:solidFill>
+                  <a:schemeClr val="tx1">
+                    <a:lumMod val="85000"/>
+                    <a:lumOff val="15000"/>
+                  </a:schemeClr>
+                </a:solidFill>
+                <a:latin typeface="Kozuka Gothic Pro L" pitchFamily="34" charset="-128"/>
+                <a:ea typeface="Kozuka Gothic Pro L" pitchFamily="34" charset="-128"/>
+              </a:rPr>
+              <a:t>Client JS </a:t>
+            </a:r>
+            <a:r>
+              <a:rPr lang="de-DE" b="1" dirty="0" smtClean="0">
+                <a:solidFill>
+                  <a:schemeClr val="tx1">
+                    <a:lumMod val="85000"/>
+                    <a:lumOff val="15000"/>
+                  </a:schemeClr>
+                </a:solidFill>
+                <a:latin typeface="Kozuka Gothic Pro L" pitchFamily="34" charset="-128"/>
+                <a:ea typeface="Kozuka Gothic Pro L" pitchFamily="34" charset="-128"/>
+              </a:rPr>
+              <a:t>– </a:t>
+            </a:r>
+            <a:r>
+              <a:rPr lang="de-DE" b="1" dirty="0" smtClean="0">
+                <a:solidFill>
+                  <a:srgbClr val="075E45"/>
+                </a:solidFill>
+                <a:latin typeface="Kozuka Gothic Pro L" pitchFamily="34" charset="-128"/>
+                <a:ea typeface="Kozuka Gothic Pro L" pitchFamily="34" charset="-128"/>
+              </a:rPr>
+              <a:t>Ausloggen 100 %</a:t>
+            </a:r>
+            <a:endParaRPr lang="de-DE" b="1" dirty="0" smtClean="0">
+              <a:solidFill>
+                <a:srgbClr val="075E45"/>
+              </a:solidFill>
+              <a:latin typeface="Kozuka Gothic Pro L" pitchFamily="34" charset="-128"/>
+              <a:ea typeface="Kozuka Gothic Pro L" pitchFamily="34" charset="-128"/>
+            </a:endParaRPr>
+          </a:p>
+          <a:p>
+            <a:pPr marL="514350" indent="-514350">
+              <a:buFont typeface="+mj-lt"/>
+              <a:buAutoNum type="arabicPeriod"/>
+            </a:pPr>
+            <a:r>
+              <a:rPr lang="de-DE" dirty="0" smtClean="0">
+                <a:latin typeface="Kozuka Gothic Pro L" pitchFamily="34" charset="-128"/>
+                <a:ea typeface="Kozuka Gothic Pro L" pitchFamily="34" charset="-128"/>
+              </a:rPr>
+              <a:t>Webserver –</a:t>
+            </a:r>
+            <a:r>
+              <a:rPr lang="de-DE" dirty="0" smtClean="0">
+                <a:solidFill>
+                  <a:srgbClr val="00B050"/>
+                </a:solidFill>
+                <a:latin typeface="Kozuka Gothic Pro L" pitchFamily="34" charset="-128"/>
+                <a:ea typeface="Kozuka Gothic Pro L" pitchFamily="34" charset="-128"/>
+              </a:rPr>
+              <a:t> </a:t>
+            </a:r>
+            <a:r>
+              <a:rPr lang="de-DE" b="1" dirty="0" smtClean="0">
+                <a:solidFill>
+                  <a:srgbClr val="075E45"/>
+                </a:solidFill>
+                <a:latin typeface="Kozuka Gothic Pro L" pitchFamily="34" charset="-128"/>
+                <a:ea typeface="Kozuka Gothic Pro L" pitchFamily="34" charset="-128"/>
+              </a:rPr>
+              <a:t>90%</a:t>
+            </a:r>
+          </a:p>
+          <a:p>
+            <a:pPr marL="514350" indent="-514350">
+              <a:buFont typeface="+mj-lt"/>
+              <a:buAutoNum type="arabicPeriod"/>
+            </a:pPr>
+            <a:r>
+              <a:rPr lang="de-DE" dirty="0" smtClean="0">
+                <a:latin typeface="Kozuka Gothic Pro L" pitchFamily="34" charset="-128"/>
+                <a:ea typeface="Kozuka Gothic Pro L" pitchFamily="34" charset="-128"/>
+              </a:rPr>
+              <a:t>Datenbank zu </a:t>
+            </a:r>
+            <a:r>
+              <a:rPr lang="de-DE" b="1" dirty="0" smtClean="0">
+                <a:solidFill>
+                  <a:srgbClr val="C00000"/>
+                </a:solidFill>
+                <a:latin typeface="Kozuka Gothic Pro L" pitchFamily="34" charset="-128"/>
+                <a:ea typeface="Kozuka Gothic Pro L" pitchFamily="34" charset="-128"/>
+              </a:rPr>
+              <a:t>25% </a:t>
+            </a:r>
+            <a:r>
+              <a:rPr lang="de-DE" dirty="0" smtClean="0">
+                <a:latin typeface="Kozuka Gothic Pro L" pitchFamily="34" charset="-128"/>
+                <a:ea typeface="Kozuka Gothic Pro L" pitchFamily="34" charset="-128"/>
+              </a:rPr>
+              <a:t>implementiert</a:t>
+            </a:r>
+          </a:p>
+          <a:p>
+            <a:pPr marL="514350" indent="-514350">
+              <a:buFont typeface="+mj-lt"/>
+              <a:buAutoNum type="arabicPeriod"/>
+            </a:pPr>
+            <a:r>
+              <a:rPr lang="de-DE" dirty="0" smtClean="0">
+                <a:latin typeface="Kozuka Gothic Pro L" pitchFamily="34" charset="-128"/>
+                <a:ea typeface="Kozuka Gothic Pro L" pitchFamily="34" charset="-128"/>
+              </a:rPr>
+              <a:t>Dokumentation wurde erweitert – </a:t>
+            </a:r>
+            <a:r>
+              <a:rPr lang="de-DE" b="1" dirty="0" smtClean="0">
+                <a:solidFill>
+                  <a:srgbClr val="075E45"/>
+                </a:solidFill>
+                <a:latin typeface="Kozuka Gothic Pro L" pitchFamily="34" charset="-128"/>
+                <a:ea typeface="Kozuka Gothic Pro L" pitchFamily="34" charset="-128"/>
+              </a:rPr>
+              <a:t>30%</a:t>
             </a:r>
             <a:r>
               <a:rPr lang="de-DE" b="1" dirty="0" smtClean="0">
                 <a:solidFill>
                   <a:srgbClr val="00B050"/>
                 </a:solidFill>
-              </a:rPr>
-              <a:t>komplett</a:t>
-            </a:r>
-          </a:p>
-          <a:p>
-            <a:pPr marL="514350" indent="-514350">
-              <a:buFont typeface="+mj-lt"/>
-              <a:buAutoNum type="arabicPeriod"/>
-            </a:pPr>
-            <a:r>
-              <a:rPr lang="de-DE" dirty="0" smtClean="0"/>
-              <a:t>Client JS –</a:t>
+                <a:latin typeface="Kozuka Gothic Pro L" pitchFamily="34" charset="-128"/>
+                <a:ea typeface="Kozuka Gothic Pro L" pitchFamily="34" charset="-128"/>
+              </a:rPr>
+              <a:t> </a:t>
             </a:r>
             <a:r>
               <a:rPr lang="de-DE" dirty="0" smtClean="0">
-                <a:solidFill>
-                  <a:srgbClr val="00B050"/>
-                </a:solidFill>
-              </a:rPr>
-              <a:t> </a:t>
-            </a:r>
-            <a:r>
-              <a:rPr lang="de-DE" b="1" dirty="0" smtClean="0">
-                <a:solidFill>
-                  <a:srgbClr val="00B050"/>
-                </a:solidFill>
-              </a:rPr>
-              <a:t>Login 100%</a:t>
-            </a:r>
-          </a:p>
-          <a:p>
-            <a:pPr marL="514350" indent="-514350">
-              <a:buFont typeface="+mj-lt"/>
-              <a:buAutoNum type="arabicPeriod"/>
-            </a:pPr>
-            <a:r>
-              <a:rPr lang="de-DE" dirty="0" smtClean="0"/>
-              <a:t>Webserver fast vollständig –</a:t>
-            </a:r>
-            <a:r>
-              <a:rPr lang="de-DE" dirty="0" smtClean="0">
-                <a:solidFill>
-                  <a:srgbClr val="00B050"/>
-                </a:solidFill>
-              </a:rPr>
-              <a:t> </a:t>
-            </a:r>
-            <a:r>
-              <a:rPr lang="de-DE" b="1" dirty="0" smtClean="0">
-                <a:solidFill>
-                  <a:srgbClr val="00B050"/>
-                </a:solidFill>
-              </a:rPr>
-              <a:t>90%</a:t>
-            </a:r>
-          </a:p>
-          <a:p>
-            <a:pPr marL="514350" indent="-514350">
-              <a:buFont typeface="+mj-lt"/>
-              <a:buAutoNum type="arabicPeriod"/>
-            </a:pPr>
-            <a:r>
-              <a:rPr lang="de-DE" dirty="0" smtClean="0"/>
-              <a:t>Datenbank zu </a:t>
-            </a:r>
-            <a:r>
-              <a:rPr lang="de-DE" b="1" dirty="0" smtClean="0">
-                <a:solidFill>
-                  <a:srgbClr val="C00000"/>
-                </a:solidFill>
-              </a:rPr>
-              <a:t>25% </a:t>
-            </a:r>
-            <a:r>
-              <a:rPr lang="de-DE" dirty="0" smtClean="0"/>
-              <a:t>implementiert</a:t>
-            </a:r>
-          </a:p>
-          <a:p>
-            <a:pPr marL="514350" indent="-514350">
-              <a:buFont typeface="+mj-lt"/>
-              <a:buAutoNum type="arabicPeriod"/>
-            </a:pPr>
-            <a:r>
-              <a:rPr lang="de-DE" dirty="0" smtClean="0"/>
-              <a:t>Dokumentation wurde erweitert – </a:t>
-            </a:r>
-            <a:r>
-              <a:rPr lang="de-DE" b="1" dirty="0" smtClean="0">
-                <a:solidFill>
-                  <a:srgbClr val="00B050"/>
-                </a:solidFill>
-              </a:rPr>
-              <a:t>30% </a:t>
-            </a:r>
-            <a:r>
-              <a:rPr lang="de-DE" dirty="0" smtClean="0"/>
+                <a:latin typeface="Kozuka Gothic Pro L" pitchFamily="34" charset="-128"/>
+                <a:ea typeface="Kozuka Gothic Pro L" pitchFamily="34" charset="-128"/>
+              </a:rPr>
               <a:t>(Anforderungen, Mockups, Diagramme)</a:t>
             </a:r>
           </a:p>
@@ -3309,11 +3857,68 @@
           </a:p>
         </p:txBody>
       </p:sp>
+      <p:sp>
+        <p:nvSpPr>
+          <p:cNvPr id="6" name="Slide Number Placeholder 5"/>
+          <p:cNvSpPr>
+            <a:spLocks noGrp="1"/>
+          </p:cNvSpPr>
+          <p:nvPr>
+            <p:ph type="sldNum" sz="quarter" idx="12"/>
+          </p:nvPr>
+        </p:nvSpPr>
+        <p:spPr/>
+        <p:txBody>
+          <a:bodyPr/>
+          <a:lstStyle/>
+          <a:p>
+            <a:fld id="{785AF671-EB06-4FE0-B603-5597A3A057FF}" type="slidenum">
+              <a:rPr lang="de-DE" sz="1600" b="1" smtClean="0"/>
+              <a:pPr/>
+              <a:t>2</a:t>
+            </a:fld>
+            <a:endParaRPr lang="de-DE" sz="1600" b="1" dirty="0"/>
+          </a:p>
+        </p:txBody>
+      </p:sp>
+      <p:pic>
+        <p:nvPicPr>
+          <p:cNvPr id="8" name="Picture 2" descr="D:\Documents\Dropbox\E-Health SS19\Bilder\Logo-spiegel.png"/>
+          <p:cNvPicPr>
+            <a:picLocks noChangeAspect="1" noChangeArrowheads="1"/>
+          </p:cNvPicPr>
+          <p:nvPr/>
+        </p:nvPicPr>
+        <p:blipFill>
+          <a:blip r:embed="rId2" cstate="print"/>
+          <a:srcRect/>
+          <a:stretch>
+            <a:fillRect/>
+          </a:stretch>
+        </p:blipFill>
+        <p:spPr bwMode="auto">
+          <a:xfrm>
+            <a:off x="71406" y="5715016"/>
+            <a:ext cx="1143008" cy="1143008"/>
+          </a:xfrm>
+          <a:prstGeom prst="rect">
+            <a:avLst/>
+          </a:prstGeom>
+          <a:noFill/>
+        </p:spPr>
+      </p:pic>
     </p:spTree>
   </p:cSld>
   <p:clrMapOvr>
     <a:masterClrMapping/>
   </p:clrMapOvr>
+  <p:timing>
+    <p:tnLst>
+      <p:par>
+        <p:cTn id="1" dur="indefinite" restart="never" nodeType="tmRoot"/>
+      </p:par>
+    </p:tnLst>
+  </p:timing>
 </p:sld>
 </file>
 
@@ -3350,10 +3955,30 @@
           <a:lstStyle/>
           <a:p>
             <a:r>
-              <a:rPr lang="de-DE" dirty="0" smtClean="0"/>
-              <a:t>Was fehlt?</a:t>
-            </a:r>
-            <a:endParaRPr lang="de-DE" dirty="0"/>
+              <a:rPr lang="de-DE" b="1" dirty="0" smtClean="0">
+                <a:latin typeface="Kozuka Gothic Pro L" pitchFamily="34" charset="-128"/>
+                <a:ea typeface="Kozuka Gothic Pro L" pitchFamily="34" charset="-128"/>
+              </a:rPr>
+              <a:t>„Was </a:t>
+            </a:r>
+            <a:r>
+              <a:rPr lang="de-DE" b="1" dirty="0" smtClean="0">
+                <a:latin typeface="Kozuka Gothic Pro L" pitchFamily="34" charset="-128"/>
+                <a:ea typeface="Kozuka Gothic Pro L" pitchFamily="34" charset="-128"/>
+              </a:rPr>
+              <a:t>fehlt</a:t>
+            </a:r>
+            <a:r>
+              <a:rPr lang="de-DE" b="1" dirty="0" smtClean="0">
+                <a:latin typeface="Kozuka Gothic Pro L" pitchFamily="34" charset="-128"/>
+                <a:ea typeface="Kozuka Gothic Pro L" pitchFamily="34" charset="-128"/>
+              </a:rPr>
+              <a:t>?“</a:t>
+            </a:r>
+            <a:endParaRPr lang="de-DE" b="1" dirty="0">
+              <a:latin typeface="Kozuka Gothic Pro L" pitchFamily="34" charset="-128"/>
+              <a:ea typeface="Kozuka Gothic Pro L" pitchFamily="34" charset="-128"/>
+            </a:endParaRPr>
           </a:p>
         </p:txBody>
       </p:sp>
@@ -3377,7 +4002,10 @@
               <a:buAutoNum type="arabicPeriod"/>
             </a:pPr>
             <a:r>
-              <a:rPr lang="de-DE" dirty="0" smtClean="0"/>
+              <a:rPr lang="de-DE" dirty="0" smtClean="0">
+                <a:latin typeface="Kozuka Gothic Pro L" pitchFamily="34" charset="-128"/>
+                <a:ea typeface="Kozuka Gothic Pro L" pitchFamily="34" charset="-128"/>
+              </a:rPr>
               <a:t>Restliche Client JS Funktionen</a:t>
             </a:r>
           </a:p>
@@ -3387,7 +4015,10 @@
               <a:buAutoNum type="arabicPeriod"/>
             </a:pPr>
             <a:r>
-              <a:rPr lang="de-DE" dirty="0" smtClean="0"/>
+              <a:rPr lang="de-DE" dirty="0" smtClean="0">
+                <a:latin typeface="Kozuka Gothic Pro L" pitchFamily="34" charset="-128"/>
+                <a:ea typeface="Kozuka Gothic Pro L" pitchFamily="34" charset="-128"/>
+              </a:rPr>
               <a:t>HTTPS Implementierung bei Webserver</a:t>
             </a:r>
           </a:p>
@@ -3397,7 +4028,10 @@
               <a:buAutoNum type="arabicPeriod"/>
             </a:pPr>
             <a:r>
-              <a:rPr lang="de-DE" dirty="0" smtClean="0"/>
+              <a:rPr lang="de-DE" dirty="0" smtClean="0">
+                <a:latin typeface="Kozuka Gothic Pro L" pitchFamily="34" charset="-128"/>
+                <a:ea typeface="Kozuka Gothic Pro L" pitchFamily="34" charset="-128"/>
+              </a:rPr>
               <a:t>Restliche Implementation der Datenbank</a:t>
             </a:r>
           </a:p>
@@ -3407,7 +4041,10 @@
               <a:buAutoNum type="arabicPeriod"/>
             </a:pPr>
             <a:r>
-              <a:rPr lang="de-DE" dirty="0" smtClean="0"/>
+              <a:rPr lang="de-DE" dirty="0" smtClean="0">
+                <a:latin typeface="Kozuka Gothic Pro L" pitchFamily="34" charset="-128"/>
+                <a:ea typeface="Kozuka Gothic Pro L" pitchFamily="34" charset="-128"/>
+              </a:rPr>
               <a:t>Verbindung Datenbank und Webserver</a:t>
             </a:r>
           </a:p>
@@ -3417,7 +4054,10 @@
               <a:buAutoNum type="arabicPeriod"/>
             </a:pPr>
             <a:r>
-              <a:rPr lang="de-DE" dirty="0" smtClean="0"/>
+              <a:rPr lang="de-DE" dirty="0" smtClean="0">
+                <a:latin typeface="Kozuka Gothic Pro L" pitchFamily="34" charset="-128"/>
+                <a:ea typeface="Kozuka Gothic Pro L" pitchFamily="34" charset="-128"/>
+              </a:rPr>
               <a:t>Deployment</a:t>
             </a:r>
           </a:p>
@@ -3427,7 +4067,10 @@
               <a:buAutoNum type="arabicPeriod"/>
             </a:pPr>
             <a:r>
-              <a:rPr lang="de-DE" dirty="0" smtClean="0"/>
+              <a:rPr lang="de-DE" dirty="0" smtClean="0">
+                <a:latin typeface="Kozuka Gothic Pro L" pitchFamily="34" charset="-128"/>
+                <a:ea typeface="Kozuka Gothic Pro L" pitchFamily="34" charset="-128"/>
+              </a:rPr>
               <a:t>Testing</a:t>
             </a:r>
           </a:p>
@@ -3437,7 +4080,10 @@
               <a:buAutoNum type="arabicPeriod"/>
             </a:pPr>
             <a:r>
-              <a:rPr lang="de-DE" dirty="0" smtClean="0"/>
+              <a:rPr lang="de-DE" dirty="0" smtClean="0">
+                <a:latin typeface="Kozuka Gothic Pro L" pitchFamily="34" charset="-128"/>
+                <a:ea typeface="Kozuka Gothic Pro L" pitchFamily="34" charset="-128"/>
+              </a:rPr>
               <a:t>Vollständige Dokumentation</a:t>
             </a:r>
           </a:p>
@@ -3445,28 +4091,94 @@
             <a:pPr marL="514350" indent="-514350">
               <a:buNone/>
             </a:pPr>
-            <a:endParaRPr lang="de-DE" dirty="0" smtClean="0"/>
+            <a:endParaRPr lang="de-DE" dirty="0" smtClean="0">
+              <a:latin typeface="Kozuka Gothic Pro L" pitchFamily="34" charset="-128"/>
+              <a:ea typeface="Kozuka Gothic Pro L" pitchFamily="34" charset="-128"/>
+            </a:endParaRPr>
           </a:p>
           <a:p>
             <a:pPr marL="514350" indent="-514350">
               <a:buNone/>
             </a:pPr>
-            <a:endParaRPr lang="de-DE" dirty="0" smtClean="0"/>
+            <a:endParaRPr lang="de-DE" dirty="0" smtClean="0">
+              <a:latin typeface="Kozuka Gothic Pro L" pitchFamily="34" charset="-128"/>
+              <a:ea typeface="Kozuka Gothic Pro L" pitchFamily="34" charset="-128"/>
+            </a:endParaRPr>
           </a:p>
           <a:p>
             <a:pPr marL="514350" indent="-514350">
               <a:buFont typeface="+mj-lt"/>
               <a:buAutoNum type="arabicPeriod"/>
             </a:pPr>
-            <a:endParaRPr lang="de-DE" dirty="0"/>
-          </a:p>
-        </p:txBody>
-      </p:sp>
+            <a:endParaRPr lang="de-DE" dirty="0">
+              <a:latin typeface="Kozuka Gothic Pro L" pitchFamily="34" charset="-128"/>
+              <a:ea typeface="Kozuka Gothic Pro L" pitchFamily="34" charset="-128"/>
+            </a:endParaRPr>
+          </a:p>
+        </p:txBody>
+      </p:sp>
+      <p:sp>
+        <p:nvSpPr>
+          <p:cNvPr id="6" name="Slide Number Placeholder 5"/>
+          <p:cNvSpPr>
+            <a:spLocks noGrp="1"/>
+          </p:cNvSpPr>
+          <p:nvPr>
+            <p:ph type="sldNum" sz="quarter" idx="12"/>
+          </p:nvPr>
+        </p:nvSpPr>
+        <p:spPr/>
+        <p:txBody>
+          <a:bodyPr/>
+          <a:lstStyle/>
+          <a:p>
+            <a:fld id="{785AF671-EB06-4FE0-B603-5597A3A057FF}" type="slidenum">
+              <a:rPr lang="de-DE" sz="1600" b="1" smtClean="0"/>
+              <a:pPr/>
+              <a:t>3</a:t>
+            </a:fld>
+            <a:endParaRPr lang="de-DE" sz="1600" b="1" dirty="0"/>
+          </a:p>
+        </p:txBody>
+      </p:sp>
+      <p:pic>
+        <p:nvPicPr>
+          <p:cNvPr id="8" name="Picture 2" descr="D:\Documents\Dropbox\E-Health SS19\Bilder\Logo-spiegel.png"/>
+          <p:cNvPicPr>
+            <a:picLocks noChangeAspect="1" noChangeArrowheads="1"/>
+          </p:cNvPicPr>
+          <p:nvPr/>
+        </p:nvPicPr>
+        <p:blipFill>
+          <a:blip r:embed="rId2" cstate="print"/>
+          <a:srcRect/>
+          <a:stretch>
+            <a:fillRect/>
+          </a:stretch>
+        </p:blipFill>
+        <p:spPr bwMode="auto">
+          <a:xfrm>
+            <a:off x="71406" y="5715016"/>
+            <a:ext cx="1143008" cy="1143008"/>
+          </a:xfrm>
+          <a:prstGeom prst="rect">
+            <a:avLst/>
+          </a:prstGeom>
+          <a:noFill/>
+        </p:spPr>
+      </p:pic>
     </p:spTree>
   </p:cSld>
   <p:clrMapOvr>
     <a:masterClrMapping/>
   </p:clrMapOvr>
+  <p:timing>
+    <p:tnLst>
+      <p:par>
+        <p:cTn id="1" dur="indefinite" restart="never" nodeType="tmRoot"/>
+      </p:par>
+    </p:tnLst>
+  </p:timing>
 </p:sld>
 </file>
 
@@ -3503,10 +4215,30 @@
           <a:lstStyle/>
           <a:p>
             <a:r>
-              <a:rPr lang="de-DE" dirty="0" smtClean="0"/>
-              <a:t>Gab es Probleme?</a:t>
-            </a:r>
-            <a:endParaRPr lang="de-DE" dirty="0"/>
+              <a:rPr lang="de-DE" b="1" dirty="0" smtClean="0">
+                <a:latin typeface="Kozuka Gothic Pro L" pitchFamily="34" charset="-128"/>
+                <a:ea typeface="Kozuka Gothic Pro L" pitchFamily="34" charset="-128"/>
+              </a:rPr>
+              <a:t>„Gab </a:t>
+            </a:r>
+            <a:r>
+              <a:rPr lang="de-DE" b="1" dirty="0" smtClean="0">
+                <a:latin typeface="Kozuka Gothic Pro L" pitchFamily="34" charset="-128"/>
+                <a:ea typeface="Kozuka Gothic Pro L" pitchFamily="34" charset="-128"/>
+              </a:rPr>
+              <a:t>es Probleme</a:t>
+            </a:r>
+            <a:r>
+              <a:rPr lang="de-DE" b="1" dirty="0" smtClean="0">
+                <a:latin typeface="Kozuka Gothic Pro L" pitchFamily="34" charset="-128"/>
+                <a:ea typeface="Kozuka Gothic Pro L" pitchFamily="34" charset="-128"/>
+              </a:rPr>
+              <a:t>?“</a:t>
+            </a:r>
+            <a:endParaRPr lang="de-DE" b="1" dirty="0">
+              <a:latin typeface="Kozuka Gothic Pro L" pitchFamily="34" charset="-128"/>
+              <a:ea typeface="Kozuka Gothic Pro L" pitchFamily="34" charset="-128"/>
+            </a:endParaRPr>
           </a:p>
         </p:txBody>
       </p:sp>
@@ -3536,7 +4268,13 @@
               <a:buNone/>
             </a:pPr>
             <a:r>
-              <a:rPr lang="de-DE" b="1" dirty="0" smtClean="0"/>
+              <a:rPr lang="de-DE" b="1" dirty="0" smtClean="0">
+                <a:solidFill>
+                  <a:srgbClr val="C00000"/>
+                </a:solidFill>
+                <a:latin typeface="Kozuka Gothic Pro L" pitchFamily="34" charset="-128"/>
+                <a:ea typeface="Kozuka Gothic Pro L" pitchFamily="34" charset="-128"/>
+              </a:rPr>
               <a:t>Probleme:</a:t>
             </a:r>
           </a:p>
@@ -3546,7 +4284,10 @@
               <a:buAutoNum type="arabicPeriod"/>
             </a:pPr>
             <a:r>
-              <a:rPr lang="de-DE" dirty="0" smtClean="0"/>
+              <a:rPr lang="de-DE" dirty="0" smtClean="0">
+                <a:latin typeface="Kozuka Gothic Pro L" pitchFamily="34" charset="-128"/>
+                <a:ea typeface="Kozuka Gothic Pro L" pitchFamily="34" charset="-128"/>
+              </a:rPr>
               <a:t>Zeitprobleme, da andere Projekte nebenbei am laufen waren</a:t>
             </a:r>
           </a:p>
@@ -3555,12 +4296,14 @@
               <a:buNone/>
             </a:pPr>
             <a:r>
-              <a:rPr lang="de-DE" b="1" dirty="0" smtClean="0"/>
-              <a:t>Lösung</a:t>
-            </a:r>
-            <a:r>
-              <a:rPr lang="de-DE" b="1" dirty="0" smtClean="0"/>
-              <a:t>:</a:t>
+              <a:rPr lang="de-DE" b="1" dirty="0" smtClean="0">
+                <a:solidFill>
+                  <a:srgbClr val="075E45"/>
+                </a:solidFill>
+                <a:latin typeface="Kozuka Gothic Pro L" pitchFamily="34" charset="-128"/>
+                <a:ea typeface="Kozuka Gothic Pro L" pitchFamily="34" charset="-128"/>
+              </a:rPr>
+              <a:t>Lösung:</a:t>
             </a:r>
           </a:p>
           <a:p>
@@ -3569,18 +4312,81 @@
               <a:buAutoNum type="arabicPeriod"/>
             </a:pPr>
             <a:r>
-              <a:rPr lang="de-DE" dirty="0" smtClean="0"/>
+              <a:rPr lang="de-DE" dirty="0" smtClean="0">
+                <a:latin typeface="Kozuka Gothic Pro L" pitchFamily="34" charset="-128"/>
+                <a:ea typeface="Kozuka Gothic Pro L" pitchFamily="34" charset="-128"/>
+              </a:rPr>
               <a:t>Zeitpuffer verwendet und manche Funktionen später implementiert -&gt; Aufgaben nach hinten verschoben</a:t>
             </a:r>
-            <a:endParaRPr lang="de-DE" dirty="0"/>
-          </a:p>
-        </p:txBody>
-      </p:sp>
+            <a:endParaRPr lang="de-DE" dirty="0">
+              <a:latin typeface="Kozuka Gothic Pro L" pitchFamily="34" charset="-128"/>
+              <a:ea typeface="Kozuka Gothic Pro L" pitchFamily="34" charset="-128"/>
+            </a:endParaRPr>
+          </a:p>
+        </p:txBody>
+      </p:sp>
+      <p:sp>
+        <p:nvSpPr>
+          <p:cNvPr id="6" name="Slide Number Placeholder 5"/>
+          <p:cNvSpPr>
+            <a:spLocks noGrp="1"/>
+          </p:cNvSpPr>
+          <p:nvPr>
+            <p:ph type="sldNum" sz="quarter" idx="12"/>
+          </p:nvPr>
+        </p:nvSpPr>
+        <p:spPr/>
+        <p:txBody>
+          <a:bodyPr/>
+          <a:lstStyle/>
+          <a:p>
+            <a:fld id="{785AF671-EB06-4FE0-B603-5597A3A057FF}" type="slidenum">
+              <a:rPr lang="de-DE" sz="1600" b="1" smtClean="0"/>
+              <a:pPr/>
+              <a:t>4</a:t>
+            </a:fld>
+            <a:endParaRPr lang="de-DE" sz="1600" b="1" dirty="0"/>
+          </a:p>
+        </p:txBody>
+      </p:sp>
+      <p:pic>
+        <p:nvPicPr>
+          <p:cNvPr id="8" name="Picture 2" descr="D:\Documents\Dropbox\E-Health SS19\Bilder\Logo-spiegel.png"/>
+          <p:cNvPicPr>
+            <a:picLocks noChangeAspect="1" noChangeArrowheads="1"/>
+          </p:cNvPicPr>
+          <p:nvPr/>
+        </p:nvPicPr>
+        <p:blipFill>
+          <a:blip r:embed="rId2" cstate="print"/>
+          <a:srcRect/>
+          <a:stretch>
+            <a:fillRect/>
+          </a:stretch>
+        </p:blipFill>
+        <p:spPr bwMode="auto">
+          <a:xfrm>
+            <a:off x="71406" y="5715016"/>
+            <a:ext cx="1143008" cy="1143008"/>
+          </a:xfrm>
+          <a:prstGeom prst="rect">
+            <a:avLst/>
+          </a:prstGeom>
+          <a:noFill/>
+        </p:spPr>
+      </p:pic>
     </p:spTree>
   </p:cSld>
   <p:clrMapOvr>
     <a:masterClrMapping/>
   </p:clrMapOvr>
+  <p:timing>
+    <p:tnLst>
+      <p:par>
+        <p:cTn id="1" dur="indefinite" restart="never" nodeType="tmRoot"/>
+      </p:par>
+    </p:tnLst>
+  </p:timing>
 </p:sld>
 </file>
 
@@ -3617,10 +4423,16 @@
           <a:lstStyle/>
           <a:p>
             <a:r>
-              <a:rPr lang="de-DE" dirty="0" smtClean="0"/>
-              <a:t>Was sind die nächsten Schritte?</a:t>
-            </a:r>
-            <a:endParaRPr lang="de-DE" dirty="0"/>
+              <a:rPr lang="de-DE" b="1" dirty="0" smtClean="0">
+                <a:latin typeface="Kozuka Gothic Pro L" pitchFamily="34" charset="-128"/>
+                <a:ea typeface="Kozuka Gothic Pro L" pitchFamily="34" charset="-128"/>
+              </a:rPr>
+              <a:t>„Sind Risiken eingetreten?“</a:t>
+            </a:r>
+            <a:endParaRPr lang="de-DE" b="1" dirty="0">
+              <a:latin typeface="Kozuka Gothic Pro L" pitchFamily="34" charset="-128"/>
+              <a:ea typeface="Kozuka Gothic Pro L" pitchFamily="34" charset="-128"/>
+            </a:endParaRPr>
           </a:p>
         </p:txBody>
       </p:sp>
@@ -3634,14 +4446,19 @@
             <p:ph idx="1"/>
           </p:nvPr>
         </p:nvSpPr>
-        <p:spPr/>
+        <p:spPr>
+          <a:xfrm>
+            <a:off x="285720" y="2214554"/>
+            <a:ext cx="8643998" cy="2257428"/>
+          </a:xfrm>
+        </p:spPr>
         <p:txBody>
           <a:bodyPr>
-            <a:normAutofit fontScale="92500" lnSpcReduction="10000"/>
+            <a:normAutofit/>
           </a:bodyPr>
           <a:lstStyle/>
           <a:p>
-            <a:pPr marL="514350" indent="-514350">
+            <a:pPr>
               <a:buNone/>
             </a:pPr>
             <a:r>
@@ -3649,72 +4466,156 @@
                 <a:solidFill>
                   <a:srgbClr val="C00000"/>
                 </a:solidFill>
-              </a:rPr>
-              <a:t>Priorität 1:</a:t>
-            </a:r>
-          </a:p>
-          <a:p>
-            <a:pPr marL="514350" indent="-514350"/>
-            <a:r>
-              <a:rPr lang="de-DE" dirty="0" smtClean="0"/>
-              <a:t>Restliche Client JS Funktionen fertig implementieren</a:t>
-            </a:r>
-          </a:p>
-          <a:p>
-            <a:pPr marL="514350" indent="-514350"/>
-            <a:r>
-              <a:rPr lang="de-DE" dirty="0" smtClean="0"/>
-              <a:t>HTTPS Implementierung bei Webserver</a:t>
-            </a:r>
-          </a:p>
-          <a:p>
-            <a:pPr marL="514350" indent="-514350"/>
-            <a:r>
-              <a:rPr lang="de-DE" dirty="0" smtClean="0"/>
-              <a:t>Datenbank</a:t>
-            </a:r>
-          </a:p>
-          <a:p>
-            <a:pPr marL="514350" indent="-514350">
+                <a:latin typeface="Kozuka Gothic Pro L" pitchFamily="34" charset="-128"/>
+                <a:ea typeface="Kozuka Gothic Pro L" pitchFamily="34" charset="-128"/>
+              </a:rPr>
+              <a:t>Risiko #4 </a:t>
+            </a:r>
+            <a:r>
+              <a:rPr lang="de-DE" dirty="0" smtClean="0">
+                <a:latin typeface="Kozuka Gothic Pro L" pitchFamily="34" charset="-128"/>
+                <a:ea typeface="Kozuka Gothic Pro L" pitchFamily="34" charset="-128"/>
+              </a:rPr>
+              <a:t>ist aufgetreten:</a:t>
+            </a:r>
+          </a:p>
+          <a:p>
+            <a:pPr>
               <a:buNone/>
             </a:pPr>
             <a:r>
+              <a:rPr lang="de-DE" dirty="0" smtClean="0">
+                <a:latin typeface="Kozuka Gothic Pro L" pitchFamily="34" charset="-128"/>
+                <a:ea typeface="Kozuka Gothic Pro L" pitchFamily="34" charset="-128"/>
+              </a:rPr>
+              <a:t>       </a:t>
+            </a:r>
+            <a:r>
               <a:rPr lang="de-DE" b="1" dirty="0" smtClean="0">
-                <a:solidFill>
-                  <a:schemeClr val="accent6">
-                    <a:lumMod val="50000"/>
-                  </a:schemeClr>
-                </a:solidFill>
-              </a:rPr>
-              <a:t>Priorität 2:</a:t>
-            </a:r>
-          </a:p>
-          <a:p>
-            <a:pPr marL="514350" indent="-514350"/>
-            <a:r>
-              <a:rPr lang="de-DE" dirty="0" smtClean="0"/>
-              <a:t>Verbindung Datenbank und Webserver</a:t>
-            </a:r>
-          </a:p>
-          <a:p>
-            <a:pPr marL="514350" indent="-514350"/>
-            <a:r>
-              <a:rPr lang="de-DE" dirty="0" smtClean="0"/>
-              <a:t>Testing</a:t>
-            </a:r>
-          </a:p>
-          <a:p>
-            <a:pPr marL="514350" indent="-514350"/>
-            <a:r>
-              <a:rPr lang="de-DE" dirty="0" smtClean="0"/>
-              <a:t>Deployment</a:t>
-            </a:r>
-          </a:p>
-          <a:p>
-            <a:pPr marL="514350" indent="-514350">
+                <a:latin typeface="Kozuka Gothic Pro L" pitchFamily="34" charset="-128"/>
+                <a:ea typeface="Kozuka Gothic Pro L" pitchFamily="34" charset="-128"/>
+              </a:rPr>
+              <a:t>falsche Zeitplanung</a:t>
+            </a:r>
+          </a:p>
+          <a:p>
+            <a:pPr>
               <a:buNone/>
             </a:pPr>
-            <a:endParaRPr lang="de-DE" dirty="0"/>
+            <a:r>
+              <a:rPr lang="de-DE" dirty="0" smtClean="0">
+                <a:latin typeface="Kozuka Gothic Pro L" pitchFamily="34" charset="-128"/>
+                <a:ea typeface="Kozuka Gothic Pro L" pitchFamily="34" charset="-128"/>
+              </a:rPr>
+              <a:t>Wahrscheinlichkeit des Auftretens: </a:t>
+            </a:r>
+            <a:r>
+              <a:rPr lang="de-DE" b="1" dirty="0" smtClean="0">
+                <a:latin typeface="Kozuka Gothic Pro L" pitchFamily="34" charset="-128"/>
+                <a:ea typeface="Kozuka Gothic Pro L" pitchFamily="34" charset="-128"/>
+              </a:rPr>
+              <a:t>50%</a:t>
+            </a:r>
+            <a:endParaRPr lang="de-DE" b="1" dirty="0">
+              <a:latin typeface="Kozuka Gothic Pro L" pitchFamily="34" charset="-128"/>
+              <a:ea typeface="Kozuka Gothic Pro L" pitchFamily="34" charset="-128"/>
+            </a:endParaRPr>
+          </a:p>
+        </p:txBody>
+      </p:sp>
+      <p:sp>
+        <p:nvSpPr>
+          <p:cNvPr id="6" name="Slide Number Placeholder 5"/>
+          <p:cNvSpPr>
+            <a:spLocks noGrp="1"/>
+          </p:cNvSpPr>
+          <p:nvPr>
+            <p:ph type="sldNum" sz="quarter" idx="12"/>
+          </p:nvPr>
+        </p:nvSpPr>
+        <p:spPr/>
+        <p:txBody>
+          <a:bodyPr/>
+          <a:lstStyle/>
+          <a:p>
+            <a:fld id="{785AF671-EB06-4FE0-B603-5597A3A057FF}" type="slidenum">
+              <a:rPr lang="de-DE" sz="1600" b="1" smtClean="0"/>
+              <a:pPr/>
+              <a:t>5</a:t>
+            </a:fld>
+            <a:endParaRPr lang="de-DE" sz="1600" b="1" dirty="0"/>
+          </a:p>
+        </p:txBody>
+      </p:sp>
+      <p:pic>
+        <p:nvPicPr>
+          <p:cNvPr id="8" name="Picture 2" descr="D:\Documents\Dropbox\E-Health SS19\Bilder\Logo-spiegel.png"/>
+          <p:cNvPicPr>
+            <a:picLocks noChangeAspect="1" noChangeArrowheads="1"/>
+          </p:cNvPicPr>
+          <p:nvPr/>
+        </p:nvPicPr>
+        <p:blipFill>
+          <a:blip r:embed="rId2" cstate="print"/>
+          <a:srcRect/>
+          <a:stretch>
+            <a:fillRect/>
+          </a:stretch>
+        </p:blipFill>
+        <p:spPr bwMode="auto">
+          <a:xfrm>
+            <a:off x="71406" y="5715016"/>
+            <a:ext cx="1143008" cy="1143008"/>
+          </a:xfrm>
+          <a:prstGeom prst="rect">
+            <a:avLst/>
+          </a:prstGeom>
+          <a:noFill/>
+        </p:spPr>
+      </p:pic>
+      <p:sp>
+        <p:nvSpPr>
+          <p:cNvPr id="7" name="Right Arrow 6"/>
+          <p:cNvSpPr/>
+          <p:nvPr/>
+        </p:nvSpPr>
+        <p:spPr>
+          <a:xfrm>
+            <a:off x="285720" y="2857496"/>
+            <a:ext cx="642942" cy="436169"/>
+          </a:xfrm>
+          <a:prstGeom prst="rightArrow">
+            <a:avLst/>
+          </a:prstGeom>
+          <a:noFill/>
+          <a:ln w="38100">
+            <a:solidFill>
+              <a:srgbClr val="075E45"/>
+            </a:solidFill>
+          </a:ln>
+        </p:spPr>
+        <p:style>
+          <a:lnRef idx="2">
+            <a:schemeClr val="accent1">
+              <a:shade val="50000"/>
+            </a:schemeClr>
+          </a:lnRef>
+          <a:fillRef idx="1">
+            <a:schemeClr val="accent1"/>
+          </a:fillRef>
+          <a:effectRef idx="0">
+            <a:schemeClr val="accent1"/>
+          </a:effectRef>
+          <a:fontRef idx="minor">
+            <a:schemeClr val="lt1"/>
+          </a:fontRef>
+        </p:style>
+        <p:txBody>
+          <a:bodyPr rtlCol="0" anchor="ctr"/>
+          <a:lstStyle/>
+          <a:p>
+            <a:pPr algn="ctr"/>
+            <a:endParaRPr lang="de-DE"/>
           </a:p>
         </p:txBody>
       </p:sp>
@@ -3723,6 +4624,526 @@
   <p:clrMapOvr>
     <a:masterClrMapping/>
   </p:clrMapOvr>
+  <p:timing>
+    <p:tnLst>
+      <p:par>
+        <p:cTn id="1" dur="indefinite" restart="never" nodeType="tmRoot"/>
+      </p:par>
+    </p:tnLst>
+  </p:timing>
+</p:sld>
+</file>
+
+<file path=ppt/slides/slide6.xml><?xml version="1.0" encoding="utf-8"?>
+<p:sld xmlns:a="http://schemas.openxmlformats.org/drawingml/2006/main" xmlns:r="http://schemas.openxmlformats.org/officeDocument/2006/relationships" xmlns:p="http://schemas.openxmlformats.org/presentationml/2006/main">
+  <p:cSld>
+    <p:spTree>
+      <p:nvGrpSpPr>
+        <p:cNvPr id="1" name=""/>
+        <p:cNvGrpSpPr/>
+        <p:nvPr/>
+      </p:nvGrpSpPr>
+      <p:grpSpPr>
+        <a:xfrm>
+          <a:off x="0" y="0"/>
+          <a:ext cx="0" cy="0"/>
+          <a:chOff x="0" y="0"/>
+          <a:chExt cx="0" cy="0"/>
+        </a:xfrm>
+      </p:grpSpPr>
+      <p:sp>
+        <p:nvSpPr>
+          <p:cNvPr id="2" name="Title 1"/>
+          <p:cNvSpPr>
+            <a:spLocks noGrp="1"/>
+          </p:cNvSpPr>
+          <p:nvPr>
+            <p:ph type="title"/>
+          </p:nvPr>
+        </p:nvSpPr>
+        <p:spPr/>
+        <p:txBody>
+          <a:bodyPr>
+            <a:normAutofit fontScale="90000"/>
+          </a:bodyPr>
+          <a:lstStyle/>
+          <a:p>
+            <a:r>
+              <a:rPr lang="de-DE" b="1" dirty="0" smtClean="0">
+                <a:latin typeface="Kozuka Gothic Pro L" pitchFamily="34" charset="-128"/>
+                <a:ea typeface="Kozuka Gothic Pro L" pitchFamily="34" charset="-128"/>
+              </a:rPr>
+              <a:t>„Was wird momentan umgesetzt?“</a:t>
+            </a:r>
+            <a:endParaRPr lang="de-DE" b="1" dirty="0">
+              <a:latin typeface="Kozuka Gothic Pro L" pitchFamily="34" charset="-128"/>
+              <a:ea typeface="Kozuka Gothic Pro L" pitchFamily="34" charset="-128"/>
+            </a:endParaRPr>
+          </a:p>
+        </p:txBody>
+      </p:sp>
+      <p:sp>
+        <p:nvSpPr>
+          <p:cNvPr id="3" name="Content Placeholder 2"/>
+          <p:cNvSpPr>
+            <a:spLocks noGrp="1"/>
+          </p:cNvSpPr>
+          <p:nvPr>
+            <p:ph idx="1"/>
+          </p:nvPr>
+        </p:nvSpPr>
+        <p:spPr>
+          <a:xfrm>
+            <a:off x="285720" y="1600200"/>
+            <a:ext cx="8643998" cy="4525963"/>
+          </a:xfrm>
+        </p:spPr>
+        <p:txBody>
+          <a:bodyPr>
+            <a:normAutofit/>
+          </a:bodyPr>
+          <a:lstStyle/>
+          <a:p>
+            <a:pPr marL="514350" indent="-514350">
+              <a:buAutoNum type="arabicPeriod"/>
+            </a:pPr>
+            <a:r>
+              <a:rPr lang="de-DE" dirty="0" smtClean="0">
+                <a:latin typeface="Kozuka Gothic Pro L" pitchFamily="34" charset="-128"/>
+                <a:ea typeface="Kozuka Gothic Pro L" pitchFamily="34" charset="-128"/>
+              </a:rPr>
+              <a:t>Datenbank</a:t>
+            </a:r>
+          </a:p>
+          <a:p>
+            <a:pPr marL="514350" indent="-514350">
+              <a:buAutoNum type="arabicPeriod"/>
+            </a:pPr>
+            <a:r>
+              <a:rPr lang="de-DE" dirty="0" smtClean="0">
+                <a:latin typeface="Kozuka Gothic Pro L" pitchFamily="34" charset="-128"/>
+                <a:ea typeface="Kozuka Gothic Pro L" pitchFamily="34" charset="-128"/>
+              </a:rPr>
+              <a:t>Client JS</a:t>
+            </a:r>
+          </a:p>
+          <a:p>
+            <a:pPr marL="514350" indent="-514350">
+              <a:buAutoNum type="arabicPeriod"/>
+            </a:pPr>
+            <a:r>
+              <a:rPr lang="de-DE" dirty="0" smtClean="0">
+                <a:latin typeface="Kozuka Gothic Pro L" pitchFamily="34" charset="-128"/>
+                <a:ea typeface="Kozuka Gothic Pro L" pitchFamily="34" charset="-128"/>
+              </a:rPr>
+              <a:t>Dokumentation</a:t>
+            </a:r>
+          </a:p>
+        </p:txBody>
+      </p:sp>
+      <p:sp>
+        <p:nvSpPr>
+          <p:cNvPr id="6" name="Slide Number Placeholder 5"/>
+          <p:cNvSpPr>
+            <a:spLocks noGrp="1"/>
+          </p:cNvSpPr>
+          <p:nvPr>
+            <p:ph type="sldNum" sz="quarter" idx="12"/>
+          </p:nvPr>
+        </p:nvSpPr>
+        <p:spPr/>
+        <p:txBody>
+          <a:bodyPr/>
+          <a:lstStyle/>
+          <a:p>
+            <a:fld id="{785AF671-EB06-4FE0-B603-5597A3A057FF}" type="slidenum">
+              <a:rPr lang="de-DE" sz="1600" b="1" smtClean="0"/>
+              <a:pPr/>
+              <a:t>6</a:t>
+            </a:fld>
+            <a:endParaRPr lang="de-DE" sz="1600" b="1" dirty="0"/>
+          </a:p>
+        </p:txBody>
+      </p:sp>
+      <p:pic>
+        <p:nvPicPr>
+          <p:cNvPr id="8" name="Picture 2" descr="D:\Documents\Dropbox\E-Health SS19\Bilder\Logo-spiegel.png"/>
+          <p:cNvPicPr>
+            <a:picLocks noChangeAspect="1" noChangeArrowheads="1"/>
+          </p:cNvPicPr>
+          <p:nvPr/>
+        </p:nvPicPr>
+        <p:blipFill>
+          <a:blip r:embed="rId2" cstate="print"/>
+          <a:srcRect/>
+          <a:stretch>
+            <a:fillRect/>
+          </a:stretch>
+        </p:blipFill>
+        <p:spPr bwMode="auto">
+          <a:xfrm>
+            <a:off x="71406" y="5715016"/>
+            <a:ext cx="1143008" cy="1143008"/>
+          </a:xfrm>
+          <a:prstGeom prst="rect">
+            <a:avLst/>
+          </a:prstGeom>
+          <a:noFill/>
+        </p:spPr>
+      </p:pic>
+    </p:spTree>
+  </p:cSld>
+  <p:clrMapOvr>
+    <a:masterClrMapping/>
+  </p:clrMapOvr>
+</p:sld>
+</file>
+
+<file path=ppt/slides/slide7.xml><?xml version="1.0" encoding="utf-8"?>
+<p:sld xmlns:a="http://schemas.openxmlformats.org/drawingml/2006/main" xmlns:r="http://schemas.openxmlformats.org/officeDocument/2006/relationships" xmlns:p="http://schemas.openxmlformats.org/presentationml/2006/main">
+  <p:cSld>
+    <p:spTree>
+      <p:nvGrpSpPr>
+        <p:cNvPr id="1" name=""/>
+        <p:cNvGrpSpPr/>
+        <p:nvPr/>
+      </p:nvGrpSpPr>
+      <p:grpSpPr>
+        <a:xfrm>
+          <a:off x="0" y="0"/>
+          <a:ext cx="0" cy="0"/>
+          <a:chOff x="0" y="0"/>
+          <a:chExt cx="0" cy="0"/>
+        </a:xfrm>
+      </p:grpSpPr>
+      <p:sp>
+        <p:nvSpPr>
+          <p:cNvPr id="2" name="Title 1"/>
+          <p:cNvSpPr>
+            <a:spLocks noGrp="1"/>
+          </p:cNvSpPr>
+          <p:nvPr>
+            <p:ph type="title"/>
+          </p:nvPr>
+        </p:nvSpPr>
+        <p:spPr/>
+        <p:txBody>
+          <a:bodyPr>
+            <a:normAutofit fontScale="90000"/>
+          </a:bodyPr>
+          <a:lstStyle/>
+          <a:p>
+            <a:r>
+              <a:rPr lang="de-DE" b="1" dirty="0" smtClean="0">
+                <a:latin typeface="Kozuka Gothic Pro L" pitchFamily="34" charset="-128"/>
+                <a:ea typeface="Kozuka Gothic Pro L" pitchFamily="34" charset="-128"/>
+              </a:rPr>
+              <a:t>„Was </a:t>
+            </a:r>
+            <a:r>
+              <a:rPr lang="de-DE" b="1" dirty="0" smtClean="0">
+                <a:latin typeface="Kozuka Gothic Pro L" pitchFamily="34" charset="-128"/>
+                <a:ea typeface="Kozuka Gothic Pro L" pitchFamily="34" charset="-128"/>
+              </a:rPr>
+              <a:t>sind die nächsten Schritte</a:t>
+            </a:r>
+            <a:r>
+              <a:rPr lang="de-DE" b="1" dirty="0" smtClean="0">
+                <a:latin typeface="Kozuka Gothic Pro L" pitchFamily="34" charset="-128"/>
+                <a:ea typeface="Kozuka Gothic Pro L" pitchFamily="34" charset="-128"/>
+              </a:rPr>
+              <a:t>?“</a:t>
+            </a:r>
+            <a:endParaRPr lang="de-DE" b="1" dirty="0">
+              <a:latin typeface="Kozuka Gothic Pro L" pitchFamily="34" charset="-128"/>
+              <a:ea typeface="Kozuka Gothic Pro L" pitchFamily="34" charset="-128"/>
+            </a:endParaRPr>
+          </a:p>
+        </p:txBody>
+      </p:sp>
+      <p:sp>
+        <p:nvSpPr>
+          <p:cNvPr id="3" name="Content Placeholder 2"/>
+          <p:cNvSpPr>
+            <a:spLocks noGrp="1"/>
+          </p:cNvSpPr>
+          <p:nvPr>
+            <p:ph idx="1"/>
+          </p:nvPr>
+        </p:nvSpPr>
+        <p:spPr/>
+        <p:txBody>
+          <a:bodyPr>
+            <a:normAutofit fontScale="92500" lnSpcReduction="10000"/>
+          </a:bodyPr>
+          <a:lstStyle/>
+          <a:p>
+            <a:pPr marL="514350" indent="-514350">
+              <a:buNone/>
+            </a:pPr>
+            <a:r>
+              <a:rPr lang="de-DE" sz="3000" b="1" dirty="0" smtClean="0">
+                <a:solidFill>
+                  <a:srgbClr val="C00000"/>
+                </a:solidFill>
+                <a:latin typeface="Kozuka Gothic Pro L" pitchFamily="34" charset="-128"/>
+                <a:ea typeface="Kozuka Gothic Pro L" pitchFamily="34" charset="-128"/>
+              </a:rPr>
+              <a:t>Priorität 1:</a:t>
+            </a:r>
+          </a:p>
+          <a:p>
+            <a:pPr marL="514350" indent="-514350"/>
+            <a:r>
+              <a:rPr lang="de-DE" sz="3000" dirty="0" smtClean="0">
+                <a:latin typeface="Kozuka Gothic Pro L" pitchFamily="34" charset="-128"/>
+                <a:ea typeface="Kozuka Gothic Pro L" pitchFamily="34" charset="-128"/>
+              </a:rPr>
+              <a:t>Restliche Client JS Funktionen fertig implementieren</a:t>
+            </a:r>
+          </a:p>
+          <a:p>
+            <a:pPr marL="514350" indent="-514350"/>
+            <a:r>
+              <a:rPr lang="de-DE" sz="3000" dirty="0" smtClean="0">
+                <a:latin typeface="Kozuka Gothic Pro L" pitchFamily="34" charset="-128"/>
+                <a:ea typeface="Kozuka Gothic Pro L" pitchFamily="34" charset="-128"/>
+              </a:rPr>
+              <a:t>HTTPS Implementierung bei Webserver</a:t>
+            </a:r>
+          </a:p>
+          <a:p>
+            <a:pPr marL="514350" indent="-514350"/>
+            <a:r>
+              <a:rPr lang="de-DE" sz="3000" dirty="0" smtClean="0">
+                <a:latin typeface="Kozuka Gothic Pro L" pitchFamily="34" charset="-128"/>
+                <a:ea typeface="Kozuka Gothic Pro L" pitchFamily="34" charset="-128"/>
+              </a:rPr>
+              <a:t>Datenbank</a:t>
+            </a:r>
+          </a:p>
+          <a:p>
+            <a:pPr marL="514350" indent="-514350">
+              <a:buNone/>
+            </a:pPr>
+            <a:r>
+              <a:rPr lang="de-DE" sz="3000" b="1" dirty="0" smtClean="0">
+                <a:solidFill>
+                  <a:srgbClr val="075E45"/>
+                </a:solidFill>
+                <a:latin typeface="Kozuka Gothic Pro L" pitchFamily="34" charset="-128"/>
+                <a:ea typeface="Kozuka Gothic Pro L" pitchFamily="34" charset="-128"/>
+              </a:rPr>
+              <a:t>Priorität 2:</a:t>
+            </a:r>
+          </a:p>
+          <a:p>
+            <a:pPr marL="514350" indent="-514350"/>
+            <a:r>
+              <a:rPr lang="de-DE" sz="3000" dirty="0" smtClean="0">
+                <a:latin typeface="Kozuka Gothic Pro L" pitchFamily="34" charset="-128"/>
+                <a:ea typeface="Kozuka Gothic Pro L" pitchFamily="34" charset="-128"/>
+              </a:rPr>
+              <a:t>Verbindung Datenbank und Webserver</a:t>
+            </a:r>
+          </a:p>
+          <a:p>
+            <a:pPr marL="514350" indent="-514350"/>
+            <a:r>
+              <a:rPr lang="de-DE" sz="3000" dirty="0" smtClean="0">
+                <a:latin typeface="Kozuka Gothic Pro L" pitchFamily="34" charset="-128"/>
+                <a:ea typeface="Kozuka Gothic Pro L" pitchFamily="34" charset="-128"/>
+              </a:rPr>
+              <a:t>Testing</a:t>
+            </a:r>
+          </a:p>
+          <a:p>
+            <a:pPr marL="514350" indent="-514350"/>
+            <a:r>
+              <a:rPr lang="de-DE" sz="3000" dirty="0" smtClean="0">
+                <a:latin typeface="Kozuka Gothic Pro L" pitchFamily="34" charset="-128"/>
+                <a:ea typeface="Kozuka Gothic Pro L" pitchFamily="34" charset="-128"/>
+              </a:rPr>
+              <a:t>Deployment</a:t>
+            </a:r>
+            <a:endParaRPr lang="de-DE" sz="3000" dirty="0" smtClean="0">
+              <a:latin typeface="Kozuka Gothic Pro L" pitchFamily="34" charset="-128"/>
+              <a:ea typeface="Kozuka Gothic Pro L" pitchFamily="34" charset="-128"/>
+            </a:endParaRPr>
+          </a:p>
+          <a:p>
+            <a:pPr marL="514350" indent="-514350">
+              <a:buNone/>
+            </a:pPr>
+            <a:endParaRPr lang="de-DE" dirty="0"/>
+          </a:p>
+        </p:txBody>
+      </p:sp>
+      <p:pic>
+        <p:nvPicPr>
+          <p:cNvPr id="3074" name="Picture 2" descr="D:\Documents\Dropbox\E-Health SS19\Bilder\Logo-spiegel.png"/>
+          <p:cNvPicPr>
+            <a:picLocks noChangeAspect="1" noChangeArrowheads="1"/>
+          </p:cNvPicPr>
+          <p:nvPr/>
+        </p:nvPicPr>
+        <p:blipFill>
+          <a:blip r:embed="rId2" cstate="print"/>
+          <a:srcRect/>
+          <a:stretch>
+            <a:fillRect/>
+          </a:stretch>
+        </p:blipFill>
+        <p:spPr bwMode="auto">
+          <a:xfrm>
+            <a:off x="71406" y="5715016"/>
+            <a:ext cx="1143008" cy="1143008"/>
+          </a:xfrm>
+          <a:prstGeom prst="rect">
+            <a:avLst/>
+          </a:prstGeom>
+          <a:noFill/>
+        </p:spPr>
+      </p:pic>
+      <p:sp>
+        <p:nvSpPr>
+          <p:cNvPr id="9" name="Slide Number Placeholder 8"/>
+          <p:cNvSpPr>
+            <a:spLocks noGrp="1"/>
+          </p:cNvSpPr>
+          <p:nvPr>
+            <p:ph type="sldNum" sz="quarter" idx="12"/>
+          </p:nvPr>
+        </p:nvSpPr>
+        <p:spPr/>
+        <p:txBody>
+          <a:bodyPr/>
+          <a:lstStyle/>
+          <a:p>
+            <a:fld id="{785AF671-EB06-4FE0-B603-5597A3A057FF}" type="slidenum">
+              <a:rPr lang="de-DE" sz="1600" b="1" smtClean="0"/>
+              <a:pPr/>
+              <a:t>7</a:t>
+            </a:fld>
+            <a:endParaRPr lang="de-DE" sz="1600" b="1" dirty="0"/>
+          </a:p>
+        </p:txBody>
+      </p:sp>
+    </p:spTree>
+  </p:cSld>
+  <p:clrMapOvr>
+    <a:masterClrMapping/>
+  </p:clrMapOvr>
+  <p:timing>
+    <p:tnLst>
+      <p:par>
+        <p:cTn id="1" dur="indefinite" restart="never" nodeType="tmRoot"/>
+      </p:par>
+    </p:tnLst>
+  </p:timing>
+</p:sld>
+</file>
+
+<file path=ppt/slides/slide8.xml><?xml version="1.0" encoding="utf-8"?>
+<p:sld xmlns:a="http://schemas.openxmlformats.org/drawingml/2006/main" xmlns:r="http://schemas.openxmlformats.org/officeDocument/2006/relationships" xmlns:p="http://schemas.openxmlformats.org/presentationml/2006/main">
+  <p:cSld>
+    <p:spTree>
+      <p:nvGrpSpPr>
+        <p:cNvPr id="1" name=""/>
+        <p:cNvGrpSpPr/>
+        <p:nvPr/>
+      </p:nvGrpSpPr>
+      <p:grpSpPr>
+        <a:xfrm>
+          <a:off x="0" y="0"/>
+          <a:ext cx="0" cy="0"/>
+          <a:chOff x="0" y="0"/>
+          <a:chExt cx="0" cy="0"/>
+        </a:xfrm>
+      </p:grpSpPr>
+      <p:pic>
+        <p:nvPicPr>
+          <p:cNvPr id="4098" name="Picture 2" descr="D:\Documents\Dropbox\E-Health SS19\Bilder\hintergrund.jpg"/>
+          <p:cNvPicPr>
+            <a:picLocks noChangeAspect="1" noChangeArrowheads="1"/>
+          </p:cNvPicPr>
+          <p:nvPr/>
+        </p:nvPicPr>
+        <p:blipFill>
+          <a:blip r:embed="rId2" cstate="print"/>
+          <a:srcRect/>
+          <a:stretch>
+            <a:fillRect/>
+          </a:stretch>
+        </p:blipFill>
+        <p:spPr bwMode="auto">
+          <a:xfrm>
+            <a:off x="0" y="0"/>
+            <a:ext cx="9143999" cy="6858000"/>
+          </a:xfrm>
+          <a:prstGeom prst="rect">
+            <a:avLst/>
+          </a:prstGeom>
+          <a:noFill/>
+        </p:spPr>
+      </p:pic>
+      <p:sp>
+        <p:nvSpPr>
+          <p:cNvPr id="3" name="Content Placeholder 2"/>
+          <p:cNvSpPr>
+            <a:spLocks noGrp="1"/>
+          </p:cNvSpPr>
+          <p:nvPr>
+            <p:ph idx="1"/>
+          </p:nvPr>
+        </p:nvSpPr>
+        <p:spPr>
+          <a:xfrm>
+            <a:off x="3071802" y="4000504"/>
+            <a:ext cx="5214974" cy="1357322"/>
+          </a:xfrm>
+        </p:spPr>
+        <p:txBody>
+          <a:bodyPr>
+            <a:noAutofit/>
+          </a:bodyPr>
+          <a:lstStyle/>
+          <a:p>
+            <a:pPr marL="514350" indent="-514350" algn="ctr">
+              <a:buNone/>
+            </a:pPr>
+            <a:r>
+              <a:rPr lang="de-DE" b="1" dirty="0" smtClean="0">
+                <a:solidFill>
+                  <a:schemeClr val="bg1"/>
+                </a:solidFill>
+                <a:latin typeface="Kozuka Gothic Pro L" pitchFamily="34" charset="-128"/>
+                <a:ea typeface="Kozuka Gothic Pro L" pitchFamily="34" charset="-128"/>
+              </a:rPr>
+              <a:t>Danke Für Eure Aufmerksamkeit!</a:t>
+            </a:r>
+            <a:endParaRPr lang="de-DE" b="1" dirty="0">
+              <a:solidFill>
+                <a:schemeClr val="bg1"/>
+              </a:solidFill>
+              <a:latin typeface="Kozuka Gothic Pro L" pitchFamily="34" charset="-128"/>
+              <a:ea typeface="Kozuka Gothic Pro L" pitchFamily="34" charset="-128"/>
+            </a:endParaRPr>
+          </a:p>
+        </p:txBody>
+      </p:sp>
+    </p:spTree>
+  </p:cSld>
+  <p:clrMapOvr>
+    <a:masterClrMapping/>
+  </p:clrMapOvr>
+  <p:timing>
+    <p:tnLst>
+      <p:par>
+        <p:cTn id="1" dur="indefinite" restart="never" nodeType="tmRoot"/>
+      </p:par>
+    </p:tnLst>
+  </p:timing>
 </p:sld>
 </file>
 
@@ -4007,4 +5428,287 @@
   <a:objectDefaults/>
   <a:extraClrSchemeLst/>
 </a:theme>
+</file>
+
+<file path=ppt/theme/theme2.xml><?xml version="1.0" encoding="utf-8"?>
+<a:theme xmlns:a="http://schemas.openxmlformats.org/drawingml/2006/main" name="Office Theme">
+  <a:themeElements>
+    <a:clrScheme name="Office">
+      <a:dk1>
+        <a:sysClr val="windowText" lastClr="000000"/>
+      </a:dk1>
+      <a:lt1>
+        <a:sysClr val="window" lastClr="FFFFFF"/>
+      </a:lt1>
+      <a:dk2>
+        <a:srgbClr val="1F497D"/>
+      </a:dk2>
+      <a:lt2>
+        <a:srgbClr val="EEECE1"/>
+      </a:lt2>
+      <a:accent1>
+        <a:srgbClr val="4F81BD"/>
+      </a:accent1>
+      <a:accent2>
+        <a:srgbClr val="C0504D"/>
+      </a:accent2>
+      <a:accent3>
+        <a:srgbClr val="9BBB59"/>
+      </a:accent3>
+      <a:accent4>
+        <a:srgbClr val="8064A2"/>
+      </a:accent4>
+      <a:accent5>
+        <a:srgbClr val="4BACC6"/>
+      </a:accent5>
+      <a:accent6>
+        <a:srgbClr val="F79646"/>
+      </a:accent6>
+      <a:hlink>
+        <a:srgbClr val="0000FF"/>
+      </a:hlink>
+      <a:folHlink>
+        <a:srgbClr val="800080"/>
+      </a:folHlink>
+    </a:clrScheme>
+    <a:fontScheme name="Office">
+      <a:majorFont>
+        <a:latin typeface="Calibri"/>
+        <a:ea typeface=""/>
+        <a:cs typeface=""/>
+        <a:font script="Jpan" typeface="ＭＳ Ｐゴシック"/>
+        <a:font script="Hang" typeface="맑은 고딕"/>
+        <a:font script="Hans" typeface="宋体"/>
+        <a:font script="Hant" typeface="新細明體"/>
+        <a:font script="Arab" typeface="Times New Roman"/>
+        <a:font script="Hebr" typeface="Times New Roman"/>
+        <a:font script="Thai" typeface="Angsana New"/>
+        <a:font script="Ethi" typeface="Nyala"/>
+        <a:font script="Beng" typeface="Vrinda"/>
+        <a:font script="Gujr" typeface="Shruti"/>
+        <a:font script="Khmr" typeface="MoolBoran"/>
+        <a:font script="Knda" typeface="Tunga"/>
+        <a:font script="Guru" typeface="Raavi"/>
+        <a:font script="Cans" typeface="Euphemia"/>
+        <a:font script="Cher" typeface="Plantagenet Cherokee"/>
+        <a:font script="Yiii" typeface="Microsoft Yi Baiti"/>
+        <a:font script="Tibt" typeface="Microsoft Himalaya"/>
+        <a:font script="Thaa" typeface="MV Boli"/>
+        <a:font script="Deva" typeface="Mangal"/>
+        <a:font script="Telu" typeface="Gautami"/>
+        <a:font script="Taml" typeface="Latha"/>
+        <a:font script="Syrc" typeface="Estrangelo Edessa"/>
+        <a:font script="Orya" typeface="Kalinga"/>
+        <a:font script="Mlym" typeface="Kartika"/>
+        <a:font script="Laoo" typeface="DokChampa"/>
+        <a:font script="Sinh" typeface="Iskoola Pota"/>
+        <a:font script="Mong" typeface="Mongolian Baiti"/>
+        <a:font script="Viet" typeface="Times New Roman"/>
+        <a:font script="Uigh" typeface="Microsoft Uighur"/>
+      </a:majorFont>
+      <a:minorFont>
+        <a:latin typeface="Calibri"/>
+        <a:ea typeface=""/>
+        <a:cs typeface=""/>
+        <a:font script="Jpan" typeface="ＭＳ Ｐゴシック"/>
+        <a:font script="Hang" typeface="맑은 고딕"/>
+        <a:font script="Hans" typeface="宋体"/>
+        <a:font script="Hant" typeface="新細明體"/>
+        <a:font script="Arab" typeface="Arial"/>
+        <a:font script="Hebr" typeface="Arial"/>
+        <a:font script="Thai" typeface="Cordia New"/>
+        <a:font script="Ethi" typeface="Nyala"/>
+        <a:font script="Beng" typeface="Vrinda"/>
+        <a:font script="Gujr" typeface="Shruti"/>
+        <a:font script="Khmr" typeface="DaunPenh"/>
+        <a:font script="Knda" typeface="Tunga"/>
+        <a:font script="Guru" typeface="Raavi"/>
+        <a:font script="Cans" typeface="Euphemia"/>
+        <a:font script="Cher" typeface="Plantagenet Cherokee"/>
+        <a:font script="Yiii" typeface="Microsoft Yi Baiti"/>
+        <a:font script="Tibt" typeface="Microsoft Himalaya"/>
+        <a:font script="Thaa" typeface="MV Boli"/>
+        <a:font script="Deva" typeface="Mangal"/>
+        <a:font script="Telu" typeface="Gautami"/>
+        <a:font script="Taml" typeface="Latha"/>
+        <a:font script="Syrc" typeface="Estrangelo Edessa"/>
+        <a:font script="Orya" typeface="Kalinga"/>
+        <a:font script="Mlym" typeface="Kartika"/>
+        <a:font script="Laoo" typeface="DokChampa"/>
+        <a:font script="Sinh" typeface="Iskoola Pota"/>
+        <a:font script="Mong" typeface="Mongolian Baiti"/>
+        <a:font script="Viet" typeface="Arial"/>
+        <a:font script="Uigh" typeface="Microsoft Uighur"/>
+      </a:minorFont>
+    </a:fontScheme>
+    <a:fmtScheme name="Office">
+      <a:fillStyleLst>
+        <a:solidFill>
+          <a:schemeClr val="phClr"/>
+        </a:solidFill>
+        <a:gradFill rotWithShape="1">
+          <a:gsLst>
+            <a:gs pos="0">
+              <a:schemeClr val="phClr">
+                <a:tint val="50000"/>
+                <a:satMod val="300000"/>
+              </a:schemeClr>
+            </a:gs>
+            <a:gs pos="35000">
+              <a:schemeClr val="phClr">
+                <a:tint val="37000"/>
+                <a:satMod val="300000"/>
+              </a:schemeClr>
+            </a:gs>
+            <a:gs pos="100000">
+              <a:schemeClr val="phClr">
+                <a:tint val="15000"/>
+                <a:satMod val="350000"/>
+              </a:schemeClr>
+            </a:gs>
+          </a:gsLst>
+          <a:lin ang="16200000" scaled="1"/>
+        </a:gradFill>
+        <a:gradFill rotWithShape="1">
+          <a:gsLst>
+            <a:gs pos="0">
+              <a:schemeClr val="phClr">
+                <a:shade val="51000"/>
+                <a:satMod val="130000"/>
+              </a:schemeClr>
+            </a:gs>
+            <a:gs pos="80000">
+              <a:schemeClr val="phClr">
+                <a:shade val="93000"/>
+                <a:satMod val="130000"/>
+              </a:schemeClr>
+            </a:gs>
+            <a:gs pos="100000">
+              <a:schemeClr val="phClr">
+                <a:shade val="94000"/>
+                <a:satMod val="135000"/>
+              </a:schemeClr>
+            </a:gs>
+          </a:gsLst>
+          <a:lin ang="16200000" scaled="0"/>
+        </a:gradFill>
+      </a:fillStyleLst>
+      <a:lnStyleLst>
+        <a:ln w="9525" cap="flat" cmpd="sng" algn="ctr">
+          <a:solidFill>
+            <a:schemeClr val="phClr">
+              <a:shade val="95000"/>
+              <a:satMod val="105000"/>
+            </a:schemeClr>
+          </a:solidFill>
+          <a:prstDash val="solid"/>
+        </a:ln>
+        <a:ln w="25400" cap="flat" cmpd="sng" algn="ctr">
+          <a:solidFill>
+            <a:schemeClr val="phClr"/>
+          </a:solidFill>
+          <a:prstDash val="solid"/>
+        </a:ln>
+        <a:ln w="38100" cap="flat" cmpd="sng" algn="ctr">
+          <a:solidFill>
+            <a:schemeClr val="phClr"/>
+          </a:solidFill>
+          <a:prstDash val="solid"/>
+        </a:ln>
+      </a:lnStyleLst>
+      <a:effectStyleLst>
+        <a:effectStyle>
+          <a:effectLst>
+            <a:outerShdw blurRad="40000" dist="20000" dir="5400000" rotWithShape="0">
+              <a:srgbClr val="000000">
+                <a:alpha val="38000"/>
+              </a:srgbClr>
+            </a:outerShdw>
+          </a:effectLst>
+        </a:effectStyle>
+        <a:effectStyle>
+          <a:effectLst>
+            <a:outerShdw blurRad="40000" dist="23000" dir="5400000" rotWithShape="0">
+              <a:srgbClr val="000000">
+                <a:alpha val="35000"/>
+              </a:srgbClr>
+            </a:outerShdw>
+          </a:effectLst>
+        </a:effectStyle>
+        <a:effectStyle>
+          <a:effectLst>
+            <a:outerShdw blurRad="40000" dist="23000" dir="5400000" rotWithShape="0">
+              <a:srgbClr val="000000">
+                <a:alpha val="35000"/>
+              </a:srgbClr>
+            </a:outerShdw>
+          </a:effectLst>
+          <a:scene3d>
+            <a:camera prst="orthographicFront">
+              <a:rot lat="0" lon="0" rev="0"/>
+            </a:camera>
+            <a:lightRig rig="threePt" dir="t">
+              <a:rot lat="0" lon="0" rev="1200000"/>
+            </a:lightRig>
+          </a:scene3d>
+          <a:sp3d>
+            <a:bevelT w="63500" h="25400"/>
+          </a:sp3d>
+        </a:effectStyle>
+      </a:effectStyleLst>
+      <a:bgFillStyleLst>
+        <a:solidFill>
+          <a:schemeClr val="phClr"/>
+        </a:solidFill>
+        <a:gradFill rotWithShape="1">
+          <a:gsLst>
+            <a:gs pos="0">
+              <a:schemeClr val="phClr">
+                <a:tint val="40000"/>
+                <a:satMod val="350000"/>
+              </a:schemeClr>
+            </a:gs>
+            <a:gs pos="40000">
+              <a:schemeClr val="phClr">
+                <a:tint val="45000"/>
+                <a:shade val="99000"/>
+                <a:satMod val="350000"/>
+              </a:schemeClr>
+            </a:gs>
+            <a:gs pos="100000">
+              <a:schemeClr val="phClr">
+                <a:shade val="20000"/>
+                <a:satMod val="255000"/>
+              </a:schemeClr>
+            </a:gs>
+          </a:gsLst>
+          <a:path path="circle">
+            <a:fillToRect l="50000" t="-80000" r="50000" b="180000"/>
+          </a:path>
+        </a:gradFill>
+        <a:gradFill rotWithShape="1">
+          <a:gsLst>
+            <a:gs pos="0">
+              <a:schemeClr val="phClr">
+                <a:tint val="80000"/>
+                <a:satMod val="300000"/>
+              </a:schemeClr>
+            </a:gs>
+            <a:gs pos="100000">
+              <a:schemeClr val="phClr">
+                <a:shade val="30000"/>
+                <a:satMod val="200000"/>
+              </a:schemeClr>
+            </a:gs>
+          </a:gsLst>
+          <a:path path="circle">
+            <a:fillToRect l="50000" t="50000" r="50000" b="50000"/>
+          </a:path>
+        </a:gradFill>
+      </a:bgFillStyleLst>
+    </a:fmtScheme>
+  </a:themeElements>
+  <a:objectDefaults/>
+  <a:extraClrSchemeLst/>
+</a:theme>
 </file>
</xml_diff>

<commit_message>
Präsentation, Dokumentation und Projektstatus erweitert
</commit_message>
<xml_diff>
--- a/Doku/Präsentation.pptx
+++ b/Doku/Präsentation.pptx
@@ -5,17 +5,18 @@
     <p:sldMasterId id="2147483648" r:id="rId1"/>
   </p:sldMasterIdLst>
   <p:notesMasterIdLst>
-    <p:notesMasterId r:id="rId10"/>
+    <p:notesMasterId r:id="rId11"/>
   </p:notesMasterIdLst>
   <p:sldIdLst>
     <p:sldId id="256" r:id="rId2"/>
-    <p:sldId id="257" r:id="rId3"/>
-    <p:sldId id="261" r:id="rId4"/>
-    <p:sldId id="259" r:id="rId5"/>
-    <p:sldId id="263" r:id="rId6"/>
-    <p:sldId id="264" r:id="rId7"/>
-    <p:sldId id="260" r:id="rId8"/>
-    <p:sldId id="262" r:id="rId9"/>
+    <p:sldId id="265" r:id="rId3"/>
+    <p:sldId id="257" r:id="rId4"/>
+    <p:sldId id="261" r:id="rId5"/>
+    <p:sldId id="259" r:id="rId6"/>
+    <p:sldId id="263" r:id="rId7"/>
+    <p:sldId id="264" r:id="rId8"/>
+    <p:sldId id="260" r:id="rId9"/>
+    <p:sldId id="262" r:id="rId10"/>
   </p:sldIdLst>
   <p:sldSz cx="9144000" cy="6858000" type="screen4x3"/>
   <p:notesSz cx="6858000" cy="9144000"/>
@@ -200,7 +201,7 @@
             <a:fld id="{12B0C5B9-C15F-4DE1-B449-93DC1CF3D41D}" type="datetimeFigureOut">
               <a:rPr lang="de-DE" smtClean="0"/>
               <a:pPr/>
-              <a:t>06.06.2019</a:t>
+              <a:t>07.06.2019</a:t>
             </a:fld>
             <a:endParaRPr lang="de-DE"/>
           </a:p>
@@ -648,7 +649,7 @@
             <a:fld id="{58ED4F52-E910-4F36-85EC-F96E48ADDECF}" type="datetime1">
               <a:rPr lang="de-DE" smtClean="0"/>
               <a:pPr/>
-              <a:t>06.06.2019</a:t>
+              <a:t>07.06.2019</a:t>
             </a:fld>
             <a:endParaRPr lang="de-DE"/>
           </a:p>
@@ -815,7 +816,7 @@
             <a:fld id="{2074550A-FB1E-4A78-85EE-DFC1898EFA02}" type="datetime1">
               <a:rPr lang="de-DE" smtClean="0"/>
               <a:pPr/>
-              <a:t>06.06.2019</a:t>
+              <a:t>07.06.2019</a:t>
             </a:fld>
             <a:endParaRPr lang="de-DE"/>
           </a:p>
@@ -992,7 +993,7 @@
             <a:fld id="{A2BBBD5A-B6AA-41C0-9FCB-71E06A2239EB}" type="datetime1">
               <a:rPr lang="de-DE" smtClean="0"/>
               <a:pPr/>
-              <a:t>06.06.2019</a:t>
+              <a:t>07.06.2019</a:t>
             </a:fld>
             <a:endParaRPr lang="de-DE"/>
           </a:p>
@@ -1159,7 +1160,7 @@
             <a:fld id="{FE9BF1D3-DC78-468E-8C95-E45E56A831FB}" type="datetime1">
               <a:rPr lang="de-DE" smtClean="0"/>
               <a:pPr/>
-              <a:t>06.06.2019</a:t>
+              <a:t>07.06.2019</a:t>
             </a:fld>
             <a:endParaRPr lang="de-DE"/>
           </a:p>
@@ -1402,7 +1403,7 @@
             <a:fld id="{F2F20F45-7679-4634-9921-18B4694E7FDF}" type="datetime1">
               <a:rPr lang="de-DE" smtClean="0"/>
               <a:pPr/>
-              <a:t>06.06.2019</a:t>
+              <a:t>07.06.2019</a:t>
             </a:fld>
             <a:endParaRPr lang="de-DE"/>
           </a:p>
@@ -1687,7 +1688,7 @@
             <a:fld id="{59CBBB9D-0444-42E0-89C3-F887AA2ABDBE}" type="datetime1">
               <a:rPr lang="de-DE" smtClean="0"/>
               <a:pPr/>
-              <a:t>06.06.2019</a:t>
+              <a:t>07.06.2019</a:t>
             </a:fld>
             <a:endParaRPr lang="de-DE"/>
           </a:p>
@@ -2106,7 +2107,7 @@
             <a:fld id="{3EE3FD4A-66A0-40E8-8325-5BF7D4303E3F}" type="datetime1">
               <a:rPr lang="de-DE" smtClean="0"/>
               <a:pPr/>
-              <a:t>06.06.2019</a:t>
+              <a:t>07.06.2019</a:t>
             </a:fld>
             <a:endParaRPr lang="de-DE"/>
           </a:p>
@@ -2221,7 +2222,7 @@
             <a:fld id="{69FAEC51-3E8D-4E97-B1F2-0DAE17A49039}" type="datetime1">
               <a:rPr lang="de-DE" smtClean="0"/>
               <a:pPr/>
-              <a:t>06.06.2019</a:t>
+              <a:t>07.06.2019</a:t>
             </a:fld>
             <a:endParaRPr lang="de-DE"/>
           </a:p>
@@ -2313,7 +2314,7 @@
             <a:fld id="{38076506-CD57-419E-B555-115BA109C04E}" type="datetime1">
               <a:rPr lang="de-DE" smtClean="0"/>
               <a:pPr/>
-              <a:t>06.06.2019</a:t>
+              <a:t>07.06.2019</a:t>
             </a:fld>
             <a:endParaRPr lang="de-DE"/>
           </a:p>
@@ -2587,7 +2588,7 @@
             <a:fld id="{52A57ACB-7773-48CB-9025-929C47465A39}" type="datetime1">
               <a:rPr lang="de-DE" smtClean="0"/>
               <a:pPr/>
-              <a:t>06.06.2019</a:t>
+              <a:t>07.06.2019</a:t>
             </a:fld>
             <a:endParaRPr lang="de-DE"/>
           </a:p>
@@ -2837,7 +2838,7 @@
             <a:fld id="{33480F50-A871-49BE-BF33-D69C7F2A0FF0}" type="datetime1">
               <a:rPr lang="de-DE" smtClean="0"/>
               <a:pPr/>
-              <a:t>06.06.2019</a:t>
+              <a:t>07.06.2019</a:t>
             </a:fld>
             <a:endParaRPr lang="de-DE"/>
           </a:p>
@@ -3053,7 +3054,7 @@
             <a:fld id="{C69031F7-D773-433F-9920-4BC4D22E0948}" type="datetime1">
               <a:rPr lang="de-DE" smtClean="0"/>
               <a:pPr/>
-              <a:t>06.06.2019</a:t>
+              <a:t>07.06.2019</a:t>
             </a:fld>
             <a:endParaRPr lang="de-DE"/>
           </a:p>
@@ -3463,13 +3464,13 @@
         </p:nvSpPr>
         <p:spPr>
           <a:xfrm>
-            <a:off x="1514508" y="3614740"/>
-            <a:ext cx="7772400" cy="1314458"/>
+            <a:off x="2643174" y="3829054"/>
+            <a:ext cx="6215106" cy="1314458"/>
           </a:xfrm>
         </p:spPr>
         <p:txBody>
           <a:bodyPr>
-            <a:normAutofit/>
+            <a:normAutofit fontScale="90000"/>
           </a:bodyPr>
           <a:lstStyle/>
           <a:p>
@@ -3482,6 +3483,25 @@
                 <a:ea typeface="Kozuka Gothic Pro L" pitchFamily="34" charset="-128"/>
               </a:rPr>
               <a:t>Statusbericht</a:t>
+            </a:r>
+            <a:br>
+              <a:rPr lang="de-DE" sz="4800" b="1" dirty="0" smtClean="0">
+                <a:solidFill>
+                  <a:schemeClr val="bg1"/>
+                </a:solidFill>
+                <a:latin typeface="Kozuka Gothic Pro L" pitchFamily="34" charset="-128"/>
+                <a:ea typeface="Kozuka Gothic Pro L" pitchFamily="34" charset="-128"/>
+              </a:rPr>
+            </a:br>
+            <a:r>
+              <a:rPr lang="de-DE" sz="4800" b="1" dirty="0" smtClean="0">
+                <a:solidFill>
+                  <a:schemeClr val="bg1"/>
+                </a:solidFill>
+                <a:latin typeface="Kozuka Gothic Pro L" pitchFamily="34" charset="-128"/>
+                <a:ea typeface="Kozuka Gothic Pro L" pitchFamily="34" charset="-128"/>
+              </a:rPr>
+              <a:t>07.06.2019</a:t>
             </a:r>
             <a:endParaRPr lang="de-DE" sz="4800" b="1" dirty="0">
               <a:solidFill>
@@ -3582,7 +3602,9 @@
         </p:nvSpPr>
         <p:spPr/>
         <p:txBody>
-          <a:bodyPr/>
+          <a:bodyPr>
+            <a:normAutofit fontScale="90000"/>
+          </a:bodyPr>
           <a:lstStyle/>
           <a:p>
             <a:r>
@@ -3590,246 +3612,12 @@
                 <a:latin typeface="Kozuka Gothic Pro L" pitchFamily="34" charset="-128"/>
                 <a:ea typeface="Kozuka Gothic Pro L" pitchFamily="34" charset="-128"/>
               </a:rPr>
-              <a:t>„Was wurde realisiert?“</a:t>
+              <a:t>„Was war die ursprüngliche Projektidee?“</a:t>
             </a:r>
             <a:endParaRPr lang="de-DE" b="1" dirty="0">
               <a:latin typeface="Kozuka Gothic Pro L" pitchFamily="34" charset="-128"/>
               <a:ea typeface="Kozuka Gothic Pro L" pitchFamily="34" charset="-128"/>
             </a:endParaRPr>
-          </a:p>
-        </p:txBody>
-      </p:sp>
-      <p:sp>
-        <p:nvSpPr>
-          <p:cNvPr id="3" name="Content Placeholder 2"/>
-          <p:cNvSpPr>
-            <a:spLocks noGrp="1"/>
-          </p:cNvSpPr>
-          <p:nvPr>
-            <p:ph idx="1"/>
-          </p:nvPr>
-        </p:nvSpPr>
-        <p:spPr/>
-        <p:txBody>
-          <a:bodyPr/>
-          <a:lstStyle/>
-          <a:p>
-            <a:pPr marL="514350" indent="-514350">
-              <a:buFont typeface="+mj-lt"/>
-              <a:buAutoNum type="arabicPeriod"/>
-            </a:pPr>
-            <a:r>
-              <a:rPr lang="de-DE" dirty="0" smtClean="0">
-                <a:latin typeface="Kozuka Gothic Pro L" pitchFamily="34" charset="-128"/>
-                <a:ea typeface="Kozuka Gothic Pro L" pitchFamily="34" charset="-128"/>
-              </a:rPr>
-              <a:t>HTML/CSS</a:t>
-            </a:r>
-            <a:r>
-              <a:rPr lang="de-DE" dirty="0" smtClean="0">
-                <a:solidFill>
-                  <a:srgbClr val="00B050"/>
-                </a:solidFill>
-                <a:latin typeface="Kozuka Gothic Pro L" pitchFamily="34" charset="-128"/>
-                <a:ea typeface="Kozuka Gothic Pro L" pitchFamily="34" charset="-128"/>
-              </a:rPr>
-              <a:t> </a:t>
-            </a:r>
-            <a:r>
-              <a:rPr lang="de-DE" b="1" dirty="0" smtClean="0">
-                <a:solidFill>
-                  <a:srgbClr val="075E45"/>
-                </a:solidFill>
-                <a:latin typeface="Kozuka Gothic Pro L" pitchFamily="34" charset="-128"/>
-                <a:ea typeface="Kozuka Gothic Pro L" pitchFamily="34" charset="-128"/>
-              </a:rPr>
-              <a:t>vollständig</a:t>
-            </a:r>
-          </a:p>
-          <a:p>
-            <a:pPr marL="514350" indent="-514350">
-              <a:buFont typeface="+mj-lt"/>
-              <a:buAutoNum type="arabicPeriod"/>
-            </a:pPr>
-            <a:r>
-              <a:rPr lang="de-DE" dirty="0" smtClean="0">
-                <a:latin typeface="Kozuka Gothic Pro L" pitchFamily="34" charset="-128"/>
-                <a:ea typeface="Kozuka Gothic Pro L" pitchFamily="34" charset="-128"/>
-              </a:rPr>
-              <a:t>Client JS </a:t>
-            </a:r>
-            <a:r>
-              <a:rPr lang="de-DE" dirty="0" smtClean="0">
-                <a:solidFill>
-                  <a:srgbClr val="075E45"/>
-                </a:solidFill>
-                <a:latin typeface="Kozuka Gothic Pro L" pitchFamily="34" charset="-128"/>
-                <a:ea typeface="Kozuka Gothic Pro L" pitchFamily="34" charset="-128"/>
-              </a:rPr>
-              <a:t>– </a:t>
-            </a:r>
-            <a:r>
-              <a:rPr lang="de-DE" b="1" dirty="0" smtClean="0">
-                <a:solidFill>
-                  <a:srgbClr val="075E45"/>
-                </a:solidFill>
-                <a:latin typeface="Kozuka Gothic Pro L" pitchFamily="34" charset="-128"/>
-                <a:ea typeface="Kozuka Gothic Pro L" pitchFamily="34" charset="-128"/>
-              </a:rPr>
-              <a:t>Login 100%</a:t>
-            </a:r>
-          </a:p>
-          <a:p>
-            <a:pPr marL="514350" indent="-514350">
-              <a:buFont typeface="+mj-lt"/>
-              <a:buAutoNum type="arabicPeriod"/>
-            </a:pPr>
-            <a:r>
-              <a:rPr lang="de-DE" dirty="0" smtClean="0">
-                <a:solidFill>
-                  <a:schemeClr val="tx1">
-                    <a:lumMod val="85000"/>
-                    <a:lumOff val="15000"/>
-                  </a:schemeClr>
-                </a:solidFill>
-                <a:latin typeface="Kozuka Gothic Pro L" pitchFamily="34" charset="-128"/>
-                <a:ea typeface="Kozuka Gothic Pro L" pitchFamily="34" charset="-128"/>
-              </a:rPr>
-              <a:t>Client JS </a:t>
-            </a:r>
-            <a:r>
-              <a:rPr lang="de-DE" b="1" dirty="0" smtClean="0">
-                <a:solidFill>
-                  <a:schemeClr val="tx1">
-                    <a:lumMod val="85000"/>
-                    <a:lumOff val="15000"/>
-                  </a:schemeClr>
-                </a:solidFill>
-                <a:latin typeface="Kozuka Gothic Pro L" pitchFamily="34" charset="-128"/>
-                <a:ea typeface="Kozuka Gothic Pro L" pitchFamily="34" charset="-128"/>
-              </a:rPr>
-              <a:t>– </a:t>
-            </a:r>
-            <a:r>
-              <a:rPr lang="de-DE" b="1" dirty="0" smtClean="0">
-                <a:solidFill>
-                  <a:srgbClr val="075E45"/>
-                </a:solidFill>
-                <a:latin typeface="Kozuka Gothic Pro L" pitchFamily="34" charset="-128"/>
-                <a:ea typeface="Kozuka Gothic Pro L" pitchFamily="34" charset="-128"/>
-              </a:rPr>
-              <a:t>Ausloggen 100 %</a:t>
-            </a:r>
-          </a:p>
-          <a:p>
-            <a:pPr marL="514350" indent="-514350">
-              <a:buFont typeface="+mj-lt"/>
-              <a:buAutoNum type="arabicPeriod"/>
-            </a:pPr>
-            <a:r>
-              <a:rPr lang="de-DE" dirty="0" smtClean="0">
-                <a:latin typeface="Kozuka Gothic Pro L" pitchFamily="34" charset="-128"/>
-                <a:ea typeface="Kozuka Gothic Pro L" pitchFamily="34" charset="-128"/>
-              </a:rPr>
-              <a:t>Webserver –</a:t>
-            </a:r>
-            <a:r>
-              <a:rPr lang="de-DE" dirty="0" smtClean="0">
-                <a:solidFill>
-                  <a:srgbClr val="00B050"/>
-                </a:solidFill>
-                <a:latin typeface="Kozuka Gothic Pro L" pitchFamily="34" charset="-128"/>
-                <a:ea typeface="Kozuka Gothic Pro L" pitchFamily="34" charset="-128"/>
-              </a:rPr>
-              <a:t> </a:t>
-            </a:r>
-            <a:r>
-              <a:rPr lang="de-DE" b="1" dirty="0" smtClean="0">
-                <a:solidFill>
-                  <a:srgbClr val="075E45"/>
-                </a:solidFill>
-                <a:latin typeface="Kozuka Gothic Pro L" pitchFamily="34" charset="-128"/>
-                <a:ea typeface="Kozuka Gothic Pro L" pitchFamily="34" charset="-128"/>
-              </a:rPr>
-              <a:t>90%</a:t>
-            </a:r>
-          </a:p>
-          <a:p>
-            <a:pPr marL="514350" indent="-514350">
-              <a:buFont typeface="+mj-lt"/>
-              <a:buAutoNum type="arabicPeriod"/>
-            </a:pPr>
-            <a:r>
-              <a:rPr lang="de-DE" dirty="0" smtClean="0">
-                <a:latin typeface="Kozuka Gothic Pro L" pitchFamily="34" charset="-128"/>
-                <a:ea typeface="Kozuka Gothic Pro L" pitchFamily="34" charset="-128"/>
-              </a:rPr>
-              <a:t>Datenbank zu </a:t>
-            </a:r>
-            <a:r>
-              <a:rPr lang="de-DE" b="1" dirty="0" smtClean="0">
-                <a:solidFill>
-                  <a:srgbClr val="C00000"/>
-                </a:solidFill>
-                <a:latin typeface="Kozuka Gothic Pro L" pitchFamily="34" charset="-128"/>
-                <a:ea typeface="Kozuka Gothic Pro L" pitchFamily="34" charset="-128"/>
-              </a:rPr>
-              <a:t>25% </a:t>
-            </a:r>
-            <a:r>
-              <a:rPr lang="de-DE" dirty="0" smtClean="0">
-                <a:latin typeface="Kozuka Gothic Pro L" pitchFamily="34" charset="-128"/>
-                <a:ea typeface="Kozuka Gothic Pro L" pitchFamily="34" charset="-128"/>
-              </a:rPr>
-              <a:t>implementiert</a:t>
-            </a:r>
-          </a:p>
-          <a:p>
-            <a:pPr marL="514350" indent="-514350">
-              <a:buFont typeface="+mj-lt"/>
-              <a:buAutoNum type="arabicPeriod"/>
-            </a:pPr>
-            <a:r>
-              <a:rPr lang="de-DE" dirty="0" smtClean="0">
-                <a:latin typeface="Kozuka Gothic Pro L" pitchFamily="34" charset="-128"/>
-                <a:ea typeface="Kozuka Gothic Pro L" pitchFamily="34" charset="-128"/>
-              </a:rPr>
-              <a:t>Dokumentation wurde erweitert – </a:t>
-            </a:r>
-            <a:r>
-              <a:rPr lang="de-DE" b="1" dirty="0" smtClean="0">
-                <a:solidFill>
-                  <a:srgbClr val="075E45"/>
-                </a:solidFill>
-                <a:latin typeface="Kozuka Gothic Pro L" pitchFamily="34" charset="-128"/>
-                <a:ea typeface="Kozuka Gothic Pro L" pitchFamily="34" charset="-128"/>
-              </a:rPr>
-              <a:t>30%</a:t>
-            </a:r>
-            <a:r>
-              <a:rPr lang="de-DE" b="1" dirty="0" smtClean="0">
-                <a:solidFill>
-                  <a:srgbClr val="00B050"/>
-                </a:solidFill>
-                <a:latin typeface="Kozuka Gothic Pro L" pitchFamily="34" charset="-128"/>
-                <a:ea typeface="Kozuka Gothic Pro L" pitchFamily="34" charset="-128"/>
-              </a:rPr>
-              <a:t> </a:t>
-            </a:r>
-            <a:r>
-              <a:rPr lang="de-DE" dirty="0" smtClean="0">
-                <a:latin typeface="Kozuka Gothic Pro L" pitchFamily="34" charset="-128"/>
-                <a:ea typeface="Kozuka Gothic Pro L" pitchFamily="34" charset="-128"/>
-              </a:rPr>
-              <a:t>(Anforderungen, Mockups, Diagramme)</a:t>
-            </a:r>
-          </a:p>
-          <a:p>
-            <a:pPr marL="514350" indent="-514350">
-              <a:buFont typeface="+mj-lt"/>
-              <a:buAutoNum type="arabicPeriod"/>
-            </a:pPr>
-            <a:endParaRPr lang="de-DE" dirty="0"/>
           </a:p>
         </p:txBody>
       </p:sp>
@@ -3883,6 +3671,130 @@
           <a:noFill/>
         </p:spPr>
       </p:pic>
+      <p:pic>
+        <p:nvPicPr>
+          <p:cNvPr id="1026" name="Picture 2" descr="D:\Documents\Dropbox\E-Health SS19\Bilder\Mockups\08_Tagebuch_ausfüllen.png"/>
+          <p:cNvPicPr>
+            <a:picLocks noChangeAspect="1" noChangeArrowheads="1"/>
+          </p:cNvPicPr>
+          <p:nvPr/>
+        </p:nvPicPr>
+        <p:blipFill>
+          <a:blip r:embed="rId3" cstate="print"/>
+          <a:srcRect/>
+          <a:stretch>
+            <a:fillRect/>
+          </a:stretch>
+        </p:blipFill>
+        <p:spPr bwMode="auto">
+          <a:xfrm>
+            <a:off x="214282" y="2357430"/>
+            <a:ext cx="4184199" cy="3143272"/>
+          </a:xfrm>
+          <a:prstGeom prst="rect">
+            <a:avLst/>
+          </a:prstGeom>
+          <a:noFill/>
+        </p:spPr>
+      </p:pic>
+      <p:pic>
+        <p:nvPicPr>
+          <p:cNvPr id="1027" name="Picture 3" descr="D:\Documents\Dropbox\E-Health SS19\Bilder\Mockups\07_Diagramm.png"/>
+          <p:cNvPicPr>
+            <a:picLocks noChangeAspect="1" noChangeArrowheads="1"/>
+          </p:cNvPicPr>
+          <p:nvPr/>
+        </p:nvPicPr>
+        <p:blipFill>
+          <a:blip r:embed="rId4" cstate="print"/>
+          <a:srcRect/>
+          <a:stretch>
+            <a:fillRect/>
+          </a:stretch>
+        </p:blipFill>
+        <p:spPr bwMode="auto">
+          <a:xfrm>
+            <a:off x="4714876" y="2357430"/>
+            <a:ext cx="4214842" cy="3151861"/>
+          </a:xfrm>
+          <a:prstGeom prst="rect">
+            <a:avLst/>
+          </a:prstGeom>
+          <a:noFill/>
+        </p:spPr>
+      </p:pic>
+      <p:sp>
+        <p:nvSpPr>
+          <p:cNvPr id="10" name="TextBox 9"/>
+          <p:cNvSpPr txBox="1"/>
+          <p:nvPr/>
+        </p:nvSpPr>
+        <p:spPr>
+          <a:xfrm>
+            <a:off x="1047980" y="2000240"/>
+            <a:ext cx="2957348" cy="369332"/>
+          </a:xfrm>
+          <a:prstGeom prst="rect">
+            <a:avLst/>
+          </a:prstGeom>
+          <a:noFill/>
+        </p:spPr>
+        <p:txBody>
+          <a:bodyPr wrap="none" rtlCol="0">
+            <a:spAutoFit/>
+          </a:bodyPr>
+          <a:lstStyle/>
+          <a:p>
+            <a:r>
+              <a:rPr lang="de-DE" dirty="0" smtClean="0">
+                <a:latin typeface="Kozuka Gothic Pr6N B" pitchFamily="34" charset="-128"/>
+                <a:ea typeface="Kozuka Gothic Pr6N B" pitchFamily="34" charset="-128"/>
+              </a:rPr>
+              <a:t>Patient füllt Tagebuch aus</a:t>
+            </a:r>
+            <a:endParaRPr lang="de-DE" dirty="0">
+              <a:latin typeface="Kozuka Gothic Pr6N B" pitchFamily="34" charset="-128"/>
+              <a:ea typeface="Kozuka Gothic Pr6N B" pitchFamily="34" charset="-128"/>
+            </a:endParaRPr>
+          </a:p>
+        </p:txBody>
+      </p:sp>
+      <p:sp>
+        <p:nvSpPr>
+          <p:cNvPr id="11" name="TextBox 10"/>
+          <p:cNvSpPr txBox="1"/>
+          <p:nvPr/>
+        </p:nvSpPr>
+        <p:spPr>
+          <a:xfrm>
+            <a:off x="5428839" y="2000240"/>
+            <a:ext cx="3499163" cy="369332"/>
+          </a:xfrm>
+          <a:prstGeom prst="rect">
+            <a:avLst/>
+          </a:prstGeom>
+          <a:noFill/>
+        </p:spPr>
+        <p:txBody>
+          <a:bodyPr wrap="none" rtlCol="0">
+            <a:spAutoFit/>
+          </a:bodyPr>
+          <a:lstStyle/>
+          <a:p>
+            <a:r>
+              <a:rPr lang="de-DE" dirty="0" smtClean="0">
+                <a:latin typeface="Kozuka Gothic Pr6N B" pitchFamily="34" charset="-128"/>
+                <a:ea typeface="Kozuka Gothic Pr6N B" pitchFamily="34" charset="-128"/>
+              </a:rPr>
+              <a:t>Psychologe sieht Tagebuch ein </a:t>
+            </a:r>
+            <a:endParaRPr lang="de-DE" dirty="0">
+              <a:latin typeface="Kozuka Gothic Pr6N B" pitchFamily="34" charset="-128"/>
+              <a:ea typeface="Kozuka Gothic Pr6N B" pitchFamily="34" charset="-128"/>
+            </a:endParaRPr>
+          </a:p>
+        </p:txBody>
+      </p:sp>
     </p:spTree>
   </p:cSld>
   <p:clrMapOvr>
@@ -3935,7 +3847,7 @@
                 <a:latin typeface="Kozuka Gothic Pro L" pitchFamily="34" charset="-128"/>
                 <a:ea typeface="Kozuka Gothic Pro L" pitchFamily="34" charset="-128"/>
               </a:rPr>
-              <a:t>„Was fehlt?“</a:t>
+              <a:t>„Was wurde realisiert?“</a:t>
             </a:r>
             <a:endParaRPr lang="de-DE" b="1" dirty="0">
               <a:latin typeface="Kozuka Gothic Pro L" pitchFamily="34" charset="-128"/>
@@ -3956,7 +3868,9 @@
         </p:nvSpPr>
         <p:spPr/>
         <p:txBody>
-          <a:bodyPr/>
+          <a:bodyPr>
+            <a:normAutofit lnSpcReduction="10000"/>
+          </a:bodyPr>
           <a:lstStyle/>
           <a:p>
             <a:pPr marL="514350" indent="-514350">
@@ -3968,7 +3882,27 @@
                 <a:latin typeface="Kozuka Gothic Pro L" pitchFamily="34" charset="-128"/>
                 <a:ea typeface="Kozuka Gothic Pro L" pitchFamily="34" charset="-128"/>
               </a:rPr>
-              <a:t>Restliche Client JS Funktionen</a:t>
+              <a:t>HTML/CSS</a:t>
+            </a:r>
+            <a:r>
+              <a:rPr lang="de-DE" dirty="0" smtClean="0">
+                <a:solidFill>
+                  <a:srgbClr val="00B050"/>
+                </a:solidFill>
+                <a:latin typeface="Kozuka Gothic Pro L" pitchFamily="34" charset="-128"/>
+                <a:ea typeface="Kozuka Gothic Pro L" pitchFamily="34" charset="-128"/>
+              </a:rPr>
+              <a:t> </a:t>
+            </a:r>
+            <a:r>
+              <a:rPr lang="de-DE" b="1" dirty="0" smtClean="0">
+                <a:solidFill>
+                  <a:srgbClr val="075E45"/>
+                </a:solidFill>
+                <a:latin typeface="Kozuka Gothic Pro L" pitchFamily="34" charset="-128"/>
+                <a:ea typeface="Kozuka Gothic Pro L" pitchFamily="34" charset="-128"/>
+              </a:rPr>
+              <a:t>vollständig</a:t>
             </a:r>
           </a:p>
           <a:p>
@@ -3981,7 +3915,27 @@
                 <a:latin typeface="Kozuka Gothic Pro L" pitchFamily="34" charset="-128"/>
                 <a:ea typeface="Kozuka Gothic Pro L" pitchFamily="34" charset="-128"/>
               </a:rPr>
-              <a:t>HTTPS Implementierung bei Webserver</a:t>
+              <a:t>Client JS </a:t>
+            </a:r>
+            <a:r>
+              <a:rPr lang="de-DE" dirty="0" smtClean="0">
+                <a:solidFill>
+                  <a:srgbClr val="075E45"/>
+                </a:solidFill>
+                <a:latin typeface="Kozuka Gothic Pro L" pitchFamily="34" charset="-128"/>
+                <a:ea typeface="Kozuka Gothic Pro L" pitchFamily="34" charset="-128"/>
+              </a:rPr>
+              <a:t>– </a:t>
+            </a:r>
+            <a:r>
+              <a:rPr lang="de-DE" b="1" dirty="0" smtClean="0">
+                <a:solidFill>
+                  <a:srgbClr val="075E45"/>
+                </a:solidFill>
+                <a:latin typeface="Kozuka Gothic Pro L" pitchFamily="34" charset="-128"/>
+                <a:ea typeface="Kozuka Gothic Pro L" pitchFamily="34" charset="-128"/>
+              </a:rPr>
+              <a:t>Login 100%</a:t>
             </a:r>
           </a:p>
           <a:p>
@@ -3991,10 +3945,49 @@
             </a:pPr>
             <a:r>
               <a:rPr lang="de-DE" dirty="0" smtClean="0">
-                <a:latin typeface="Kozuka Gothic Pro L" pitchFamily="34" charset="-128"/>
-                <a:ea typeface="Kozuka Gothic Pro L" pitchFamily="34" charset="-128"/>
-              </a:rPr>
-              <a:t>Restliche Implementation der Datenbank</a:t>
+                <a:solidFill>
+                  <a:schemeClr val="tx1">
+                    <a:lumMod val="85000"/>
+                    <a:lumOff val="15000"/>
+                  </a:schemeClr>
+                </a:solidFill>
+                <a:latin typeface="Kozuka Gothic Pro L" pitchFamily="34" charset="-128"/>
+                <a:ea typeface="Kozuka Gothic Pro L" pitchFamily="34" charset="-128"/>
+              </a:rPr>
+              <a:t>Client JS </a:t>
+            </a:r>
+            <a:r>
+              <a:rPr lang="de-DE" b="1" dirty="0" smtClean="0">
+                <a:solidFill>
+                  <a:schemeClr val="tx1">
+                    <a:lumMod val="85000"/>
+                    <a:lumOff val="15000"/>
+                  </a:schemeClr>
+                </a:solidFill>
+                <a:latin typeface="Kozuka Gothic Pro L" pitchFamily="34" charset="-128"/>
+                <a:ea typeface="Kozuka Gothic Pro L" pitchFamily="34" charset="-128"/>
+              </a:rPr>
+              <a:t>– </a:t>
+            </a:r>
+            <a:r>
+              <a:rPr lang="de-DE" b="1" dirty="0" smtClean="0">
+                <a:solidFill>
+                  <a:srgbClr val="075E45"/>
+                </a:solidFill>
+                <a:latin typeface="Kozuka Gothic Pro L" pitchFamily="34" charset="-128"/>
+                <a:ea typeface="Kozuka Gothic Pro L" pitchFamily="34" charset="-128"/>
+              </a:rPr>
+              <a:t>Ausloggen 100 </a:t>
+            </a:r>
+            <a:r>
+              <a:rPr lang="de-DE" b="1" dirty="0" smtClean="0">
+                <a:solidFill>
+                  <a:srgbClr val="075E45"/>
+                </a:solidFill>
+                <a:latin typeface="Kozuka Gothic Pro L" pitchFamily="34" charset="-128"/>
+                <a:ea typeface="Kozuka Gothic Pro L" pitchFamily="34" charset="-128"/>
+              </a:rPr>
+              <a:t>%</a:t>
             </a:r>
           </a:p>
           <a:p>
@@ -4007,8 +4000,49 @@
                 <a:latin typeface="Kozuka Gothic Pro L" pitchFamily="34" charset="-128"/>
                 <a:ea typeface="Kozuka Gothic Pro L" pitchFamily="34" charset="-128"/>
               </a:rPr>
-              <a:t>Verbindung Datenbank und Webserver</a:t>
-            </a:r>
+              <a:t>Client JS</a:t>
+            </a:r>
+            <a:r>
+              <a:rPr lang="de-DE" dirty="0" smtClean="0">
+                <a:solidFill>
+                  <a:srgbClr val="075E45"/>
+                </a:solidFill>
+                <a:latin typeface="Kozuka Gothic Pro L" pitchFamily="34" charset="-128"/>
+                <a:ea typeface="Kozuka Gothic Pro L" pitchFamily="34" charset="-128"/>
+              </a:rPr>
+              <a:t> </a:t>
+            </a:r>
+            <a:r>
+              <a:rPr lang="de-DE" b="1" dirty="0" smtClean="0">
+                <a:solidFill>
+                  <a:srgbClr val="075E45"/>
+                </a:solidFill>
+                <a:latin typeface="Kozuka Gothic Pro L" pitchFamily="34" charset="-128"/>
+                <a:ea typeface="Kozuka Gothic Pro L" pitchFamily="34" charset="-128"/>
+              </a:rPr>
+              <a:t>– </a:t>
+            </a:r>
+            <a:r>
+              <a:rPr lang="de-DE" b="1" dirty="0" smtClean="0">
+                <a:solidFill>
+                  <a:schemeClr val="accent6">
+                    <a:lumMod val="75000"/>
+                  </a:schemeClr>
+                </a:solidFill>
+                <a:latin typeface="Kozuka Gothic Pro L" pitchFamily="34" charset="-128"/>
+                <a:ea typeface="Kozuka Gothic Pro L" pitchFamily="34" charset="-128"/>
+              </a:rPr>
+              <a:t>Patientensuche 20%</a:t>
+            </a:r>
+            <a:endParaRPr lang="de-DE" b="1" dirty="0" smtClean="0">
+              <a:solidFill>
+                <a:schemeClr val="accent6">
+                  <a:lumMod val="75000"/>
+                </a:schemeClr>
+              </a:solidFill>
+              <a:latin typeface="Kozuka Gothic Pro L" pitchFamily="34" charset="-128"/>
+              <a:ea typeface="Kozuka Gothic Pro L" pitchFamily="34" charset="-128"/>
+            </a:endParaRPr>
           </a:p>
           <a:p>
             <a:pPr marL="514350" indent="-514350">
@@ -4020,7 +4054,27 @@
                 <a:latin typeface="Kozuka Gothic Pro L" pitchFamily="34" charset="-128"/>
                 <a:ea typeface="Kozuka Gothic Pro L" pitchFamily="34" charset="-128"/>
               </a:rPr>
-              <a:t>Deployment</a:t>
+              <a:t>Webserver –</a:t>
+            </a:r>
+            <a:r>
+              <a:rPr lang="de-DE" dirty="0" smtClean="0">
+                <a:solidFill>
+                  <a:srgbClr val="00B050"/>
+                </a:solidFill>
+                <a:latin typeface="Kozuka Gothic Pro L" pitchFamily="34" charset="-128"/>
+                <a:ea typeface="Kozuka Gothic Pro L" pitchFamily="34" charset="-128"/>
+              </a:rPr>
+              <a:t> </a:t>
+            </a:r>
+            <a:r>
+              <a:rPr lang="de-DE" b="1" dirty="0" smtClean="0">
+                <a:solidFill>
+                  <a:srgbClr val="075E45"/>
+                </a:solidFill>
+                <a:latin typeface="Kozuka Gothic Pro L" pitchFamily="34" charset="-128"/>
+                <a:ea typeface="Kozuka Gothic Pro L" pitchFamily="34" charset="-128"/>
+              </a:rPr>
+              <a:t>90%</a:t>
             </a:r>
           </a:p>
           <a:p>
@@ -4033,7 +4087,24 @@
                 <a:latin typeface="Kozuka Gothic Pro L" pitchFamily="34" charset="-128"/>
                 <a:ea typeface="Kozuka Gothic Pro L" pitchFamily="34" charset="-128"/>
               </a:rPr>
-              <a:t>Testing</a:t>
+              <a:t>Datenbank zu </a:t>
+            </a:r>
+            <a:r>
+              <a:rPr lang="de-DE" b="1" dirty="0" smtClean="0">
+                <a:solidFill>
+                  <a:srgbClr val="C00000"/>
+                </a:solidFill>
+                <a:latin typeface="Kozuka Gothic Pro L" pitchFamily="34" charset="-128"/>
+                <a:ea typeface="Kozuka Gothic Pro L" pitchFamily="34" charset="-128"/>
+              </a:rPr>
+              <a:t>25% </a:t>
+            </a:r>
+            <a:r>
+              <a:rPr lang="de-DE" dirty="0" smtClean="0">
+                <a:latin typeface="Kozuka Gothic Pro L" pitchFamily="34" charset="-128"/>
+                <a:ea typeface="Kozuka Gothic Pro L" pitchFamily="34" charset="-128"/>
+              </a:rPr>
+              <a:t>implementiert</a:t>
             </a:r>
           </a:p>
           <a:p>
@@ -4046,13 +4117,42 @@
                 <a:latin typeface="Kozuka Gothic Pro L" pitchFamily="34" charset="-128"/>
                 <a:ea typeface="Kozuka Gothic Pro L" pitchFamily="34" charset="-128"/>
               </a:rPr>
-              <a:t>Vollständige Dokumentation</a:t>
-            </a:r>
-          </a:p>
-          <a:p>
-            <a:pPr marL="514350" indent="-514350">
-              <a:buNone/>
-            </a:pPr>
+              <a:t>Dokumentation wurde erweitert – </a:t>
+            </a:r>
+            <a:r>
+              <a:rPr lang="de-DE" b="1" dirty="0" smtClean="0">
+                <a:solidFill>
+                  <a:srgbClr val="075E45"/>
+                </a:solidFill>
+                <a:latin typeface="Kozuka Gothic Pro L" pitchFamily="34" charset="-128"/>
+                <a:ea typeface="Kozuka Gothic Pro L" pitchFamily="34" charset="-128"/>
+              </a:rPr>
+              <a:t>60%</a:t>
+            </a:r>
+            <a:r>
+              <a:rPr lang="de-DE" b="1" dirty="0" smtClean="0">
+                <a:solidFill>
+                  <a:srgbClr val="00B050"/>
+                </a:solidFill>
+                <a:latin typeface="Kozuka Gothic Pro L" pitchFamily="34" charset="-128"/>
+                <a:ea typeface="Kozuka Gothic Pro L" pitchFamily="34" charset="-128"/>
+              </a:rPr>
+              <a:t> </a:t>
+            </a:r>
+            <a:r>
+              <a:rPr lang="de-DE" dirty="0" smtClean="0">
+                <a:latin typeface="Kozuka Gothic Pro L" pitchFamily="34" charset="-128"/>
+                <a:ea typeface="Kozuka Gothic Pro L" pitchFamily="34" charset="-128"/>
+              </a:rPr>
+              <a:t>(Anforderungen, </a:t>
+            </a:r>
+            <a:r>
+              <a:rPr lang="de-DE" dirty="0" smtClean="0">
+                <a:latin typeface="Kozuka Gothic Pro L" pitchFamily="34" charset="-128"/>
+                <a:ea typeface="Kozuka Gothic Pro L" pitchFamily="34" charset="-128"/>
+              </a:rPr>
+              <a:t>Diagramme, Mockups)</a:t>
+            </a:r>
             <a:endParaRPr lang="de-DE" dirty="0" smtClean="0">
               <a:latin typeface="Kozuka Gothic Pro L" pitchFamily="34" charset="-128"/>
               <a:ea typeface="Kozuka Gothic Pro L" pitchFamily="34" charset="-128"/>
@@ -4060,22 +4160,10 @@
           </a:p>
           <a:p>
             <a:pPr marL="514350" indent="-514350">
-              <a:buNone/>
-            </a:pPr>
-            <a:endParaRPr lang="de-DE" dirty="0" smtClean="0">
-              <a:latin typeface="Kozuka Gothic Pro L" pitchFamily="34" charset="-128"/>
-              <a:ea typeface="Kozuka Gothic Pro L" pitchFamily="34" charset="-128"/>
-            </a:endParaRPr>
-          </a:p>
-          <a:p>
-            <a:pPr marL="514350" indent="-514350">
               <a:buFont typeface="+mj-lt"/>
               <a:buAutoNum type="arabicPeriod"/>
             </a:pPr>
-            <a:endParaRPr lang="de-DE" dirty="0">
-              <a:latin typeface="Kozuka Gothic Pro L" pitchFamily="34" charset="-128"/>
-              <a:ea typeface="Kozuka Gothic Pro L" pitchFamily="34" charset="-128"/>
-            </a:endParaRPr>
+            <a:endParaRPr lang="de-DE" dirty="0"/>
           </a:p>
         </p:txBody>
       </p:sp>
@@ -4181,7 +4269,7 @@
                 <a:latin typeface="Kozuka Gothic Pro L" pitchFamily="34" charset="-128"/>
                 <a:ea typeface="Kozuka Gothic Pro L" pitchFamily="34" charset="-128"/>
               </a:rPr>
-              <a:t>„Gab es Probleme?“</a:t>
+              <a:t>„Was fehlt?“</a:t>
             </a:r>
             <a:endParaRPr lang="de-DE" b="1" dirty="0">
               <a:latin typeface="Kozuka Gothic Pro L" pitchFamily="34" charset="-128"/>
@@ -4200,32 +4288,10 @@
             <p:ph idx="1"/>
           </p:nvPr>
         </p:nvSpPr>
-        <p:spPr>
-          <a:xfrm>
-            <a:off x="285720" y="1600200"/>
-            <a:ext cx="8643998" cy="4525963"/>
-          </a:xfrm>
-        </p:spPr>
-        <p:txBody>
-          <a:bodyPr>
-            <a:normAutofit/>
-          </a:bodyPr>
-          <a:lstStyle/>
-          <a:p>
-            <a:pPr>
-              <a:buNone/>
-            </a:pPr>
-            <a:r>
-              <a:rPr lang="de-DE" b="1" dirty="0" smtClean="0">
-                <a:solidFill>
-                  <a:srgbClr val="C00000"/>
-                </a:solidFill>
-                <a:latin typeface="Kozuka Gothic Pro L" pitchFamily="34" charset="-128"/>
-                <a:ea typeface="Kozuka Gothic Pro L" pitchFamily="34" charset="-128"/>
-              </a:rPr>
-              <a:t>Probleme:</a:t>
-            </a:r>
-          </a:p>
+        <p:spPr/>
+        <p:txBody>
+          <a:bodyPr/>
+          <a:lstStyle/>
           <a:p>
             <a:pPr marL="514350" indent="-514350">
               <a:buFont typeface="+mj-lt"/>
@@ -4236,22 +4302,7 @@
                 <a:latin typeface="Kozuka Gothic Pro L" pitchFamily="34" charset="-128"/>
                 <a:ea typeface="Kozuka Gothic Pro L" pitchFamily="34" charset="-128"/>
               </a:rPr>
-              <a:t>Zeitprobleme, da andere Projekte nebenbei am laufen waren</a:t>
-            </a:r>
-          </a:p>
-          <a:p>
-            <a:pPr>
-              <a:buNone/>
-            </a:pPr>
-            <a:r>
-              <a:rPr lang="de-DE" b="1" dirty="0" smtClean="0">
-                <a:solidFill>
-                  <a:srgbClr val="075E45"/>
-                </a:solidFill>
-                <a:latin typeface="Kozuka Gothic Pro L" pitchFamily="34" charset="-128"/>
-                <a:ea typeface="Kozuka Gothic Pro L" pitchFamily="34" charset="-128"/>
-              </a:rPr>
-              <a:t>Lösung:</a:t>
+              <a:t>Restliche Client JS Funktionen</a:t>
             </a:r>
           </a:p>
           <a:p>
@@ -4264,8 +4315,97 @@
                 <a:latin typeface="Kozuka Gothic Pro L" pitchFamily="34" charset="-128"/>
                 <a:ea typeface="Kozuka Gothic Pro L" pitchFamily="34" charset="-128"/>
               </a:rPr>
-              <a:t>Zeitpuffer verwendet und manche Funktionen später implementiert -&gt; Aufgaben nach hinten verschoben</a:t>
-            </a:r>
+              <a:t>HTTPS Implementierung bei Webserver</a:t>
+            </a:r>
+          </a:p>
+          <a:p>
+            <a:pPr marL="514350" indent="-514350">
+              <a:buFont typeface="+mj-lt"/>
+              <a:buAutoNum type="arabicPeriod"/>
+            </a:pPr>
+            <a:r>
+              <a:rPr lang="de-DE" dirty="0" smtClean="0">
+                <a:latin typeface="Kozuka Gothic Pro L" pitchFamily="34" charset="-128"/>
+                <a:ea typeface="Kozuka Gothic Pro L" pitchFamily="34" charset="-128"/>
+              </a:rPr>
+              <a:t>Restliche Implementation der Datenbank</a:t>
+            </a:r>
+          </a:p>
+          <a:p>
+            <a:pPr marL="514350" indent="-514350">
+              <a:buFont typeface="+mj-lt"/>
+              <a:buAutoNum type="arabicPeriod"/>
+            </a:pPr>
+            <a:r>
+              <a:rPr lang="de-DE" dirty="0" smtClean="0">
+                <a:latin typeface="Kozuka Gothic Pro L" pitchFamily="34" charset="-128"/>
+                <a:ea typeface="Kozuka Gothic Pro L" pitchFamily="34" charset="-128"/>
+              </a:rPr>
+              <a:t>Verbindung Datenbank und Webserver</a:t>
+            </a:r>
+          </a:p>
+          <a:p>
+            <a:pPr marL="514350" indent="-514350">
+              <a:buFont typeface="+mj-lt"/>
+              <a:buAutoNum type="arabicPeriod"/>
+            </a:pPr>
+            <a:r>
+              <a:rPr lang="de-DE" dirty="0" smtClean="0">
+                <a:latin typeface="Kozuka Gothic Pro L" pitchFamily="34" charset="-128"/>
+                <a:ea typeface="Kozuka Gothic Pro L" pitchFamily="34" charset="-128"/>
+              </a:rPr>
+              <a:t>Deployment</a:t>
+            </a:r>
+          </a:p>
+          <a:p>
+            <a:pPr marL="514350" indent="-514350">
+              <a:buFont typeface="+mj-lt"/>
+              <a:buAutoNum type="arabicPeriod"/>
+            </a:pPr>
+            <a:r>
+              <a:rPr lang="de-DE" dirty="0" smtClean="0">
+                <a:latin typeface="Kozuka Gothic Pro L" pitchFamily="34" charset="-128"/>
+                <a:ea typeface="Kozuka Gothic Pro L" pitchFamily="34" charset="-128"/>
+              </a:rPr>
+              <a:t>Testing</a:t>
+            </a:r>
+          </a:p>
+          <a:p>
+            <a:pPr marL="514350" indent="-514350">
+              <a:buFont typeface="+mj-lt"/>
+              <a:buAutoNum type="arabicPeriod"/>
+            </a:pPr>
+            <a:r>
+              <a:rPr lang="de-DE" dirty="0" smtClean="0">
+                <a:latin typeface="Kozuka Gothic Pro L" pitchFamily="34" charset="-128"/>
+                <a:ea typeface="Kozuka Gothic Pro L" pitchFamily="34" charset="-128"/>
+              </a:rPr>
+              <a:t>Vollständige Dokumentation</a:t>
+            </a:r>
+          </a:p>
+          <a:p>
+            <a:pPr marL="514350" indent="-514350">
+              <a:buNone/>
+            </a:pPr>
+            <a:endParaRPr lang="de-DE" dirty="0" smtClean="0">
+              <a:latin typeface="Kozuka Gothic Pro L" pitchFamily="34" charset="-128"/>
+              <a:ea typeface="Kozuka Gothic Pro L" pitchFamily="34" charset="-128"/>
+            </a:endParaRPr>
+          </a:p>
+          <a:p>
+            <a:pPr marL="514350" indent="-514350">
+              <a:buNone/>
+            </a:pPr>
+            <a:endParaRPr lang="de-DE" dirty="0" smtClean="0">
+              <a:latin typeface="Kozuka Gothic Pro L" pitchFamily="34" charset="-128"/>
+              <a:ea typeface="Kozuka Gothic Pro L" pitchFamily="34" charset="-128"/>
+            </a:endParaRPr>
+          </a:p>
+          <a:p>
+            <a:pPr marL="514350" indent="-514350">
+              <a:buFont typeface="+mj-lt"/>
+              <a:buAutoNum type="arabicPeriod"/>
+            </a:pPr>
             <a:endParaRPr lang="de-DE" dirty="0">
               <a:latin typeface="Kozuka Gothic Pro L" pitchFamily="34" charset="-128"/>
               <a:ea typeface="Kozuka Gothic Pro L" pitchFamily="34" charset="-128"/>
@@ -4375,7 +4515,7 @@
                 <a:latin typeface="Kozuka Gothic Pro L" pitchFamily="34" charset="-128"/>
                 <a:ea typeface="Kozuka Gothic Pro L" pitchFamily="34" charset="-128"/>
               </a:rPr>
-              <a:t>„Sind Risiken eingetreten?“</a:t>
+              <a:t>„Gab es Probleme?“</a:t>
             </a:r>
             <a:endParaRPr lang="de-DE" b="1" dirty="0">
               <a:latin typeface="Kozuka Gothic Pro L" pitchFamily="34" charset="-128"/>
@@ -4396,8 +4536,8 @@
         </p:nvSpPr>
         <p:spPr>
           <a:xfrm>
-            <a:off x="285720" y="2214554"/>
-            <a:ext cx="8643998" cy="2257428"/>
+            <a:off x="285720" y="1600200"/>
+            <a:ext cx="8643998" cy="4525963"/>
           </a:xfrm>
         </p:spPr>
         <p:txBody>
@@ -4417,14 +4557,20 @@
                 <a:latin typeface="Kozuka Gothic Pro L" pitchFamily="34" charset="-128"/>
                 <a:ea typeface="Kozuka Gothic Pro L" pitchFamily="34" charset="-128"/>
               </a:rPr>
-              <a:t>Risiko #4 </a:t>
-            </a:r>
+              <a:t>Probleme:</a:t>
+            </a:r>
+          </a:p>
+          <a:p>
+            <a:pPr marL="514350" indent="-514350">
+              <a:buFont typeface="+mj-lt"/>
+              <a:buAutoNum type="arabicPeriod"/>
+            </a:pPr>
             <a:r>
               <a:rPr lang="de-DE" dirty="0" smtClean="0">
                 <a:latin typeface="Kozuka Gothic Pro L" pitchFamily="34" charset="-128"/>
                 <a:ea typeface="Kozuka Gothic Pro L" pitchFamily="34" charset="-128"/>
               </a:rPr>
-              <a:t>ist aufgetreten:</a:t>
+              <a:t>Zeitprobleme, da andere Projekte nebenbei am laufen waren</a:t>
             </a:r>
           </a:p>
           <a:p>
@@ -4432,39 +4578,29 @@
               <a:buNone/>
             </a:pPr>
             <a:r>
+              <a:rPr lang="de-DE" b="1" dirty="0" smtClean="0">
+                <a:solidFill>
+                  <a:srgbClr val="075E45"/>
+                </a:solidFill>
+                <a:latin typeface="Kozuka Gothic Pro L" pitchFamily="34" charset="-128"/>
+                <a:ea typeface="Kozuka Gothic Pro L" pitchFamily="34" charset="-128"/>
+              </a:rPr>
+              <a:t>Lösung:</a:t>
+            </a:r>
+          </a:p>
+          <a:p>
+            <a:pPr marL="514350" indent="-514350">
+              <a:buFont typeface="+mj-lt"/>
+              <a:buAutoNum type="arabicPeriod"/>
+            </a:pPr>
+            <a:r>
               <a:rPr lang="de-DE" dirty="0" smtClean="0">
                 <a:latin typeface="Kozuka Gothic Pro L" pitchFamily="34" charset="-128"/>
                 <a:ea typeface="Kozuka Gothic Pro L" pitchFamily="34" charset="-128"/>
               </a:rPr>
-              <a:t>       </a:t>
-            </a:r>
-            <a:r>
-              <a:rPr lang="de-DE" b="1" dirty="0" smtClean="0">
-                <a:latin typeface="Kozuka Gothic Pro L" pitchFamily="34" charset="-128"/>
-                <a:ea typeface="Kozuka Gothic Pro L" pitchFamily="34" charset="-128"/>
-              </a:rPr>
-              <a:t>falsche Zeitplanung</a:t>
-            </a:r>
-          </a:p>
-          <a:p>
-            <a:pPr>
-              <a:buNone/>
-            </a:pPr>
-            <a:r>
-              <a:rPr lang="de-DE" dirty="0" smtClean="0">
-                <a:latin typeface="Kozuka Gothic Pro L" pitchFamily="34" charset="-128"/>
-                <a:ea typeface="Kozuka Gothic Pro L" pitchFamily="34" charset="-128"/>
-              </a:rPr>
-              <a:t>Wahrscheinlichkeit des Auftretens: </a:t>
-            </a:r>
-            <a:r>
-              <a:rPr lang="de-DE" b="1" dirty="0" smtClean="0">
-                <a:latin typeface="Kozuka Gothic Pro L" pitchFamily="34" charset="-128"/>
-                <a:ea typeface="Kozuka Gothic Pro L" pitchFamily="34" charset="-128"/>
-              </a:rPr>
-              <a:t>50%</a:t>
-            </a:r>
-            <a:endParaRPr lang="de-DE" b="1" dirty="0">
+              <a:t>Zeitpuffer verwendet und manche Funktionen später implementiert -&gt; Aufgaben nach hinten verschoben</a:t>
+            </a:r>
+            <a:endParaRPr lang="de-DE" dirty="0">
               <a:latin typeface="Kozuka Gothic Pro L" pitchFamily="34" charset="-128"/>
               <a:ea typeface="Kozuka Gothic Pro L" pitchFamily="34" charset="-128"/>
             </a:endParaRPr>
@@ -4521,52 +4657,6 @@
           <a:noFill/>
         </p:spPr>
       </p:pic>
-      <p:sp>
-        <p:nvSpPr>
-          <p:cNvPr id="7" name="Right Arrow 6"/>
-          <p:cNvSpPr/>
-          <p:nvPr/>
-        </p:nvSpPr>
-        <p:spPr>
-          <a:xfrm>
-            <a:off x="285720" y="2857496"/>
-            <a:ext cx="642942" cy="436169"/>
-          </a:xfrm>
-          <a:prstGeom prst="rightArrow">
-            <a:avLst/>
-          </a:prstGeom>
-          <a:noFill/>
-          <a:ln w="38100">
-            <a:solidFill>
-              <a:srgbClr val="075E45"/>
-            </a:solidFill>
-          </a:ln>
-        </p:spPr>
-        <p:style>
-          <a:lnRef idx="2">
-            <a:schemeClr val="accent1">
-              <a:shade val="50000"/>
-            </a:schemeClr>
-          </a:lnRef>
-          <a:fillRef idx="1">
-            <a:schemeClr val="accent1"/>
-          </a:fillRef>
-          <a:effectRef idx="0">
-            <a:schemeClr val="accent1"/>
-          </a:effectRef>
-          <a:fontRef idx="minor">
-            <a:schemeClr val="lt1"/>
-          </a:fontRef>
-        </p:style>
-        <p:txBody>
-          <a:bodyPr rtlCol="0" anchor="ctr"/>
-          <a:lstStyle/>
-          <a:p>
-            <a:pPr algn="ctr"/>
-            <a:endParaRPr lang="de-DE"/>
-          </a:p>
-        </p:txBody>
-      </p:sp>
     </p:spTree>
   </p:cSld>
   <p:clrMapOvr>
@@ -4611,6 +4701,250 @@
         </p:nvSpPr>
         <p:spPr/>
         <p:txBody>
+          <a:bodyPr/>
+          <a:lstStyle/>
+          <a:p>
+            <a:r>
+              <a:rPr lang="de-DE" b="1" dirty="0" smtClean="0">
+                <a:latin typeface="Kozuka Gothic Pro L" pitchFamily="34" charset="-128"/>
+                <a:ea typeface="Kozuka Gothic Pro L" pitchFamily="34" charset="-128"/>
+              </a:rPr>
+              <a:t>„Sind Risiken eingetreten?“</a:t>
+            </a:r>
+            <a:endParaRPr lang="de-DE" b="1" dirty="0">
+              <a:latin typeface="Kozuka Gothic Pro L" pitchFamily="34" charset="-128"/>
+              <a:ea typeface="Kozuka Gothic Pro L" pitchFamily="34" charset="-128"/>
+            </a:endParaRPr>
+          </a:p>
+        </p:txBody>
+      </p:sp>
+      <p:sp>
+        <p:nvSpPr>
+          <p:cNvPr id="3" name="Content Placeholder 2"/>
+          <p:cNvSpPr>
+            <a:spLocks noGrp="1"/>
+          </p:cNvSpPr>
+          <p:nvPr>
+            <p:ph idx="1"/>
+          </p:nvPr>
+        </p:nvSpPr>
+        <p:spPr>
+          <a:xfrm>
+            <a:off x="285720" y="2214554"/>
+            <a:ext cx="8643998" cy="2257428"/>
+          </a:xfrm>
+        </p:spPr>
+        <p:txBody>
+          <a:bodyPr>
+            <a:normAutofit/>
+          </a:bodyPr>
+          <a:lstStyle/>
+          <a:p>
+            <a:pPr>
+              <a:buNone/>
+            </a:pPr>
+            <a:r>
+              <a:rPr lang="de-DE" b="1" dirty="0" smtClean="0">
+                <a:solidFill>
+                  <a:srgbClr val="C00000"/>
+                </a:solidFill>
+                <a:latin typeface="Kozuka Gothic Pro L" pitchFamily="34" charset="-128"/>
+                <a:ea typeface="Kozuka Gothic Pro L" pitchFamily="34" charset="-128"/>
+              </a:rPr>
+              <a:t>Risiko #4 </a:t>
+            </a:r>
+            <a:r>
+              <a:rPr lang="de-DE" dirty="0" smtClean="0">
+                <a:latin typeface="Kozuka Gothic Pro L" pitchFamily="34" charset="-128"/>
+                <a:ea typeface="Kozuka Gothic Pro L" pitchFamily="34" charset="-128"/>
+              </a:rPr>
+              <a:t>ist aufgetreten:</a:t>
+            </a:r>
+          </a:p>
+          <a:p>
+            <a:pPr>
+              <a:buNone/>
+            </a:pPr>
+            <a:r>
+              <a:rPr lang="de-DE" dirty="0" smtClean="0">
+                <a:latin typeface="Kozuka Gothic Pro L" pitchFamily="34" charset="-128"/>
+                <a:ea typeface="Kozuka Gothic Pro L" pitchFamily="34" charset="-128"/>
+              </a:rPr>
+              <a:t>       </a:t>
+            </a:r>
+            <a:r>
+              <a:rPr lang="de-DE" b="1" dirty="0" smtClean="0">
+                <a:latin typeface="Kozuka Gothic Pro L" pitchFamily="34" charset="-128"/>
+                <a:ea typeface="Kozuka Gothic Pro L" pitchFamily="34" charset="-128"/>
+              </a:rPr>
+              <a:t>falsche Zeitplanung</a:t>
+            </a:r>
+          </a:p>
+          <a:p>
+            <a:pPr>
+              <a:buNone/>
+            </a:pPr>
+            <a:r>
+              <a:rPr lang="de-DE" dirty="0" smtClean="0">
+                <a:latin typeface="Kozuka Gothic Pro L" pitchFamily="34" charset="-128"/>
+                <a:ea typeface="Kozuka Gothic Pro L" pitchFamily="34" charset="-128"/>
+              </a:rPr>
+              <a:t>Wahrscheinlichkeit des Auftretens: </a:t>
+            </a:r>
+            <a:r>
+              <a:rPr lang="de-DE" b="1" dirty="0" smtClean="0">
+                <a:latin typeface="Kozuka Gothic Pro L" pitchFamily="34" charset="-128"/>
+                <a:ea typeface="Kozuka Gothic Pro L" pitchFamily="34" charset="-128"/>
+              </a:rPr>
+              <a:t>50%</a:t>
+            </a:r>
+            <a:endParaRPr lang="de-DE" b="1" dirty="0">
+              <a:latin typeface="Kozuka Gothic Pro L" pitchFamily="34" charset="-128"/>
+              <a:ea typeface="Kozuka Gothic Pro L" pitchFamily="34" charset="-128"/>
+            </a:endParaRPr>
+          </a:p>
+        </p:txBody>
+      </p:sp>
+      <p:sp>
+        <p:nvSpPr>
+          <p:cNvPr id="6" name="Slide Number Placeholder 5"/>
+          <p:cNvSpPr>
+            <a:spLocks noGrp="1"/>
+          </p:cNvSpPr>
+          <p:nvPr>
+            <p:ph type="sldNum" sz="quarter" idx="12"/>
+          </p:nvPr>
+        </p:nvSpPr>
+        <p:spPr/>
+        <p:txBody>
+          <a:bodyPr/>
+          <a:lstStyle/>
+          <a:p>
+            <a:fld id="{785AF671-EB06-4FE0-B603-5597A3A057FF}" type="slidenum">
+              <a:rPr lang="de-DE" sz="1600" b="1" smtClean="0"/>
+              <a:pPr/>
+              <a:t>6</a:t>
+            </a:fld>
+            <a:endParaRPr lang="de-DE" sz="1600" b="1" dirty="0"/>
+          </a:p>
+        </p:txBody>
+      </p:sp>
+      <p:pic>
+        <p:nvPicPr>
+          <p:cNvPr id="8" name="Picture 2" descr="D:\Documents\Dropbox\E-Health SS19\Bilder\Logo-spiegel.png"/>
+          <p:cNvPicPr>
+            <a:picLocks noChangeAspect="1" noChangeArrowheads="1"/>
+          </p:cNvPicPr>
+          <p:nvPr/>
+        </p:nvPicPr>
+        <p:blipFill>
+          <a:blip r:embed="rId2" cstate="print"/>
+          <a:srcRect/>
+          <a:stretch>
+            <a:fillRect/>
+          </a:stretch>
+        </p:blipFill>
+        <p:spPr bwMode="auto">
+          <a:xfrm>
+            <a:off x="71406" y="5715016"/>
+            <a:ext cx="1143008" cy="1143008"/>
+          </a:xfrm>
+          <a:prstGeom prst="rect">
+            <a:avLst/>
+          </a:prstGeom>
+          <a:noFill/>
+        </p:spPr>
+      </p:pic>
+      <p:sp>
+        <p:nvSpPr>
+          <p:cNvPr id="7" name="Right Arrow 6"/>
+          <p:cNvSpPr/>
+          <p:nvPr/>
+        </p:nvSpPr>
+        <p:spPr>
+          <a:xfrm>
+            <a:off x="285720" y="2857496"/>
+            <a:ext cx="642942" cy="436169"/>
+          </a:xfrm>
+          <a:prstGeom prst="rightArrow">
+            <a:avLst/>
+          </a:prstGeom>
+          <a:noFill/>
+          <a:ln w="38100">
+            <a:solidFill>
+              <a:srgbClr val="075E45"/>
+            </a:solidFill>
+          </a:ln>
+        </p:spPr>
+        <p:style>
+          <a:lnRef idx="2">
+            <a:schemeClr val="accent1">
+              <a:shade val="50000"/>
+            </a:schemeClr>
+          </a:lnRef>
+          <a:fillRef idx="1">
+            <a:schemeClr val="accent1"/>
+          </a:fillRef>
+          <a:effectRef idx="0">
+            <a:schemeClr val="accent1"/>
+          </a:effectRef>
+          <a:fontRef idx="minor">
+            <a:schemeClr val="lt1"/>
+          </a:fontRef>
+        </p:style>
+        <p:txBody>
+          <a:bodyPr rtlCol="0" anchor="ctr"/>
+          <a:lstStyle/>
+          <a:p>
+            <a:pPr algn="ctr"/>
+            <a:endParaRPr lang="de-DE"/>
+          </a:p>
+        </p:txBody>
+      </p:sp>
+    </p:spTree>
+  </p:cSld>
+  <p:clrMapOvr>
+    <a:masterClrMapping/>
+  </p:clrMapOvr>
+  <p:timing>
+    <p:tnLst>
+      <p:par>
+        <p:cTn id="1" dur="indefinite" restart="never" nodeType="tmRoot"/>
+      </p:par>
+    </p:tnLst>
+  </p:timing>
+</p:sld>
+</file>
+
+<file path=ppt/slides/slide7.xml><?xml version="1.0" encoding="utf-8"?>
+<p:sld xmlns:a="http://schemas.openxmlformats.org/drawingml/2006/main" xmlns:r="http://schemas.openxmlformats.org/officeDocument/2006/relationships" xmlns:p="http://schemas.openxmlformats.org/presentationml/2006/main">
+  <p:cSld>
+    <p:spTree>
+      <p:nvGrpSpPr>
+        <p:cNvPr id="1" name=""/>
+        <p:cNvGrpSpPr/>
+        <p:nvPr/>
+      </p:nvGrpSpPr>
+      <p:grpSpPr>
+        <a:xfrm>
+          <a:off x="0" y="0"/>
+          <a:ext cx="0" cy="0"/>
+          <a:chOff x="0" y="0"/>
+          <a:chExt cx="0" cy="0"/>
+        </a:xfrm>
+      </p:grpSpPr>
+      <p:sp>
+        <p:nvSpPr>
+          <p:cNvPr id="2" name="Title 1"/>
+          <p:cNvSpPr>
+            <a:spLocks noGrp="1"/>
+          </p:cNvSpPr>
+          <p:nvPr>
+            <p:ph type="title"/>
+          </p:nvPr>
+        </p:nvSpPr>
+        <p:spPr/>
+        <p:txBody>
           <a:bodyPr>
             <a:normAutofit fontScale="90000"/>
           </a:bodyPr>
@@ -4672,44 +5006,46 @@
                 <a:latin typeface="Kozuka Gothic Pro L" pitchFamily="34" charset="-128"/>
                 <a:ea typeface="Kozuka Gothic Pro L" pitchFamily="34" charset="-128"/>
               </a:rPr>
-              <a:t>Client JS</a:t>
-            </a:r>
-          </a:p>
-          <a:p>
-            <a:pPr marL="514350" indent="-514350">
-              <a:buAutoNum type="arabicPeriod"/>
-            </a:pPr>
-            <a:r>
-              <a:rPr lang="de-DE" dirty="0" smtClean="0">
-                <a:latin typeface="Kozuka Gothic Pro L" pitchFamily="34" charset="-128"/>
-                <a:ea typeface="Kozuka Gothic Pro L" pitchFamily="34" charset="-128"/>
-              </a:rPr>
-              <a:t>Dokumentation</a:t>
-            </a:r>
-          </a:p>
-          <a:p>
-            <a:pPr marL="514350" indent="-514350">
-              <a:buAutoNum type="arabicPeriod"/>
-            </a:pPr>
-            <a:r>
-              <a:rPr lang="de-DE" dirty="0" smtClean="0">
-                <a:latin typeface="Kozuka Gothic Pro L" pitchFamily="34" charset="-128"/>
-                <a:ea typeface="Kozuka Gothic Pro L" pitchFamily="34" charset="-128"/>
-              </a:rPr>
-              <a:t>Test </a:t>
-            </a:r>
-            <a:r>
-              <a:rPr lang="de-DE" smtClean="0">
-                <a:latin typeface="Kozuka Gothic Pro L" pitchFamily="34" charset="-128"/>
-                <a:ea typeface="Kozuka Gothic Pro L" pitchFamily="34" charset="-128"/>
-              </a:rPr>
-              <a:t>Client JS mit Testdaten</a:t>
+              <a:t>Webserver in https umschreiben</a:t>
             </a:r>
             <a:endParaRPr lang="de-DE" dirty="0" smtClean="0">
               <a:latin typeface="Kozuka Gothic Pro L" pitchFamily="34" charset="-128"/>
               <a:ea typeface="Kozuka Gothic Pro L" pitchFamily="34" charset="-128"/>
             </a:endParaRPr>
           </a:p>
+          <a:p>
+            <a:pPr marL="514350" indent="-514350">
+              <a:buAutoNum type="arabicPeriod"/>
+            </a:pPr>
+            <a:r>
+              <a:rPr lang="de-DE" dirty="0" smtClean="0">
+                <a:latin typeface="Kozuka Gothic Pro L" pitchFamily="34" charset="-128"/>
+                <a:ea typeface="Kozuka Gothic Pro L" pitchFamily="34" charset="-128"/>
+              </a:rPr>
+              <a:t>Client JS</a:t>
+            </a:r>
+          </a:p>
+          <a:p>
+            <a:pPr marL="514350" indent="-514350">
+              <a:buAutoNum type="arabicPeriod"/>
+            </a:pPr>
+            <a:r>
+              <a:rPr lang="de-DE" dirty="0" smtClean="0">
+                <a:latin typeface="Kozuka Gothic Pro L" pitchFamily="34" charset="-128"/>
+                <a:ea typeface="Kozuka Gothic Pro L" pitchFamily="34" charset="-128"/>
+              </a:rPr>
+              <a:t>Dokumentation</a:t>
+            </a:r>
+          </a:p>
+          <a:p>
+            <a:pPr marL="514350" indent="-514350">
+              <a:buNone/>
+            </a:pPr>
+            <a:endParaRPr lang="de-DE" dirty="0" smtClean="0">
+              <a:latin typeface="Kozuka Gothic Pro L" pitchFamily="34" charset="-128"/>
+              <a:ea typeface="Kozuka Gothic Pro L" pitchFamily="34" charset="-128"/>
+            </a:endParaRPr>
+          </a:p>
         </p:txBody>
       </p:sp>
       <p:sp>
@@ -4730,7 +5066,7 @@
             <a:fld id="{785AF671-EB06-4FE0-B603-5597A3A057FF}" type="slidenum">
               <a:rPr lang="de-DE" sz="1600" b="1" smtClean="0"/>
               <a:pPr/>
-              <a:t>6</a:t>
+              <a:t>7</a:t>
             </a:fld>
             <a:endParaRPr lang="de-DE" sz="1600" b="1" dirty="0"/>
           </a:p>
@@ -4770,7 +5106,7 @@
 </p:sld>
 </file>
 
-<file path=ppt/slides/slide7.xml><?xml version="1.0" encoding="utf-8"?>
+<file path=ppt/slides/slide8.xml><?xml version="1.0" encoding="utf-8"?>
 <p:sld xmlns:a="http://schemas.openxmlformats.org/drawingml/2006/main" xmlns:r="http://schemas.openxmlformats.org/officeDocument/2006/relationships" xmlns:p="http://schemas.openxmlformats.org/presentationml/2006/main">
   <p:cSld>
     <p:spTree>
@@ -4976,7 +5312,7 @@
             <a:fld id="{785AF671-EB06-4FE0-B603-5597A3A057FF}" type="slidenum">
               <a:rPr lang="de-DE" sz="1600" b="1" smtClean="0"/>
               <a:pPr/>
-              <a:t>7</a:t>
+              <a:t>8</a:t>
             </a:fld>
             <a:endParaRPr lang="de-DE" sz="1600" b="1" dirty="0"/>
           </a:p>
@@ -4997,7 +5333,7 @@
 </p:sld>
 </file>
 
-<file path=ppt/slides/slide8.xml><?xml version="1.0" encoding="utf-8"?>
+<file path=ppt/slides/slide9.xml><?xml version="1.0" encoding="utf-8"?>
 <p:sld xmlns:a="http://schemas.openxmlformats.org/drawingml/2006/main" xmlns:r="http://schemas.openxmlformats.org/officeDocument/2006/relationships" xmlns:p="http://schemas.openxmlformats.org/presentationml/2006/main">
   <p:cSld>
     <p:spTree>

</xml_diff>

<commit_message>
use case in ptäsentation
</commit_message>
<xml_diff>
--- a/Doku/Präsentation.pptx
+++ b/Doku/Präsentation.pptx
@@ -5,18 +5,19 @@
     <p:sldMasterId id="2147483648" r:id="rId1"/>
   </p:sldMasterIdLst>
   <p:notesMasterIdLst>
-    <p:notesMasterId r:id="rId11"/>
+    <p:notesMasterId r:id="rId12"/>
   </p:notesMasterIdLst>
   <p:sldIdLst>
     <p:sldId id="256" r:id="rId2"/>
     <p:sldId id="265" r:id="rId3"/>
-    <p:sldId id="257" r:id="rId4"/>
-    <p:sldId id="261" r:id="rId5"/>
-    <p:sldId id="259" r:id="rId6"/>
-    <p:sldId id="263" r:id="rId7"/>
-    <p:sldId id="264" r:id="rId8"/>
-    <p:sldId id="260" r:id="rId9"/>
-    <p:sldId id="262" r:id="rId10"/>
+    <p:sldId id="266" r:id="rId4"/>
+    <p:sldId id="257" r:id="rId5"/>
+    <p:sldId id="261" r:id="rId6"/>
+    <p:sldId id="259" r:id="rId7"/>
+    <p:sldId id="263" r:id="rId8"/>
+    <p:sldId id="264" r:id="rId9"/>
+    <p:sldId id="260" r:id="rId10"/>
+    <p:sldId id="262" r:id="rId11"/>
   </p:sldIdLst>
   <p:sldSz cx="9144000" cy="6858000" type="screen4x3"/>
   <p:notesSz cx="6858000" cy="9144000"/>
@@ -117,7 +118,7 @@
   </p:defaultTextStyle>
   <p:extLst>
     <p:ext uri="{EFAFB233-063F-42B5-8137-9DF3F51BA10A}">
-      <p15:sldGuideLst xmlns:p15="http://schemas.microsoft.com/office/powerpoint/2012/main">
+      <p15:sldGuideLst xmlns:p15="http://schemas.microsoft.com/office/powerpoint/2012/main" xmlns="">
         <p15:guide id="1" orient="horz" pos="2160">
           <p15:clr>
             <a:srgbClr val="A4A3A4"/>
@@ -379,7 +380,7 @@
             <a:fld id="{3B16891C-C2E0-47D2-A56C-EEE7025CCCA9}" type="slidenum">
               <a:rPr lang="de-DE" smtClean="0"/>
               <a:pPr/>
-              <a:t>‹Nr.›</a:t>
+              <a:t>‹#›</a:t>
             </a:fld>
             <a:endParaRPr lang="de-DE"/>
           </a:p>
@@ -708,7 +709,7 @@
             <a:fld id="{785AF671-EB06-4FE0-B603-5597A3A057FF}" type="slidenum">
               <a:rPr lang="de-DE" smtClean="0"/>
               <a:pPr/>
-              <a:t>‹Nr.›</a:t>
+              <a:t>‹#›</a:t>
             </a:fld>
             <a:endParaRPr lang="de-DE"/>
           </a:p>
@@ -875,7 +876,7 @@
             <a:fld id="{785AF671-EB06-4FE0-B603-5597A3A057FF}" type="slidenum">
               <a:rPr lang="de-DE" smtClean="0"/>
               <a:pPr/>
-              <a:t>‹Nr.›</a:t>
+              <a:t>‹#›</a:t>
             </a:fld>
             <a:endParaRPr lang="de-DE"/>
           </a:p>
@@ -1052,7 +1053,7 @@
             <a:fld id="{785AF671-EB06-4FE0-B603-5597A3A057FF}" type="slidenum">
               <a:rPr lang="de-DE" smtClean="0"/>
               <a:pPr/>
-              <a:t>‹Nr.›</a:t>
+              <a:t>‹#›</a:t>
             </a:fld>
             <a:endParaRPr lang="de-DE"/>
           </a:p>
@@ -1219,7 +1220,7 @@
             <a:fld id="{785AF671-EB06-4FE0-B603-5597A3A057FF}" type="slidenum">
               <a:rPr lang="de-DE" smtClean="0"/>
               <a:pPr/>
-              <a:t>‹Nr.›</a:t>
+              <a:t>‹#›</a:t>
             </a:fld>
             <a:endParaRPr lang="de-DE"/>
           </a:p>
@@ -1462,7 +1463,7 @@
             <a:fld id="{785AF671-EB06-4FE0-B603-5597A3A057FF}" type="slidenum">
               <a:rPr lang="de-DE" smtClean="0"/>
               <a:pPr/>
-              <a:t>‹Nr.›</a:t>
+              <a:t>‹#›</a:t>
             </a:fld>
             <a:endParaRPr lang="de-DE"/>
           </a:p>
@@ -1747,7 +1748,7 @@
             <a:fld id="{785AF671-EB06-4FE0-B603-5597A3A057FF}" type="slidenum">
               <a:rPr lang="de-DE" smtClean="0"/>
               <a:pPr/>
-              <a:t>‹Nr.›</a:t>
+              <a:t>‹#›</a:t>
             </a:fld>
             <a:endParaRPr lang="de-DE"/>
           </a:p>
@@ -2166,7 +2167,7 @@
             <a:fld id="{785AF671-EB06-4FE0-B603-5597A3A057FF}" type="slidenum">
               <a:rPr lang="de-DE" smtClean="0"/>
               <a:pPr/>
-              <a:t>‹Nr.›</a:t>
+              <a:t>‹#›</a:t>
             </a:fld>
             <a:endParaRPr lang="de-DE"/>
           </a:p>
@@ -2281,7 +2282,7 @@
             <a:fld id="{785AF671-EB06-4FE0-B603-5597A3A057FF}" type="slidenum">
               <a:rPr lang="de-DE" smtClean="0"/>
               <a:pPr/>
-              <a:t>‹Nr.›</a:t>
+              <a:t>‹#›</a:t>
             </a:fld>
             <a:endParaRPr lang="de-DE"/>
           </a:p>
@@ -2373,7 +2374,7 @@
             <a:fld id="{785AF671-EB06-4FE0-B603-5597A3A057FF}" type="slidenum">
               <a:rPr lang="de-DE" smtClean="0"/>
               <a:pPr/>
-              <a:t>‹Nr.›</a:t>
+              <a:t>‹#›</a:t>
             </a:fld>
             <a:endParaRPr lang="de-DE"/>
           </a:p>
@@ -2647,7 +2648,7 @@
             <a:fld id="{785AF671-EB06-4FE0-B603-5597A3A057FF}" type="slidenum">
               <a:rPr lang="de-DE" smtClean="0"/>
               <a:pPr/>
-              <a:t>‹Nr.›</a:t>
+              <a:t>‹#›</a:t>
             </a:fld>
             <a:endParaRPr lang="de-DE"/>
           </a:p>
@@ -2897,7 +2898,7 @@
             <a:fld id="{785AF671-EB06-4FE0-B603-5597A3A057FF}" type="slidenum">
               <a:rPr lang="de-DE" smtClean="0"/>
               <a:pPr/>
-              <a:t>‹Nr.›</a:t>
+              <a:t>‹#›</a:t>
             </a:fld>
             <a:endParaRPr lang="de-DE"/>
           </a:p>
@@ -3149,7 +3150,7 @@
             <a:fld id="{785AF671-EB06-4FE0-B603-5597A3A057FF}" type="slidenum">
               <a:rPr lang="de-DE" smtClean="0"/>
               <a:pPr/>
-              <a:t>‹Nr.›</a:t>
+              <a:t>‹#›</a:t>
             </a:fld>
             <a:endParaRPr lang="de-DE"/>
           </a:p>
@@ -3564,6 +3565,109 @@
   <p:clrMapOvr>
     <a:masterClrMapping/>
   </p:clrMapOvr>
+  <p:timing>
+    <p:tnLst>
+      <p:par>
+        <p:cTn id="1" dur="indefinite" restart="never" nodeType="tmRoot"/>
+      </p:par>
+    </p:tnLst>
+  </p:timing>
+</p:sld>
+</file>
+
+<file path=ppt/slides/slide10.xml><?xml version="1.0" encoding="utf-8"?>
+<p:sld xmlns:a="http://schemas.openxmlformats.org/drawingml/2006/main" xmlns:r="http://schemas.openxmlformats.org/officeDocument/2006/relationships" xmlns:p="http://schemas.openxmlformats.org/presentationml/2006/main">
+  <p:cSld>
+    <p:spTree>
+      <p:nvGrpSpPr>
+        <p:cNvPr id="1" name=""/>
+        <p:cNvGrpSpPr/>
+        <p:nvPr/>
+      </p:nvGrpSpPr>
+      <p:grpSpPr>
+        <a:xfrm>
+          <a:off x="0" y="0"/>
+          <a:ext cx="0" cy="0"/>
+          <a:chOff x="0" y="0"/>
+          <a:chExt cx="0" cy="0"/>
+        </a:xfrm>
+      </p:grpSpPr>
+      <p:pic>
+        <p:nvPicPr>
+          <p:cNvPr id="4098" name="Picture 2" descr="D:\Documents\Dropbox\E-Health SS19\Bilder\hintergrund.jpg"/>
+          <p:cNvPicPr>
+            <a:picLocks noChangeAspect="1" noChangeArrowheads="1"/>
+          </p:cNvPicPr>
+          <p:nvPr/>
+        </p:nvPicPr>
+        <p:blipFill>
+          <a:blip r:embed="rId2" cstate="print"/>
+          <a:srcRect/>
+          <a:stretch>
+            <a:fillRect/>
+          </a:stretch>
+        </p:blipFill>
+        <p:spPr bwMode="auto">
+          <a:xfrm>
+            <a:off x="0" y="0"/>
+            <a:ext cx="9143999" cy="6858000"/>
+          </a:xfrm>
+          <a:prstGeom prst="rect">
+            <a:avLst/>
+          </a:prstGeom>
+          <a:noFill/>
+        </p:spPr>
+      </p:pic>
+      <p:sp>
+        <p:nvSpPr>
+          <p:cNvPr id="3" name="Content Placeholder 2"/>
+          <p:cNvSpPr>
+            <a:spLocks noGrp="1"/>
+          </p:cNvSpPr>
+          <p:nvPr>
+            <p:ph idx="1"/>
+          </p:nvPr>
+        </p:nvSpPr>
+        <p:spPr>
+          <a:xfrm>
+            <a:off x="3071802" y="4000504"/>
+            <a:ext cx="5214974" cy="1357322"/>
+          </a:xfrm>
+        </p:spPr>
+        <p:txBody>
+          <a:bodyPr>
+            <a:noAutofit/>
+          </a:bodyPr>
+          <a:lstStyle/>
+          <a:p>
+            <a:pPr marL="514350" indent="-514350" algn="ctr">
+              <a:buNone/>
+            </a:pPr>
+            <a:r>
+              <a:rPr lang="de-DE" b="1" dirty="0">
+                <a:solidFill>
+                  <a:schemeClr val="bg1"/>
+                </a:solidFill>
+                <a:latin typeface="Kozuka Gothic Pro L" pitchFamily="34" charset="-128"/>
+                <a:ea typeface="Kozuka Gothic Pro L" pitchFamily="34" charset="-128"/>
+              </a:rPr>
+              <a:t>Danke Für Eure Aufmerksamkeit!</a:t>
+            </a:r>
+          </a:p>
+        </p:txBody>
+      </p:sp>
+    </p:spTree>
+  </p:cSld>
+  <p:clrMapOvr>
+    <a:masterClrMapping/>
+  </p:clrMapOvr>
+  <p:timing>
+    <p:tnLst>
+      <p:par>
+        <p:cTn id="1" dur="indefinite" restart="never" nodeType="tmRoot"/>
+      </p:par>
+    </p:tnLst>
+  </p:timing>
 </p:sld>
 </file>
 
@@ -3782,6 +3886,13 @@
   <p:clrMapOvr>
     <a:masterClrMapping/>
   </p:clrMapOvr>
+  <p:timing>
+    <p:tnLst>
+      <p:par>
+        <p:cTn id="1" dur="indefinite" restart="never" nodeType="tmRoot"/>
+      </p:par>
+    </p:tnLst>
+  </p:timing>
 </p:sld>
 </file>
 
@@ -3814,6 +3925,145 @@
         </p:nvSpPr>
         <p:spPr/>
         <p:txBody>
+          <a:bodyPr>
+            <a:normAutofit/>
+          </a:bodyPr>
+          <a:lstStyle/>
+          <a:p>
+            <a:r>
+              <a:rPr lang="de-DE" b="1" dirty="0" smtClean="0">
+                <a:latin typeface="Kozuka Gothic Pro L" pitchFamily="34" charset="-128"/>
+                <a:ea typeface="Kozuka Gothic Pro L" pitchFamily="34" charset="-128"/>
+              </a:rPr>
+              <a:t>Use Case</a:t>
+            </a:r>
+            <a:endParaRPr lang="de-DE" b="1" dirty="0">
+              <a:latin typeface="Kozuka Gothic Pro L" pitchFamily="34" charset="-128"/>
+              <a:ea typeface="Kozuka Gothic Pro L" pitchFamily="34" charset="-128"/>
+            </a:endParaRPr>
+          </a:p>
+        </p:txBody>
+      </p:sp>
+      <p:sp>
+        <p:nvSpPr>
+          <p:cNvPr id="6" name="Slide Number Placeholder 5"/>
+          <p:cNvSpPr>
+            <a:spLocks noGrp="1"/>
+          </p:cNvSpPr>
+          <p:nvPr>
+            <p:ph type="sldNum" sz="quarter" idx="12"/>
+          </p:nvPr>
+        </p:nvSpPr>
+        <p:spPr/>
+        <p:txBody>
+          <a:bodyPr/>
+          <a:lstStyle/>
+          <a:p>
+            <a:fld id="{785AF671-EB06-4FE0-B603-5597A3A057FF}" type="slidenum">
+              <a:rPr lang="de-DE" sz="1600" b="1" smtClean="0"/>
+              <a:pPr/>
+              <a:t>3</a:t>
+            </a:fld>
+            <a:endParaRPr lang="de-DE" sz="1600" b="1" dirty="0"/>
+          </a:p>
+        </p:txBody>
+      </p:sp>
+      <p:pic>
+        <p:nvPicPr>
+          <p:cNvPr id="8" name="Picture 2" descr="D:\Documents\Dropbox\E-Health SS19\Bilder\Logo-spiegel.png"/>
+          <p:cNvPicPr>
+            <a:picLocks noChangeAspect="1" noChangeArrowheads="1"/>
+          </p:cNvPicPr>
+          <p:nvPr/>
+        </p:nvPicPr>
+        <p:blipFill>
+          <a:blip r:embed="rId2" cstate="print"/>
+          <a:srcRect/>
+          <a:stretch>
+            <a:fillRect/>
+          </a:stretch>
+        </p:blipFill>
+        <p:spPr bwMode="auto">
+          <a:xfrm>
+            <a:off x="71406" y="5715016"/>
+            <a:ext cx="1143008" cy="1143008"/>
+          </a:xfrm>
+          <a:prstGeom prst="rect">
+            <a:avLst/>
+          </a:prstGeom>
+          <a:noFill/>
+        </p:spPr>
+      </p:pic>
+      <p:pic>
+        <p:nvPicPr>
+          <p:cNvPr id="3" name="Picture 2" descr="D:\Documents\Dropbox\E-Health SS19\Bilder\use_case.jpg"/>
+          <p:cNvPicPr>
+            <a:picLocks noChangeAspect="1" noChangeArrowheads="1"/>
+          </p:cNvPicPr>
+          <p:nvPr/>
+        </p:nvPicPr>
+        <p:blipFill>
+          <a:blip r:embed="rId3" cstate="print"/>
+          <a:srcRect/>
+          <a:stretch>
+            <a:fillRect/>
+          </a:stretch>
+        </p:blipFill>
+        <p:spPr bwMode="auto">
+          <a:xfrm>
+            <a:off x="1928794" y="1214422"/>
+            <a:ext cx="5448312" cy="5448313"/>
+          </a:xfrm>
+          <a:prstGeom prst="rect">
+            <a:avLst/>
+          </a:prstGeom>
+          <a:noFill/>
+        </p:spPr>
+      </p:pic>
+    </p:spTree>
+  </p:cSld>
+  <p:clrMapOvr>
+    <a:masterClrMapping/>
+  </p:clrMapOvr>
+  <p:timing>
+    <p:tnLst>
+      <p:par>
+        <p:cTn id="1" dur="indefinite" restart="never" nodeType="tmRoot"/>
+      </p:par>
+    </p:tnLst>
+  </p:timing>
+</p:sld>
+</file>
+
+<file path=ppt/slides/slide4.xml><?xml version="1.0" encoding="utf-8"?>
+<p:sld xmlns:a="http://schemas.openxmlformats.org/drawingml/2006/main" xmlns:r="http://schemas.openxmlformats.org/officeDocument/2006/relationships" xmlns:p="http://schemas.openxmlformats.org/presentationml/2006/main">
+  <p:cSld>
+    <p:spTree>
+      <p:nvGrpSpPr>
+        <p:cNvPr id="1" name=""/>
+        <p:cNvGrpSpPr/>
+        <p:nvPr/>
+      </p:nvGrpSpPr>
+      <p:grpSpPr>
+        <a:xfrm>
+          <a:off x="0" y="0"/>
+          <a:ext cx="0" cy="0"/>
+          <a:chOff x="0" y="0"/>
+          <a:chExt cx="0" cy="0"/>
+        </a:xfrm>
+      </p:grpSpPr>
+      <p:sp>
+        <p:nvSpPr>
+          <p:cNvPr id="2" name="Title 1"/>
+          <p:cNvSpPr>
+            <a:spLocks noGrp="1"/>
+          </p:cNvSpPr>
+          <p:nvPr>
+            <p:ph type="title"/>
+          </p:nvPr>
+        </p:nvSpPr>
+        <p:spPr/>
+        <p:txBody>
           <a:bodyPr/>
           <a:lstStyle/>
           <a:p>
@@ -4126,7 +4376,7 @@
             <a:fld id="{785AF671-EB06-4FE0-B603-5597A3A057FF}" type="slidenum">
               <a:rPr lang="de-DE" sz="1600" b="1" smtClean="0"/>
               <a:pPr/>
-              <a:t>3</a:t>
+              <a:t>4</a:t>
             </a:fld>
             <a:endParaRPr lang="de-DE" sz="1600" b="1" dirty="0"/>
           </a:p>
@@ -4163,10 +4413,17 @@
   <p:clrMapOvr>
     <a:masterClrMapping/>
   </p:clrMapOvr>
+  <p:timing>
+    <p:tnLst>
+      <p:par>
+        <p:cTn id="1" dur="indefinite" restart="never" nodeType="tmRoot"/>
+      </p:par>
+    </p:tnLst>
+  </p:timing>
 </p:sld>
 </file>
 
-<file path=ppt/slides/slide4.xml><?xml version="1.0" encoding="utf-8"?>
+<file path=ppt/slides/slide5.xml><?xml version="1.0" encoding="utf-8"?>
 <p:sld xmlns:a="http://schemas.openxmlformats.org/drawingml/2006/main" xmlns:r="http://schemas.openxmlformats.org/officeDocument/2006/relationships" xmlns:p="http://schemas.openxmlformats.org/presentationml/2006/main">
   <p:cSld>
     <p:spTree>
@@ -4363,7 +4620,7 @@
             <a:fld id="{785AF671-EB06-4FE0-B603-5597A3A057FF}" type="slidenum">
               <a:rPr lang="de-DE" sz="1600" b="1" smtClean="0"/>
               <a:pPr/>
-              <a:t>4</a:t>
+              <a:t>5</a:t>
             </a:fld>
             <a:endParaRPr lang="de-DE" sz="1600" b="1" dirty="0"/>
           </a:p>
@@ -4400,10 +4657,17 @@
   <p:clrMapOvr>
     <a:masterClrMapping/>
   </p:clrMapOvr>
+  <p:timing>
+    <p:tnLst>
+      <p:par>
+        <p:cTn id="1" dur="indefinite" restart="never" nodeType="tmRoot"/>
+      </p:par>
+    </p:tnLst>
+  </p:timing>
 </p:sld>
 </file>
 
-<file path=ppt/slides/slide5.xml><?xml version="1.0" encoding="utf-8"?>
+<file path=ppt/slides/slide6.xml><?xml version="1.0" encoding="utf-8"?>
 <p:sld xmlns:a="http://schemas.openxmlformats.org/drawingml/2006/main" xmlns:r="http://schemas.openxmlformats.org/officeDocument/2006/relationships" xmlns:p="http://schemas.openxmlformats.org/presentationml/2006/main">
   <p:cSld>
     <p:spTree>
@@ -4542,7 +4806,7 @@
             <a:fld id="{785AF671-EB06-4FE0-B603-5597A3A057FF}" type="slidenum">
               <a:rPr lang="de-DE" sz="1600" b="1" smtClean="0"/>
               <a:pPr/>
-              <a:t>5</a:t>
+              <a:t>6</a:t>
             </a:fld>
             <a:endParaRPr lang="de-DE" sz="1600" b="1" dirty="0"/>
           </a:p>
@@ -4579,10 +4843,17 @@
   <p:clrMapOvr>
     <a:masterClrMapping/>
   </p:clrMapOvr>
+  <p:timing>
+    <p:tnLst>
+      <p:par>
+        <p:cTn id="1" dur="indefinite" restart="never" nodeType="tmRoot"/>
+      </p:par>
+    </p:tnLst>
+  </p:timing>
 </p:sld>
 </file>
 
-<file path=ppt/slides/slide6.xml><?xml version="1.0" encoding="utf-8"?>
+<file path=ppt/slides/slide7.xml><?xml version="1.0" encoding="utf-8"?>
 <p:sld xmlns:a="http://schemas.openxmlformats.org/drawingml/2006/main" xmlns:r="http://schemas.openxmlformats.org/officeDocument/2006/relationships" xmlns:p="http://schemas.openxmlformats.org/presentationml/2006/main">
   <p:cSld>
     <p:spTree>
@@ -4725,7 +4996,7 @@
             <a:fld id="{785AF671-EB06-4FE0-B603-5597A3A057FF}" type="slidenum">
               <a:rPr lang="de-DE" sz="1600" b="1" smtClean="0"/>
               <a:pPr/>
-              <a:t>6</a:t>
+              <a:t>7</a:t>
             </a:fld>
             <a:endParaRPr lang="de-DE" sz="1600" b="1" dirty="0"/>
           </a:p>
@@ -4808,10 +5079,17 @@
   <p:clrMapOvr>
     <a:masterClrMapping/>
   </p:clrMapOvr>
+  <p:timing>
+    <p:tnLst>
+      <p:par>
+        <p:cTn id="1" dur="indefinite" restart="never" nodeType="tmRoot"/>
+      </p:par>
+    </p:tnLst>
+  </p:timing>
 </p:sld>
 </file>
 
-<file path=ppt/slides/slide7.xml><?xml version="1.0" encoding="utf-8"?>
+<file path=ppt/slides/slide8.xml><?xml version="1.0" encoding="utf-8"?>
 <p:sld xmlns:a="http://schemas.openxmlformats.org/drawingml/2006/main" xmlns:r="http://schemas.openxmlformats.org/officeDocument/2006/relationships" xmlns:p="http://schemas.openxmlformats.org/presentationml/2006/main">
   <p:cSld>
     <p:spTree>
@@ -4953,7 +5231,7 @@
             <a:fld id="{785AF671-EB06-4FE0-B603-5597A3A057FF}" type="slidenum">
               <a:rPr lang="de-DE" sz="1600" b="1" smtClean="0"/>
               <a:pPr/>
-              <a:t>7</a:t>
+              <a:t>8</a:t>
             </a:fld>
             <a:endParaRPr lang="de-DE" sz="1600" b="1" dirty="0"/>
           </a:p>
@@ -4990,10 +5268,17 @@
   <p:clrMapOvr>
     <a:masterClrMapping/>
   </p:clrMapOvr>
+  <p:timing>
+    <p:tnLst>
+      <p:par>
+        <p:cTn id="1" dur="indefinite" restart="never" nodeType="tmRoot"/>
+      </p:par>
+    </p:tnLst>
+  </p:timing>
 </p:sld>
 </file>
 
-<file path=ppt/slides/slide8.xml><?xml version="1.0" encoding="utf-8"?>
+<file path=ppt/slides/slide9.xml><?xml version="1.0" encoding="utf-8"?>
 <p:sld xmlns:a="http://schemas.openxmlformats.org/drawingml/2006/main" xmlns:r="http://schemas.openxmlformats.org/officeDocument/2006/relationships" xmlns:p="http://schemas.openxmlformats.org/presentationml/2006/main">
   <p:cSld>
     <p:spTree>
@@ -5195,7 +5480,7 @@
             <a:fld id="{785AF671-EB06-4FE0-B603-5597A3A057FF}" type="slidenum">
               <a:rPr lang="de-DE" sz="1600" b="1" smtClean="0"/>
               <a:pPr/>
-              <a:t>8</a:t>
+              <a:t>9</a:t>
             </a:fld>
             <a:endParaRPr lang="de-DE" sz="1600" b="1" dirty="0"/>
           </a:p>
@@ -5206,95 +5491,13 @@
   <p:clrMapOvr>
     <a:masterClrMapping/>
   </p:clrMapOvr>
-</p:sld>
-</file>
-
-<file path=ppt/slides/slide9.xml><?xml version="1.0" encoding="utf-8"?>
-<p:sld xmlns:a="http://schemas.openxmlformats.org/drawingml/2006/main" xmlns:r="http://schemas.openxmlformats.org/officeDocument/2006/relationships" xmlns:p="http://schemas.openxmlformats.org/presentationml/2006/main">
-  <p:cSld>
-    <p:spTree>
-      <p:nvGrpSpPr>
-        <p:cNvPr id="1" name=""/>
-        <p:cNvGrpSpPr/>
-        <p:nvPr/>
-      </p:nvGrpSpPr>
-      <p:grpSpPr>
-        <a:xfrm>
-          <a:off x="0" y="0"/>
-          <a:ext cx="0" cy="0"/>
-          <a:chOff x="0" y="0"/>
-          <a:chExt cx="0" cy="0"/>
-        </a:xfrm>
-      </p:grpSpPr>
-      <p:pic>
-        <p:nvPicPr>
-          <p:cNvPr id="4098" name="Picture 2" descr="D:\Documents\Dropbox\E-Health SS19\Bilder\hintergrund.jpg"/>
-          <p:cNvPicPr>
-            <a:picLocks noChangeAspect="1" noChangeArrowheads="1"/>
-          </p:cNvPicPr>
-          <p:nvPr/>
-        </p:nvPicPr>
-        <p:blipFill>
-          <a:blip r:embed="rId2" cstate="print"/>
-          <a:srcRect/>
-          <a:stretch>
-            <a:fillRect/>
-          </a:stretch>
-        </p:blipFill>
-        <p:spPr bwMode="auto">
-          <a:xfrm>
-            <a:off x="0" y="0"/>
-            <a:ext cx="9143999" cy="6858000"/>
-          </a:xfrm>
-          <a:prstGeom prst="rect">
-            <a:avLst/>
-          </a:prstGeom>
-          <a:noFill/>
-        </p:spPr>
-      </p:pic>
-      <p:sp>
-        <p:nvSpPr>
-          <p:cNvPr id="3" name="Content Placeholder 2"/>
-          <p:cNvSpPr>
-            <a:spLocks noGrp="1"/>
-          </p:cNvSpPr>
-          <p:nvPr>
-            <p:ph idx="1"/>
-          </p:nvPr>
-        </p:nvSpPr>
-        <p:spPr>
-          <a:xfrm>
-            <a:off x="3071802" y="4000504"/>
-            <a:ext cx="5214974" cy="1357322"/>
-          </a:xfrm>
-        </p:spPr>
-        <p:txBody>
-          <a:bodyPr>
-            <a:noAutofit/>
-          </a:bodyPr>
-          <a:lstStyle/>
-          <a:p>
-            <a:pPr marL="514350" indent="-514350" algn="ctr">
-              <a:buNone/>
-            </a:pPr>
-            <a:r>
-              <a:rPr lang="de-DE" b="1" dirty="0">
-                <a:solidFill>
-                  <a:schemeClr val="bg1"/>
-                </a:solidFill>
-                <a:latin typeface="Kozuka Gothic Pro L" pitchFamily="34" charset="-128"/>
-                <a:ea typeface="Kozuka Gothic Pro L" pitchFamily="34" charset="-128"/>
-              </a:rPr>
-              <a:t>Danke Für Eure Aufmerksamkeit!</a:t>
-            </a:r>
-          </a:p>
-        </p:txBody>
-      </p:sp>
-    </p:spTree>
-  </p:cSld>
-  <p:clrMapOvr>
-    <a:masterClrMapping/>
-  </p:clrMapOvr>
+  <p:timing>
+    <p:tnLst>
+      <p:par>
+        <p:cTn id="1" dur="indefinite" restart="never" nodeType="tmRoot"/>
+      </p:par>
+    </p:tnLst>
+  </p:timing>
 </p:sld>
 </file>
 

</xml_diff>